<commit_message>
Cleanup and commenting. Modified the presentation with my part (which somebody else will have to tell...)
</commit_message>
<xml_diff>
--- a/Documents/Task 14/Task 14.pptx
+++ b/Documents/Task 14/Task 14.pptx
@@ -10,6 +10,7 @@
     <p:sldId id="257" r:id="rId4"/>
     <p:sldId id="261" r:id="rId5"/>
     <p:sldId id="262" r:id="rId6"/>
+    <p:sldId id="263" r:id="rId7"/>
   </p:sldIdLst>
   <p:sldSz cx="9144000" cy="6858000" type="screen4x3"/>
   <p:notesSz cx="6858000" cy="9144000"/>
@@ -110,7 +111,7 @@
   </p:defaultTextStyle>
   <p:extLst>
     <p:ext uri="{EFAFB233-063F-42B5-8137-9DF3F51BA10A}">
-      <p15:sldGuideLst xmlns:p15="http://schemas.microsoft.com/office/powerpoint/2012/main">
+      <p15:sldGuideLst xmlns:p15="http://schemas.microsoft.com/office/powerpoint/2012/main" xmlns="">
         <p15:guide id="1" orient="horz" pos="2160">
           <p15:clr>
             <a:srgbClr val="A4A3A4"/>
@@ -744,7 +745,7 @@
           <a:p>
             <a:fld id="{47B9CC14-C19A-4133-BA5B-215623135375}" type="datetimeFigureOut">
               <a:rPr lang="de-CH" smtClean="0"/>
-              <a:t>tt.01.jjjj</a:t>
+              <a:t>17.01.2016</a:t>
             </a:fld>
             <a:endParaRPr lang="de-CH"/>
           </a:p>
@@ -934,7 +935,7 @@
           <a:p>
             <a:fld id="{47B9CC14-C19A-4133-BA5B-215623135375}" type="datetimeFigureOut">
               <a:rPr lang="de-CH" smtClean="0"/>
-              <a:t>tt.01.jjjj</a:t>
+              <a:t>17.01.2016</a:t>
             </a:fld>
             <a:endParaRPr lang="de-CH"/>
           </a:p>
@@ -1109,7 +1110,7 @@
           <a:p>
             <a:fld id="{47B9CC14-C19A-4133-BA5B-215623135375}" type="datetimeFigureOut">
               <a:rPr lang="de-CH" smtClean="0"/>
-              <a:t>tt.01.jjjj</a:t>
+              <a:t>17.01.2016</a:t>
             </a:fld>
             <a:endParaRPr lang="de-CH"/>
           </a:p>
@@ -1251,7 +1252,7 @@
           <a:p>
             <a:fld id="{47B9CC14-C19A-4133-BA5B-215623135375}" type="datetimeFigureOut">
               <a:rPr lang="de-CH" smtClean="0"/>
-              <a:t>tt.01.jjjj</a:t>
+              <a:t>17.01.2016</a:t>
             </a:fld>
             <a:endParaRPr lang="de-CH"/>
           </a:p>
@@ -1498,7 +1499,7 @@
           <a:p>
             <a:fld id="{47B9CC14-C19A-4133-BA5B-215623135375}" type="datetimeFigureOut">
               <a:rPr lang="de-CH" smtClean="0"/>
-              <a:t>tt.01.jjjj</a:t>
+              <a:t>17.01.2016</a:t>
             </a:fld>
             <a:endParaRPr lang="de-CH"/>
           </a:p>
@@ -1897,7 +1898,7 @@
           <a:p>
             <a:fld id="{47B9CC14-C19A-4133-BA5B-215623135375}" type="datetimeFigureOut">
               <a:rPr lang="de-CH" smtClean="0"/>
-              <a:t>tt.01.jjjj</a:t>
+              <a:t>17.01.2016</a:t>
             </a:fld>
             <a:endParaRPr lang="de-CH"/>
           </a:p>
@@ -2335,7 +2336,7 @@
           <a:p>
             <a:fld id="{47B9CC14-C19A-4133-BA5B-215623135375}" type="datetimeFigureOut">
               <a:rPr lang="de-CH" smtClean="0"/>
-              <a:t>tt.01.jjjj</a:t>
+              <a:t>17.01.2016</a:t>
             </a:fld>
             <a:endParaRPr lang="de-CH"/>
           </a:p>
@@ -2430,7 +2431,7 @@
           <a:p>
             <a:fld id="{47B9CC14-C19A-4133-BA5B-215623135375}" type="datetimeFigureOut">
               <a:rPr lang="de-CH" smtClean="0"/>
-              <a:t>tt.01.jjjj</a:t>
+              <a:t>17.01.2016</a:t>
             </a:fld>
             <a:endParaRPr lang="de-CH"/>
           </a:p>
@@ -2543,7 +2544,7 @@
           <a:p>
             <a:fld id="{47B9CC14-C19A-4133-BA5B-215623135375}" type="datetimeFigureOut">
               <a:rPr lang="de-CH" smtClean="0"/>
-              <a:t>tt.01.jjjj</a:t>
+              <a:t>17.01.2016</a:t>
             </a:fld>
             <a:endParaRPr lang="de-CH"/>
           </a:p>
@@ -2811,7 +2812,7 @@
           <a:p>
             <a:fld id="{47B9CC14-C19A-4133-BA5B-215623135375}" type="datetimeFigureOut">
               <a:rPr lang="de-CH" smtClean="0"/>
-              <a:t>tt.01.jjjj</a:t>
+              <a:t>17.01.2016</a:t>
             </a:fld>
             <a:endParaRPr lang="de-CH"/>
           </a:p>
@@ -3012,7 +3013,7 @@
           <a:p>
             <a:fld id="{47B9CC14-C19A-4133-BA5B-215623135375}" type="datetimeFigureOut">
               <a:rPr lang="de-CH" smtClean="0"/>
-              <a:t>tt.01.jjjj</a:t>
+              <a:t>17.01.2016</a:t>
             </a:fld>
             <a:endParaRPr lang="de-CH"/>
           </a:p>
@@ -4101,7 +4102,7 @@
           <a:p>
             <a:fld id="{47B9CC14-C19A-4133-BA5B-215623135375}" type="datetimeFigureOut">
               <a:rPr lang="de-CH" smtClean="0"/>
-              <a:t>tt.01.jjjj</a:t>
+              <a:t>17.01.2016</a:t>
             </a:fld>
             <a:endParaRPr lang="de-CH"/>
           </a:p>
@@ -4530,11 +4531,7 @@
           <a:p>
             <a:r>
               <a:rPr lang="de-CH" dirty="0" smtClean="0"/>
-              <a:t>Task </a:t>
-            </a:r>
-            <a:r>
-              <a:rPr lang="de-CH" dirty="0" smtClean="0"/>
-              <a:t>14: Final </a:t>
+              <a:t>Task 14: Final </a:t>
             </a:r>
             <a:r>
               <a:rPr lang="de-CH" dirty="0" err="1" smtClean="0"/>
@@ -4844,7 +4841,62 @@
           <a:bodyPr/>
           <a:lstStyle/>
           <a:p>
-            <a:endParaRPr lang="de-CH"/>
+            <a:r>
+              <a:rPr lang="de-CH" dirty="0" smtClean="0"/>
+              <a:t>Database </a:t>
+            </a:r>
+            <a:r>
+              <a:rPr lang="de-CH" dirty="0" err="1" smtClean="0"/>
+              <a:t>connectivity</a:t>
+            </a:r>
+            <a:endParaRPr lang="de-CH" dirty="0" smtClean="0"/>
+          </a:p>
+          <a:p>
+            <a:endParaRPr lang="de-CH" dirty="0"/>
+          </a:p>
+          <a:p>
+            <a:endParaRPr lang="de-CH" dirty="0" smtClean="0"/>
+          </a:p>
+          <a:p>
+            <a:r>
+              <a:rPr lang="de-CH" dirty="0" smtClean="0"/>
+              <a:t>General </a:t>
+            </a:r>
+            <a:r>
+              <a:rPr lang="de-CH" dirty="0" err="1" smtClean="0"/>
+              <a:t>support</a:t>
+            </a:r>
+            <a:r>
+              <a:rPr lang="de-CH" dirty="0" smtClean="0"/>
+              <a:t> </a:t>
+            </a:r>
+            <a:r>
+              <a:rPr lang="de-CH" dirty="0" err="1" smtClean="0"/>
+              <a:t>for</a:t>
+            </a:r>
+            <a:r>
+              <a:rPr lang="de-CH" dirty="0" smtClean="0"/>
+              <a:t> </a:t>
+            </a:r>
+            <a:r>
+              <a:rPr lang="de-CH" dirty="0" err="1" smtClean="0"/>
+              <a:t>team</a:t>
+            </a:r>
+            <a:r>
+              <a:rPr lang="de-CH" dirty="0" smtClean="0"/>
+              <a:t> </a:t>
+            </a:r>
+            <a:r>
+              <a:rPr lang="de-CH" dirty="0" err="1" smtClean="0"/>
+              <a:t>members</a:t>
+            </a:r>
+            <a:endParaRPr lang="de-CH" dirty="0" smtClean="0"/>
+          </a:p>
+          <a:p>
+            <a:pPr marL="109728" indent="0">
+              <a:buNone/>
+            </a:pPr>
+            <a:endParaRPr lang="de-CH" dirty="0"/>
           </a:p>
         </p:txBody>
       </p:sp>
@@ -4863,14 +4915,198 @@
           <a:bodyPr/>
           <a:lstStyle/>
           <a:p>
-            <a:endParaRPr lang="de-CH"/>
-          </a:p>
-        </p:txBody>
-      </p:sp>
+            <a:r>
+              <a:rPr lang="de-CH" dirty="0" err="1" smtClean="0"/>
+              <a:t>Contribution</a:t>
+            </a:r>
+            <a:r>
+              <a:rPr lang="de-CH" dirty="0" smtClean="0"/>
+              <a:t> Marwin Philips</a:t>
+            </a:r>
+            <a:endParaRPr lang="de-CH" dirty="0"/>
+          </a:p>
+        </p:txBody>
+      </p:sp>
+      <p:pic>
+        <p:nvPicPr>
+          <p:cNvPr id="1026" name="Picture 2"/>
+          <p:cNvPicPr>
+            <a:picLocks noChangeAspect="1" noChangeArrowheads="1"/>
+          </p:cNvPicPr>
+          <p:nvPr/>
+        </p:nvPicPr>
+        <p:blipFill>
+          <a:blip r:embed="rId2">
+            <a:extLst>
+              <a:ext uri="{28A0092B-C50C-407E-A947-70E740481C1C}">
+                <a14:useLocalDpi xmlns:a14="http://schemas.microsoft.com/office/drawing/2010/main" val="0"/>
+              </a:ext>
+            </a:extLst>
+          </a:blip>
+          <a:srcRect/>
+          <a:stretch>
+            <a:fillRect/>
+          </a:stretch>
+        </p:blipFill>
+        <p:spPr bwMode="auto">
+          <a:xfrm>
+            <a:off x="899592" y="2003326"/>
+            <a:ext cx="5191125" cy="590550"/>
+          </a:xfrm>
+          <a:prstGeom prst="rect">
+            <a:avLst/>
+          </a:prstGeom>
+          <a:noFill/>
+          <a:ln>
+            <a:noFill/>
+          </a:ln>
+          <a:extLst>
+            <a:ext uri="{909E8E84-426E-40DD-AFC4-6F175D3DCCD1}">
+              <a14:hiddenFill xmlns:a14="http://schemas.microsoft.com/office/drawing/2010/main">
+                <a:solidFill>
+                  <a:schemeClr val="accent1"/>
+                </a:solidFill>
+              </a14:hiddenFill>
+            </a:ext>
+            <a:ext uri="{91240B29-F687-4F45-9708-019B960494DF}">
+              <a14:hiddenLine xmlns:a14="http://schemas.microsoft.com/office/drawing/2010/main" w="9525">
+                <a:solidFill>
+                  <a:schemeClr val="tx1"/>
+                </a:solidFill>
+                <a:miter lim="800000"/>
+                <a:headEnd/>
+                <a:tailEnd/>
+              </a14:hiddenLine>
+            </a:ext>
+          </a:extLst>
+        </p:spPr>
+      </p:pic>
+      <p:pic>
+        <p:nvPicPr>
+          <p:cNvPr id="1027" name="Picture 3"/>
+          <p:cNvPicPr>
+            <a:picLocks noChangeAspect="1" noChangeArrowheads="1"/>
+          </p:cNvPicPr>
+          <p:nvPr/>
+        </p:nvPicPr>
+        <p:blipFill>
+          <a:blip r:embed="rId3">
+            <a:extLst>
+              <a:ext uri="{28A0092B-C50C-407E-A947-70E740481C1C}">
+                <a14:useLocalDpi xmlns:a14="http://schemas.microsoft.com/office/drawing/2010/main" val="0"/>
+              </a:ext>
+            </a:extLst>
+          </a:blip>
+          <a:srcRect/>
+          <a:stretch>
+            <a:fillRect/>
+          </a:stretch>
+        </p:blipFill>
+        <p:spPr bwMode="auto">
+          <a:xfrm>
+            <a:off x="899592" y="5013176"/>
+            <a:ext cx="6838950" cy="1390650"/>
+          </a:xfrm>
+          <a:prstGeom prst="rect">
+            <a:avLst/>
+          </a:prstGeom>
+          <a:noFill/>
+          <a:ln>
+            <a:noFill/>
+          </a:ln>
+          <a:extLst>
+            <a:ext uri="{909E8E84-426E-40DD-AFC4-6F175D3DCCD1}">
+              <a14:hiddenFill xmlns:a14="http://schemas.microsoft.com/office/drawing/2010/main">
+                <a:solidFill>
+                  <a:schemeClr val="accent1"/>
+                </a:solidFill>
+              </a14:hiddenFill>
+            </a:ext>
+            <a:ext uri="{91240B29-F687-4F45-9708-019B960494DF}">
+              <a14:hiddenLine xmlns:a14="http://schemas.microsoft.com/office/drawing/2010/main" w="9525">
+                <a:solidFill>
+                  <a:schemeClr val="tx1"/>
+                </a:solidFill>
+                <a:miter lim="800000"/>
+                <a:headEnd/>
+                <a:tailEnd/>
+              </a14:hiddenLine>
+            </a:ext>
+          </a:extLst>
+        </p:spPr>
+      </p:pic>
     </p:spTree>
     <p:extLst>
       <p:ext uri="{BB962C8B-B14F-4D97-AF65-F5344CB8AC3E}">
         <p14:creationId xmlns:p14="http://schemas.microsoft.com/office/powerpoint/2010/main" val="332296334"/>
+      </p:ext>
+    </p:extLst>
+  </p:cSld>
+  <p:clrMapOvr>
+    <a:masterClrMapping/>
+  </p:clrMapOvr>
+</p:sld>
+</file>
+
+<file path=ppt/slides/slide6.xml><?xml version="1.0" encoding="utf-8"?>
+<p:sld xmlns:a="http://schemas.openxmlformats.org/drawingml/2006/main" xmlns:r="http://schemas.openxmlformats.org/officeDocument/2006/relationships" xmlns:p="http://schemas.openxmlformats.org/presentationml/2006/main">
+  <p:cSld>
+    <p:spTree>
+      <p:nvGrpSpPr>
+        <p:cNvPr id="1" name=""/>
+        <p:cNvGrpSpPr/>
+        <p:nvPr/>
+      </p:nvGrpSpPr>
+      <p:grpSpPr>
+        <a:xfrm>
+          <a:off x="0" y="0"/>
+          <a:ext cx="0" cy="0"/>
+          <a:chOff x="0" y="0"/>
+          <a:chExt cx="0" cy="0"/>
+        </a:xfrm>
+      </p:grpSpPr>
+      <p:sp>
+        <p:nvSpPr>
+          <p:cNvPr id="2" name="Inhaltsplatzhalter 1"/>
+          <p:cNvSpPr>
+            <a:spLocks noGrp="1"/>
+          </p:cNvSpPr>
+          <p:nvPr>
+            <p:ph idx="1"/>
+          </p:nvPr>
+        </p:nvSpPr>
+        <p:spPr/>
+        <p:txBody>
+          <a:bodyPr/>
+          <a:lstStyle/>
+          <a:p>
+            <a:endParaRPr lang="de-CH"/>
+          </a:p>
+        </p:txBody>
+      </p:sp>
+      <p:sp>
+        <p:nvSpPr>
+          <p:cNvPr id="3" name="Titel 2"/>
+          <p:cNvSpPr>
+            <a:spLocks noGrp="1"/>
+          </p:cNvSpPr>
+          <p:nvPr>
+            <p:ph type="title"/>
+          </p:nvPr>
+        </p:nvSpPr>
+        <p:spPr/>
+        <p:txBody>
+          <a:bodyPr/>
+          <a:lstStyle/>
+          <a:p>
+            <a:endParaRPr lang="de-CH"/>
+          </a:p>
+        </p:txBody>
+      </p:sp>
+    </p:spTree>
+    <p:extLst>
+      <p:ext uri="{BB962C8B-B14F-4D97-AF65-F5344CB8AC3E}">
+        <p14:creationId xmlns:p14="http://schemas.microsoft.com/office/powerpoint/2010/main" val="3459893387"/>
       </p:ext>
     </p:extLst>
   </p:cSld>

</xml_diff>

<commit_message>
Präsentation ergänzt mit Deleting Prescription +4 Slides
</commit_message>
<xml_diff>
--- a/Documents/Task 14/Task 14.pptx
+++ b/Documents/Task 14/Task 14.pptx
@@ -11,7 +11,12 @@
     <p:sldId id="261" r:id="rId5"/>
     <p:sldId id="264" r:id="rId6"/>
     <p:sldId id="262" r:id="rId7"/>
-    <p:sldId id="263" r:id="rId8"/>
+    <p:sldId id="265" r:id="rId8"/>
+    <p:sldId id="266" r:id="rId9"/>
+    <p:sldId id="267" r:id="rId10"/>
+    <p:sldId id="268" r:id="rId11"/>
+    <p:sldId id="269" r:id="rId12"/>
+    <p:sldId id="263" r:id="rId13"/>
   </p:sldIdLst>
   <p:sldSz cx="9144000" cy="6858000" type="screen4x3"/>
   <p:notesSz cx="6858000" cy="9144000"/>
@@ -746,7 +751,7 @@
           <a:p>
             <a:fld id="{47B9CC14-C19A-4133-BA5B-215623135375}" type="datetimeFigureOut">
               <a:rPr lang="de-CH" smtClean="0"/>
-              <a:t>19.01.2016</a:t>
+              <a:t>20.01.2016</a:t>
             </a:fld>
             <a:endParaRPr lang="de-CH"/>
           </a:p>
@@ -936,7 +941,7 @@
           <a:p>
             <a:fld id="{47B9CC14-C19A-4133-BA5B-215623135375}" type="datetimeFigureOut">
               <a:rPr lang="de-CH" smtClean="0"/>
-              <a:t>19.01.2016</a:t>
+              <a:t>20.01.2016</a:t>
             </a:fld>
             <a:endParaRPr lang="de-CH"/>
           </a:p>
@@ -1111,7 +1116,7 @@
           <a:p>
             <a:fld id="{47B9CC14-C19A-4133-BA5B-215623135375}" type="datetimeFigureOut">
               <a:rPr lang="de-CH" smtClean="0"/>
-              <a:t>19.01.2016</a:t>
+              <a:t>20.01.2016</a:t>
             </a:fld>
             <a:endParaRPr lang="de-CH"/>
           </a:p>
@@ -1253,7 +1258,7 @@
           <a:p>
             <a:fld id="{47B9CC14-C19A-4133-BA5B-215623135375}" type="datetimeFigureOut">
               <a:rPr lang="de-CH" smtClean="0"/>
-              <a:t>19.01.2016</a:t>
+              <a:t>20.01.2016</a:t>
             </a:fld>
             <a:endParaRPr lang="de-CH"/>
           </a:p>
@@ -1500,7 +1505,7 @@
           <a:p>
             <a:fld id="{47B9CC14-C19A-4133-BA5B-215623135375}" type="datetimeFigureOut">
               <a:rPr lang="de-CH" smtClean="0"/>
-              <a:t>19.01.2016</a:t>
+              <a:t>20.01.2016</a:t>
             </a:fld>
             <a:endParaRPr lang="de-CH"/>
           </a:p>
@@ -1899,7 +1904,7 @@
           <a:p>
             <a:fld id="{47B9CC14-C19A-4133-BA5B-215623135375}" type="datetimeFigureOut">
               <a:rPr lang="de-CH" smtClean="0"/>
-              <a:t>19.01.2016</a:t>
+              <a:t>20.01.2016</a:t>
             </a:fld>
             <a:endParaRPr lang="de-CH"/>
           </a:p>
@@ -2337,7 +2342,7 @@
           <a:p>
             <a:fld id="{47B9CC14-C19A-4133-BA5B-215623135375}" type="datetimeFigureOut">
               <a:rPr lang="de-CH" smtClean="0"/>
-              <a:t>19.01.2016</a:t>
+              <a:t>20.01.2016</a:t>
             </a:fld>
             <a:endParaRPr lang="de-CH"/>
           </a:p>
@@ -2432,7 +2437,7 @@
           <a:p>
             <a:fld id="{47B9CC14-C19A-4133-BA5B-215623135375}" type="datetimeFigureOut">
               <a:rPr lang="de-CH" smtClean="0"/>
-              <a:t>19.01.2016</a:t>
+              <a:t>20.01.2016</a:t>
             </a:fld>
             <a:endParaRPr lang="de-CH"/>
           </a:p>
@@ -2545,7 +2550,7 @@
           <a:p>
             <a:fld id="{47B9CC14-C19A-4133-BA5B-215623135375}" type="datetimeFigureOut">
               <a:rPr lang="de-CH" smtClean="0"/>
-              <a:t>19.01.2016</a:t>
+              <a:t>20.01.2016</a:t>
             </a:fld>
             <a:endParaRPr lang="de-CH"/>
           </a:p>
@@ -2813,7 +2818,7 @@
           <a:p>
             <a:fld id="{47B9CC14-C19A-4133-BA5B-215623135375}" type="datetimeFigureOut">
               <a:rPr lang="de-CH" smtClean="0"/>
-              <a:t>19.01.2016</a:t>
+              <a:t>20.01.2016</a:t>
             </a:fld>
             <a:endParaRPr lang="de-CH"/>
           </a:p>
@@ -3014,7 +3019,7 @@
           <a:p>
             <a:fld id="{47B9CC14-C19A-4133-BA5B-215623135375}" type="datetimeFigureOut">
               <a:rPr lang="de-CH" smtClean="0"/>
-              <a:t>19.01.2016</a:t>
+              <a:t>20.01.2016</a:t>
             </a:fld>
             <a:endParaRPr lang="de-CH"/>
           </a:p>
@@ -4103,7 +4108,7 @@
           <a:p>
             <a:fld id="{47B9CC14-C19A-4133-BA5B-215623135375}" type="datetimeFigureOut">
               <a:rPr lang="de-CH" smtClean="0"/>
-              <a:t>19.01.2016</a:t>
+              <a:t>20.01.2016</a:t>
             </a:fld>
             <a:endParaRPr lang="de-CH"/>
           </a:p>
@@ -4571,6 +4576,444 @@
   <p:clrMapOvr>
     <a:masterClrMapping/>
   </p:clrMapOvr>
+  <p:timing>
+    <p:tnLst>
+      <p:par>
+        <p:cTn id="1" dur="indefinite" restart="never" nodeType="tmRoot"/>
+      </p:par>
+    </p:tnLst>
+  </p:timing>
+</p:sld>
+</file>
+
+<file path=ppt/slides/slide10.xml><?xml version="1.0" encoding="utf-8"?>
+<p:sld xmlns:a="http://schemas.openxmlformats.org/drawingml/2006/main" xmlns:r="http://schemas.openxmlformats.org/officeDocument/2006/relationships" xmlns:p="http://schemas.openxmlformats.org/presentationml/2006/main">
+  <p:cSld>
+    <p:spTree>
+      <p:nvGrpSpPr>
+        <p:cNvPr id="1" name=""/>
+        <p:cNvGrpSpPr/>
+        <p:nvPr/>
+      </p:nvGrpSpPr>
+      <p:grpSpPr>
+        <a:xfrm>
+          <a:off x="0" y="0"/>
+          <a:ext cx="0" cy="0"/>
+          <a:chOff x="0" y="0"/>
+          <a:chExt cx="0" cy="0"/>
+        </a:xfrm>
+      </p:grpSpPr>
+      <p:sp>
+        <p:nvSpPr>
+          <p:cNvPr id="2" name="Inhaltsplatzhalter 1"/>
+          <p:cNvSpPr>
+            <a:spLocks noGrp="1"/>
+          </p:cNvSpPr>
+          <p:nvPr>
+            <p:ph idx="1"/>
+          </p:nvPr>
+        </p:nvSpPr>
+        <p:spPr/>
+        <p:txBody>
+          <a:bodyPr/>
+          <a:lstStyle/>
+          <a:p>
+            <a:r>
+              <a:rPr lang="de-CH" dirty="0" err="1" smtClean="0"/>
+              <a:t>Deleting</a:t>
+            </a:r>
+            <a:r>
+              <a:rPr lang="de-CH" dirty="0" smtClean="0"/>
+              <a:t> a </a:t>
+            </a:r>
+            <a:r>
+              <a:rPr lang="de-CH" dirty="0" err="1" smtClean="0"/>
+              <a:t>new</a:t>
+            </a:r>
+            <a:r>
+              <a:rPr lang="de-CH" dirty="0" smtClean="0"/>
+              <a:t> </a:t>
+            </a:r>
+            <a:r>
+              <a:rPr lang="de-CH" dirty="0" err="1" smtClean="0"/>
+              <a:t>prescription</a:t>
+            </a:r>
+            <a:endParaRPr lang="de-CH" dirty="0" smtClean="0"/>
+          </a:p>
+          <a:p>
+            <a:endParaRPr lang="de-CH" dirty="0"/>
+          </a:p>
+          <a:p>
+            <a:endParaRPr lang="de-CH" dirty="0" smtClean="0"/>
+          </a:p>
+          <a:p>
+            <a:pPr marL="109728" indent="0">
+              <a:buNone/>
+            </a:pPr>
+            <a:endParaRPr lang="de-CH" dirty="0" smtClean="0"/>
+          </a:p>
+          <a:p>
+            <a:pPr marL="109728" indent="0">
+              <a:buNone/>
+            </a:pPr>
+            <a:endParaRPr lang="de-CH" dirty="0"/>
+          </a:p>
+        </p:txBody>
+      </p:sp>
+      <p:sp>
+        <p:nvSpPr>
+          <p:cNvPr id="3" name="Titel 2"/>
+          <p:cNvSpPr>
+            <a:spLocks noGrp="1"/>
+          </p:cNvSpPr>
+          <p:nvPr>
+            <p:ph type="title"/>
+          </p:nvPr>
+        </p:nvSpPr>
+        <p:spPr/>
+        <p:txBody>
+          <a:bodyPr/>
+          <a:lstStyle/>
+          <a:p>
+            <a:r>
+              <a:rPr lang="de-CH" dirty="0" err="1" smtClean="0"/>
+              <a:t>Contribution</a:t>
+            </a:r>
+            <a:r>
+              <a:rPr lang="de-CH" dirty="0" smtClean="0"/>
+              <a:t> </a:t>
+            </a:r>
+            <a:r>
+              <a:rPr lang="de-CH" dirty="0" smtClean="0"/>
+              <a:t>Michel Murbach</a:t>
+            </a:r>
+            <a:endParaRPr lang="de-CH" dirty="0"/>
+          </a:p>
+        </p:txBody>
+      </p:sp>
+      <p:pic>
+        <p:nvPicPr>
+          <p:cNvPr id="4" name="Grafik 3"/>
+          <p:cNvPicPr>
+            <a:picLocks noChangeAspect="1"/>
+          </p:cNvPicPr>
+          <p:nvPr/>
+        </p:nvPicPr>
+        <p:blipFill>
+          <a:blip r:embed="rId2">
+            <a:extLst>
+              <a:ext uri="{28A0092B-C50C-407E-A947-70E740481C1C}">
+                <a14:useLocalDpi xmlns:a14="http://schemas.microsoft.com/office/drawing/2010/main" val="0"/>
+              </a:ext>
+            </a:extLst>
+          </a:blip>
+          <a:stretch>
+            <a:fillRect/>
+          </a:stretch>
+        </p:blipFill>
+        <p:spPr>
+          <a:xfrm>
+            <a:off x="925244" y="2204864"/>
+            <a:ext cx="7293511" cy="3514395"/>
+          </a:xfrm>
+          <a:prstGeom prst="rect">
+            <a:avLst/>
+          </a:prstGeom>
+        </p:spPr>
+      </p:pic>
+      <p:sp>
+        <p:nvSpPr>
+          <p:cNvPr id="6" name="Rechteck 5"/>
+          <p:cNvSpPr/>
+          <p:nvPr/>
+        </p:nvSpPr>
+        <p:spPr>
+          <a:xfrm>
+            <a:off x="2411760" y="5301208"/>
+            <a:ext cx="4896544" cy="360040"/>
+          </a:xfrm>
+          <a:prstGeom prst="rect">
+            <a:avLst/>
+          </a:prstGeom>
+          <a:noFill/>
+          <a:ln>
+            <a:solidFill>
+              <a:schemeClr val="accent2"/>
+            </a:solidFill>
+          </a:ln>
+        </p:spPr>
+        <p:style>
+          <a:lnRef idx="2">
+            <a:schemeClr val="accent1">
+              <a:shade val="50000"/>
+            </a:schemeClr>
+          </a:lnRef>
+          <a:fillRef idx="1">
+            <a:schemeClr val="accent1"/>
+          </a:fillRef>
+          <a:effectRef idx="0">
+            <a:schemeClr val="accent1"/>
+          </a:effectRef>
+          <a:fontRef idx="minor">
+            <a:schemeClr val="lt1"/>
+          </a:fontRef>
+        </p:style>
+        <p:txBody>
+          <a:bodyPr rtlCol="0" anchor="ctr"/>
+          <a:lstStyle/>
+          <a:p>
+            <a:pPr algn="ctr"/>
+            <a:endParaRPr lang="en-GB"/>
+          </a:p>
+        </p:txBody>
+      </p:sp>
+    </p:spTree>
+    <p:extLst>
+      <p:ext uri="{BB962C8B-B14F-4D97-AF65-F5344CB8AC3E}">
+        <p14:creationId xmlns:p14="http://schemas.microsoft.com/office/powerpoint/2010/main" val="1513813094"/>
+      </p:ext>
+    </p:extLst>
+  </p:cSld>
+  <p:clrMapOvr>
+    <a:masterClrMapping/>
+  </p:clrMapOvr>
+  <p:timing>
+    <p:tnLst>
+      <p:par>
+        <p:cTn id="1" dur="indefinite" restart="never" nodeType="tmRoot"/>
+      </p:par>
+    </p:tnLst>
+  </p:timing>
+</p:sld>
+</file>
+
+<file path=ppt/slides/slide11.xml><?xml version="1.0" encoding="utf-8"?>
+<p:sld xmlns:a="http://schemas.openxmlformats.org/drawingml/2006/main" xmlns:r="http://schemas.openxmlformats.org/officeDocument/2006/relationships" xmlns:p="http://schemas.openxmlformats.org/presentationml/2006/main">
+  <p:cSld>
+    <p:spTree>
+      <p:nvGrpSpPr>
+        <p:cNvPr id="1" name=""/>
+        <p:cNvGrpSpPr/>
+        <p:nvPr/>
+      </p:nvGrpSpPr>
+      <p:grpSpPr>
+        <a:xfrm>
+          <a:off x="0" y="0"/>
+          <a:ext cx="0" cy="0"/>
+          <a:chOff x="0" y="0"/>
+          <a:chExt cx="0" cy="0"/>
+        </a:xfrm>
+      </p:grpSpPr>
+      <p:sp>
+        <p:nvSpPr>
+          <p:cNvPr id="2" name="Inhaltsplatzhalter 1"/>
+          <p:cNvSpPr>
+            <a:spLocks noGrp="1"/>
+          </p:cNvSpPr>
+          <p:nvPr>
+            <p:ph idx="1"/>
+          </p:nvPr>
+        </p:nvSpPr>
+        <p:spPr/>
+        <p:txBody>
+          <a:bodyPr/>
+          <a:lstStyle/>
+          <a:p>
+            <a:r>
+              <a:rPr lang="de-CH" dirty="0" err="1" smtClean="0"/>
+              <a:t>Deleting</a:t>
+            </a:r>
+            <a:r>
+              <a:rPr lang="de-CH" dirty="0" smtClean="0"/>
+              <a:t> a </a:t>
+            </a:r>
+            <a:r>
+              <a:rPr lang="de-CH" dirty="0" err="1" smtClean="0"/>
+              <a:t>new</a:t>
+            </a:r>
+            <a:r>
+              <a:rPr lang="de-CH" dirty="0" smtClean="0"/>
+              <a:t> </a:t>
+            </a:r>
+            <a:r>
+              <a:rPr lang="de-CH" dirty="0" err="1" smtClean="0"/>
+              <a:t>prescription</a:t>
+            </a:r>
+            <a:endParaRPr lang="de-CH" dirty="0" smtClean="0"/>
+          </a:p>
+          <a:p>
+            <a:endParaRPr lang="de-CH" dirty="0"/>
+          </a:p>
+          <a:p>
+            <a:endParaRPr lang="de-CH" dirty="0" smtClean="0"/>
+          </a:p>
+          <a:p>
+            <a:pPr marL="109728" indent="0">
+              <a:buNone/>
+            </a:pPr>
+            <a:endParaRPr lang="de-CH" dirty="0" smtClean="0"/>
+          </a:p>
+          <a:p>
+            <a:pPr marL="109728" indent="0">
+              <a:buNone/>
+            </a:pPr>
+            <a:endParaRPr lang="de-CH" dirty="0"/>
+          </a:p>
+        </p:txBody>
+      </p:sp>
+      <p:sp>
+        <p:nvSpPr>
+          <p:cNvPr id="3" name="Titel 2"/>
+          <p:cNvSpPr>
+            <a:spLocks noGrp="1"/>
+          </p:cNvSpPr>
+          <p:nvPr>
+            <p:ph type="title"/>
+          </p:nvPr>
+        </p:nvSpPr>
+        <p:spPr/>
+        <p:txBody>
+          <a:bodyPr/>
+          <a:lstStyle/>
+          <a:p>
+            <a:r>
+              <a:rPr lang="de-CH" dirty="0" err="1" smtClean="0"/>
+              <a:t>Contribution</a:t>
+            </a:r>
+            <a:r>
+              <a:rPr lang="de-CH" dirty="0" smtClean="0"/>
+              <a:t> </a:t>
+            </a:r>
+            <a:r>
+              <a:rPr lang="de-CH" dirty="0" smtClean="0"/>
+              <a:t>Michel Murbach</a:t>
+            </a:r>
+            <a:endParaRPr lang="de-CH" dirty="0"/>
+          </a:p>
+        </p:txBody>
+      </p:sp>
+      <p:pic>
+        <p:nvPicPr>
+          <p:cNvPr id="4" name="Grafik 3"/>
+          <p:cNvPicPr>
+            <a:picLocks noChangeAspect="1"/>
+          </p:cNvPicPr>
+          <p:nvPr/>
+        </p:nvPicPr>
+        <p:blipFill>
+          <a:blip r:embed="rId2">
+            <a:extLst>
+              <a:ext uri="{28A0092B-C50C-407E-A947-70E740481C1C}">
+                <a14:useLocalDpi xmlns:a14="http://schemas.microsoft.com/office/drawing/2010/main" val="0"/>
+              </a:ext>
+            </a:extLst>
+          </a:blip>
+          <a:stretch>
+            <a:fillRect/>
+          </a:stretch>
+        </p:blipFill>
+        <p:spPr>
+          <a:xfrm>
+            <a:off x="1647691" y="1935429"/>
+            <a:ext cx="5848617" cy="4941168"/>
+          </a:xfrm>
+          <a:prstGeom prst="rect">
+            <a:avLst/>
+          </a:prstGeom>
+        </p:spPr>
+      </p:pic>
+    </p:spTree>
+    <p:extLst>
+      <p:ext uri="{BB962C8B-B14F-4D97-AF65-F5344CB8AC3E}">
+        <p14:creationId xmlns:p14="http://schemas.microsoft.com/office/powerpoint/2010/main" val="3974293717"/>
+      </p:ext>
+    </p:extLst>
+  </p:cSld>
+  <p:clrMapOvr>
+    <a:masterClrMapping/>
+  </p:clrMapOvr>
+  <p:timing>
+    <p:tnLst>
+      <p:par>
+        <p:cTn id="1" dur="indefinite" restart="never" nodeType="tmRoot"/>
+      </p:par>
+    </p:tnLst>
+  </p:timing>
+</p:sld>
+</file>
+
+<file path=ppt/slides/slide12.xml><?xml version="1.0" encoding="utf-8"?>
+<p:sld xmlns:a="http://schemas.openxmlformats.org/drawingml/2006/main" xmlns:r="http://schemas.openxmlformats.org/officeDocument/2006/relationships" xmlns:p="http://schemas.openxmlformats.org/presentationml/2006/main">
+  <p:cSld>
+    <p:spTree>
+      <p:nvGrpSpPr>
+        <p:cNvPr id="1" name=""/>
+        <p:cNvGrpSpPr/>
+        <p:nvPr/>
+      </p:nvGrpSpPr>
+      <p:grpSpPr>
+        <a:xfrm>
+          <a:off x="0" y="0"/>
+          <a:ext cx="0" cy="0"/>
+          <a:chOff x="0" y="0"/>
+          <a:chExt cx="0" cy="0"/>
+        </a:xfrm>
+      </p:grpSpPr>
+      <p:sp>
+        <p:nvSpPr>
+          <p:cNvPr id="2" name="Inhaltsplatzhalter 1"/>
+          <p:cNvSpPr>
+            <a:spLocks noGrp="1"/>
+          </p:cNvSpPr>
+          <p:nvPr>
+            <p:ph idx="1"/>
+          </p:nvPr>
+        </p:nvSpPr>
+        <p:spPr/>
+        <p:txBody>
+          <a:bodyPr/>
+          <a:lstStyle/>
+          <a:p>
+            <a:endParaRPr lang="de-CH"/>
+          </a:p>
+        </p:txBody>
+      </p:sp>
+      <p:sp>
+        <p:nvSpPr>
+          <p:cNvPr id="3" name="Titel 2"/>
+          <p:cNvSpPr>
+            <a:spLocks noGrp="1"/>
+          </p:cNvSpPr>
+          <p:nvPr>
+            <p:ph type="title"/>
+          </p:nvPr>
+        </p:nvSpPr>
+        <p:spPr/>
+        <p:txBody>
+          <a:bodyPr/>
+          <a:lstStyle/>
+          <a:p>
+            <a:endParaRPr lang="de-CH"/>
+          </a:p>
+        </p:txBody>
+      </p:sp>
+    </p:spTree>
+    <p:extLst>
+      <p:ext uri="{BB962C8B-B14F-4D97-AF65-F5344CB8AC3E}">
+        <p14:creationId xmlns:p14="http://schemas.microsoft.com/office/powerpoint/2010/main" val="3459893387"/>
+      </p:ext>
+    </p:extLst>
+  </p:cSld>
+  <p:clrMapOvr>
+    <a:masterClrMapping/>
+  </p:clrMapOvr>
+  <p:timing>
+    <p:tnLst>
+      <p:par>
+        <p:cTn id="1" dur="indefinite" restart="never" nodeType="tmRoot"/>
+      </p:par>
+    </p:tnLst>
+  </p:timing>
 </p:sld>
 </file>
 
@@ -4653,6 +5096,13 @@
   <p:clrMapOvr>
     <a:masterClrMapping/>
   </p:clrMapOvr>
+  <p:timing>
+    <p:tnLst>
+      <p:par>
+        <p:cTn id="1" dur="indefinite" restart="never" nodeType="tmRoot"/>
+      </p:par>
+    </p:tnLst>
+  </p:timing>
 </p:sld>
 </file>
 
@@ -4735,6 +5185,13 @@
   <p:clrMapOvr>
     <a:masterClrMapping/>
   </p:clrMapOvr>
+  <p:timing>
+    <p:tnLst>
+      <p:par>
+        <p:cTn id="1" dur="indefinite" restart="never" nodeType="tmRoot"/>
+      </p:par>
+    </p:tnLst>
+  </p:timing>
 </p:sld>
 </file>
 
@@ -4953,6 +5410,13 @@
   <p:clrMapOvr>
     <a:masterClrMapping/>
   </p:clrMapOvr>
+  <p:timing>
+    <p:tnLst>
+      <p:par>
+        <p:cTn id="1" dur="indefinite" restart="never" nodeType="tmRoot"/>
+      </p:par>
+    </p:tnLst>
+  </p:timing>
 </p:sld>
 </file>
 
@@ -5192,6 +5656,13 @@
   <p:clrMapOvr>
     <a:masterClrMapping/>
   </p:clrMapOvr>
+  <p:timing>
+    <p:tnLst>
+      <p:par>
+        <p:cTn id="1" dur="indefinite" restart="never" nodeType="tmRoot"/>
+      </p:par>
+    </p:tnLst>
+  </p:timing>
 </p:sld>
 </file>
 
@@ -5227,7 +5698,45 @@
           <a:bodyPr/>
           <a:lstStyle/>
           <a:p>
-            <a:endParaRPr lang="de-CH"/>
+            <a:r>
+              <a:rPr lang="de-CH" dirty="0" err="1" smtClean="0"/>
+              <a:t>Deleting</a:t>
+            </a:r>
+            <a:r>
+              <a:rPr lang="de-CH" dirty="0" smtClean="0"/>
+              <a:t> a </a:t>
+            </a:r>
+            <a:r>
+              <a:rPr lang="de-CH" dirty="0" err="1" smtClean="0"/>
+              <a:t>new</a:t>
+            </a:r>
+            <a:r>
+              <a:rPr lang="de-CH" dirty="0" smtClean="0"/>
+              <a:t> </a:t>
+            </a:r>
+            <a:r>
+              <a:rPr lang="de-CH" dirty="0" err="1" smtClean="0"/>
+              <a:t>prescription</a:t>
+            </a:r>
+            <a:endParaRPr lang="de-CH" dirty="0" smtClean="0"/>
+          </a:p>
+          <a:p>
+            <a:endParaRPr lang="de-CH" dirty="0"/>
+          </a:p>
+          <a:p>
+            <a:endParaRPr lang="de-CH" dirty="0" smtClean="0"/>
+          </a:p>
+          <a:p>
+            <a:pPr marL="109728" indent="0">
+              <a:buNone/>
+            </a:pPr>
+            <a:endParaRPr lang="de-CH" dirty="0" smtClean="0"/>
+          </a:p>
+          <a:p>
+            <a:pPr marL="109728" indent="0">
+              <a:buNone/>
+            </a:pPr>
+            <a:endParaRPr lang="de-CH" dirty="0"/>
           </a:p>
         </p:txBody>
       </p:sp>
@@ -5246,20 +5755,493 @@
           <a:bodyPr/>
           <a:lstStyle/>
           <a:p>
-            <a:endParaRPr lang="de-CH"/>
+            <a:r>
+              <a:rPr lang="de-CH" dirty="0" err="1" smtClean="0"/>
+              <a:t>Contribution</a:t>
+            </a:r>
+            <a:r>
+              <a:rPr lang="de-CH" dirty="0" smtClean="0"/>
+              <a:t> </a:t>
+            </a:r>
+            <a:r>
+              <a:rPr lang="de-CH" dirty="0" smtClean="0"/>
+              <a:t>Michel Murbach</a:t>
+            </a:r>
+            <a:endParaRPr lang="de-CH" dirty="0"/>
+          </a:p>
+        </p:txBody>
+      </p:sp>
+      <p:pic>
+        <p:nvPicPr>
+          <p:cNvPr id="4" name="Grafik 3"/>
+          <p:cNvPicPr>
+            <a:picLocks noChangeAspect="1"/>
+          </p:cNvPicPr>
+          <p:nvPr/>
+        </p:nvPicPr>
+        <p:blipFill>
+          <a:blip r:embed="rId2">
+            <a:extLst>
+              <a:ext uri="{28A0092B-C50C-407E-A947-70E740481C1C}">
+                <a14:useLocalDpi xmlns:a14="http://schemas.microsoft.com/office/drawing/2010/main" val="0"/>
+              </a:ext>
+            </a:extLst>
+          </a:blip>
+          <a:stretch>
+            <a:fillRect/>
+          </a:stretch>
+        </p:blipFill>
+        <p:spPr>
+          <a:xfrm>
+            <a:off x="596163" y="1940654"/>
+            <a:ext cx="8107680" cy="2156460"/>
+          </a:xfrm>
+          <a:prstGeom prst="rect">
+            <a:avLst/>
+          </a:prstGeom>
+        </p:spPr>
+      </p:pic>
+      <p:pic>
+        <p:nvPicPr>
+          <p:cNvPr id="5" name="Grafik 4"/>
+          <p:cNvPicPr>
+            <a:picLocks noChangeAspect="1"/>
+          </p:cNvPicPr>
+          <p:nvPr/>
+        </p:nvPicPr>
+        <p:blipFill>
+          <a:blip r:embed="rId3">
+            <a:extLst>
+              <a:ext uri="{28A0092B-C50C-407E-A947-70E740481C1C}">
+                <a14:useLocalDpi xmlns:a14="http://schemas.microsoft.com/office/drawing/2010/main" val="0"/>
+              </a:ext>
+            </a:extLst>
+          </a:blip>
+          <a:stretch>
+            <a:fillRect/>
+          </a:stretch>
+        </p:blipFill>
+        <p:spPr>
+          <a:xfrm>
+            <a:off x="613206" y="4897270"/>
+            <a:ext cx="8073594" cy="1960730"/>
+          </a:xfrm>
+          <a:prstGeom prst="rect">
+            <a:avLst/>
+          </a:prstGeom>
+        </p:spPr>
+      </p:pic>
+      <p:sp>
+        <p:nvSpPr>
+          <p:cNvPr id="6" name="Textfeld 5"/>
+          <p:cNvSpPr txBox="1"/>
+          <p:nvPr/>
+        </p:nvSpPr>
+        <p:spPr>
+          <a:xfrm>
+            <a:off x="3347864" y="4435464"/>
+            <a:ext cx="2448272" cy="369332"/>
+          </a:xfrm>
+          <a:prstGeom prst="rect">
+            <a:avLst/>
+          </a:prstGeom>
+          <a:noFill/>
+        </p:spPr>
+        <p:txBody>
+          <a:bodyPr wrap="square" rtlCol="0">
+            <a:spAutoFit/>
+          </a:bodyPr>
+          <a:lstStyle/>
+          <a:p>
+            <a:r>
+              <a:rPr lang="en-GB" dirty="0" err="1" smtClean="0"/>
+              <a:t>Aufruf</a:t>
+            </a:r>
+            <a:r>
+              <a:rPr lang="en-GB" dirty="0" smtClean="0"/>
+              <a:t> der </a:t>
+            </a:r>
+            <a:r>
+              <a:rPr lang="en-GB" dirty="0" err="1" smtClean="0"/>
+              <a:t>Methode</a:t>
+            </a:r>
+            <a:endParaRPr lang="en-GB" dirty="0"/>
           </a:p>
         </p:txBody>
       </p:sp>
     </p:spTree>
     <p:extLst>
       <p:ext uri="{BB962C8B-B14F-4D97-AF65-F5344CB8AC3E}">
-        <p14:creationId xmlns:p14="http://schemas.microsoft.com/office/powerpoint/2010/main" val="3459893387"/>
+        <p14:creationId xmlns:p14="http://schemas.microsoft.com/office/powerpoint/2010/main" val="3880234993"/>
       </p:ext>
     </p:extLst>
   </p:cSld>
   <p:clrMapOvr>
     <a:masterClrMapping/>
   </p:clrMapOvr>
+  <p:timing>
+    <p:tnLst>
+      <p:par>
+        <p:cTn id="1" dur="indefinite" restart="never" nodeType="tmRoot"/>
+      </p:par>
+    </p:tnLst>
+  </p:timing>
+</p:sld>
+</file>
+
+<file path=ppt/slides/slide8.xml><?xml version="1.0" encoding="utf-8"?>
+<p:sld xmlns:a="http://schemas.openxmlformats.org/drawingml/2006/main" xmlns:r="http://schemas.openxmlformats.org/officeDocument/2006/relationships" xmlns:p="http://schemas.openxmlformats.org/presentationml/2006/main">
+  <p:cSld>
+    <p:spTree>
+      <p:nvGrpSpPr>
+        <p:cNvPr id="1" name=""/>
+        <p:cNvGrpSpPr/>
+        <p:nvPr/>
+      </p:nvGrpSpPr>
+      <p:grpSpPr>
+        <a:xfrm>
+          <a:off x="0" y="0"/>
+          <a:ext cx="0" cy="0"/>
+          <a:chOff x="0" y="0"/>
+          <a:chExt cx="0" cy="0"/>
+        </a:xfrm>
+      </p:grpSpPr>
+      <p:sp>
+        <p:nvSpPr>
+          <p:cNvPr id="2" name="Inhaltsplatzhalter 1"/>
+          <p:cNvSpPr>
+            <a:spLocks noGrp="1"/>
+          </p:cNvSpPr>
+          <p:nvPr>
+            <p:ph idx="1"/>
+          </p:nvPr>
+        </p:nvSpPr>
+        <p:spPr/>
+        <p:txBody>
+          <a:bodyPr/>
+          <a:lstStyle/>
+          <a:p>
+            <a:r>
+              <a:rPr lang="de-CH" dirty="0" err="1" smtClean="0"/>
+              <a:t>Deleting</a:t>
+            </a:r>
+            <a:r>
+              <a:rPr lang="de-CH" dirty="0" smtClean="0"/>
+              <a:t> a </a:t>
+            </a:r>
+            <a:r>
+              <a:rPr lang="de-CH" dirty="0" err="1" smtClean="0"/>
+              <a:t>new</a:t>
+            </a:r>
+            <a:r>
+              <a:rPr lang="de-CH" dirty="0" smtClean="0"/>
+              <a:t> </a:t>
+            </a:r>
+            <a:r>
+              <a:rPr lang="de-CH" dirty="0" err="1" smtClean="0"/>
+              <a:t>prescription</a:t>
+            </a:r>
+            <a:endParaRPr lang="de-CH" dirty="0" smtClean="0"/>
+          </a:p>
+          <a:p>
+            <a:endParaRPr lang="de-CH" dirty="0"/>
+          </a:p>
+          <a:p>
+            <a:endParaRPr lang="de-CH" dirty="0" smtClean="0"/>
+          </a:p>
+          <a:p>
+            <a:pPr marL="109728" indent="0">
+              <a:buNone/>
+            </a:pPr>
+            <a:endParaRPr lang="de-CH" dirty="0" smtClean="0"/>
+          </a:p>
+          <a:p>
+            <a:pPr marL="109728" indent="0">
+              <a:buNone/>
+            </a:pPr>
+            <a:endParaRPr lang="de-CH" dirty="0"/>
+          </a:p>
+        </p:txBody>
+      </p:sp>
+      <p:sp>
+        <p:nvSpPr>
+          <p:cNvPr id="3" name="Titel 2"/>
+          <p:cNvSpPr>
+            <a:spLocks noGrp="1"/>
+          </p:cNvSpPr>
+          <p:nvPr>
+            <p:ph type="title"/>
+          </p:nvPr>
+        </p:nvSpPr>
+        <p:spPr/>
+        <p:txBody>
+          <a:bodyPr/>
+          <a:lstStyle/>
+          <a:p>
+            <a:r>
+              <a:rPr lang="de-CH" dirty="0" err="1" smtClean="0"/>
+              <a:t>Contribution</a:t>
+            </a:r>
+            <a:r>
+              <a:rPr lang="de-CH" dirty="0" smtClean="0"/>
+              <a:t> </a:t>
+            </a:r>
+            <a:r>
+              <a:rPr lang="de-CH" dirty="0" smtClean="0"/>
+              <a:t>Michel Murbach</a:t>
+            </a:r>
+            <a:endParaRPr lang="de-CH" dirty="0"/>
+          </a:p>
+        </p:txBody>
+      </p:sp>
+      <p:pic>
+        <p:nvPicPr>
+          <p:cNvPr id="7" name="Grafik 6"/>
+          <p:cNvPicPr>
+            <a:picLocks noChangeAspect="1"/>
+          </p:cNvPicPr>
+          <p:nvPr/>
+        </p:nvPicPr>
+        <p:blipFill>
+          <a:blip r:embed="rId2">
+            <a:extLst>
+              <a:ext uri="{28A0092B-C50C-407E-A947-70E740481C1C}">
+                <a14:useLocalDpi xmlns:a14="http://schemas.microsoft.com/office/drawing/2010/main" val="0"/>
+              </a:ext>
+            </a:extLst>
+          </a:blip>
+          <a:stretch>
+            <a:fillRect/>
+          </a:stretch>
+        </p:blipFill>
+        <p:spPr>
+          <a:xfrm>
+            <a:off x="1547664" y="1988840"/>
+            <a:ext cx="6386049" cy="4869160"/>
+          </a:xfrm>
+          <a:prstGeom prst="rect">
+            <a:avLst/>
+          </a:prstGeom>
+        </p:spPr>
+      </p:pic>
+    </p:spTree>
+    <p:extLst>
+      <p:ext uri="{BB962C8B-B14F-4D97-AF65-F5344CB8AC3E}">
+        <p14:creationId xmlns:p14="http://schemas.microsoft.com/office/powerpoint/2010/main" val="129360929"/>
+      </p:ext>
+    </p:extLst>
+  </p:cSld>
+  <p:clrMapOvr>
+    <a:masterClrMapping/>
+  </p:clrMapOvr>
+  <p:timing>
+    <p:tnLst>
+      <p:par>
+        <p:cTn id="1" dur="indefinite" restart="never" nodeType="tmRoot"/>
+      </p:par>
+    </p:tnLst>
+  </p:timing>
+</p:sld>
+</file>
+
+<file path=ppt/slides/slide9.xml><?xml version="1.0" encoding="utf-8"?>
+<p:sld xmlns:a="http://schemas.openxmlformats.org/drawingml/2006/main" xmlns:r="http://schemas.openxmlformats.org/officeDocument/2006/relationships" xmlns:p="http://schemas.openxmlformats.org/presentationml/2006/main">
+  <p:cSld>
+    <p:spTree>
+      <p:nvGrpSpPr>
+        <p:cNvPr id="1" name=""/>
+        <p:cNvGrpSpPr/>
+        <p:nvPr/>
+      </p:nvGrpSpPr>
+      <p:grpSpPr>
+        <a:xfrm>
+          <a:off x="0" y="0"/>
+          <a:ext cx="0" cy="0"/>
+          <a:chOff x="0" y="0"/>
+          <a:chExt cx="0" cy="0"/>
+        </a:xfrm>
+      </p:grpSpPr>
+      <p:sp>
+        <p:nvSpPr>
+          <p:cNvPr id="2" name="Inhaltsplatzhalter 1"/>
+          <p:cNvSpPr>
+            <a:spLocks noGrp="1"/>
+          </p:cNvSpPr>
+          <p:nvPr>
+            <p:ph idx="1"/>
+          </p:nvPr>
+        </p:nvSpPr>
+        <p:spPr/>
+        <p:txBody>
+          <a:bodyPr/>
+          <a:lstStyle/>
+          <a:p>
+            <a:r>
+              <a:rPr lang="de-CH" dirty="0" err="1" smtClean="0"/>
+              <a:t>Deleting</a:t>
+            </a:r>
+            <a:r>
+              <a:rPr lang="de-CH" dirty="0" smtClean="0"/>
+              <a:t> a </a:t>
+            </a:r>
+            <a:r>
+              <a:rPr lang="de-CH" dirty="0" err="1" smtClean="0"/>
+              <a:t>new</a:t>
+            </a:r>
+            <a:r>
+              <a:rPr lang="de-CH" dirty="0" smtClean="0"/>
+              <a:t> </a:t>
+            </a:r>
+            <a:r>
+              <a:rPr lang="de-CH" dirty="0" err="1" smtClean="0"/>
+              <a:t>prescription</a:t>
+            </a:r>
+            <a:endParaRPr lang="de-CH" dirty="0" smtClean="0"/>
+          </a:p>
+          <a:p>
+            <a:endParaRPr lang="de-CH" dirty="0"/>
+          </a:p>
+          <a:p>
+            <a:endParaRPr lang="de-CH" dirty="0" smtClean="0"/>
+          </a:p>
+          <a:p>
+            <a:pPr marL="109728" indent="0">
+              <a:buNone/>
+            </a:pPr>
+            <a:endParaRPr lang="de-CH" dirty="0" smtClean="0"/>
+          </a:p>
+          <a:p>
+            <a:pPr marL="109728" indent="0">
+              <a:buNone/>
+            </a:pPr>
+            <a:endParaRPr lang="de-CH" dirty="0"/>
+          </a:p>
+        </p:txBody>
+      </p:sp>
+      <p:sp>
+        <p:nvSpPr>
+          <p:cNvPr id="3" name="Titel 2"/>
+          <p:cNvSpPr>
+            <a:spLocks noGrp="1"/>
+          </p:cNvSpPr>
+          <p:nvPr>
+            <p:ph type="title"/>
+          </p:nvPr>
+        </p:nvSpPr>
+        <p:spPr/>
+        <p:txBody>
+          <a:bodyPr/>
+          <a:lstStyle/>
+          <a:p>
+            <a:r>
+              <a:rPr lang="de-CH" dirty="0" err="1" smtClean="0"/>
+              <a:t>Contribution</a:t>
+            </a:r>
+            <a:r>
+              <a:rPr lang="de-CH" dirty="0" smtClean="0"/>
+              <a:t> </a:t>
+            </a:r>
+            <a:r>
+              <a:rPr lang="de-CH" dirty="0" smtClean="0"/>
+              <a:t>Michel Murbach</a:t>
+            </a:r>
+            <a:endParaRPr lang="de-CH" dirty="0"/>
+          </a:p>
+        </p:txBody>
+      </p:sp>
+      <p:pic>
+        <p:nvPicPr>
+          <p:cNvPr id="4" name="Grafik 3"/>
+          <p:cNvPicPr>
+            <a:picLocks noChangeAspect="1"/>
+          </p:cNvPicPr>
+          <p:nvPr/>
+        </p:nvPicPr>
+        <p:blipFill>
+          <a:blip r:embed="rId2">
+            <a:extLst>
+              <a:ext uri="{28A0092B-C50C-407E-A947-70E740481C1C}">
+                <a14:useLocalDpi xmlns:a14="http://schemas.microsoft.com/office/drawing/2010/main" val="0"/>
+              </a:ext>
+            </a:extLst>
+          </a:blip>
+          <a:stretch>
+            <a:fillRect/>
+          </a:stretch>
+        </p:blipFill>
+        <p:spPr>
+          <a:xfrm>
+            <a:off x="794566" y="2132856"/>
+            <a:ext cx="7554868" cy="3615680"/>
+          </a:xfrm>
+          <a:prstGeom prst="rect">
+            <a:avLst/>
+          </a:prstGeom>
+        </p:spPr>
+      </p:pic>
+      <p:sp>
+        <p:nvSpPr>
+          <p:cNvPr id="5" name="Rechteck 4"/>
+          <p:cNvSpPr/>
+          <p:nvPr/>
+        </p:nvSpPr>
+        <p:spPr>
+          <a:xfrm>
+            <a:off x="2411760" y="5301208"/>
+            <a:ext cx="4896544" cy="360040"/>
+          </a:xfrm>
+          <a:prstGeom prst="rect">
+            <a:avLst/>
+          </a:prstGeom>
+          <a:noFill/>
+          <a:ln>
+            <a:solidFill>
+              <a:schemeClr val="accent2"/>
+            </a:solidFill>
+          </a:ln>
+        </p:spPr>
+        <p:style>
+          <a:lnRef idx="2">
+            <a:schemeClr val="accent1">
+              <a:shade val="50000"/>
+            </a:schemeClr>
+          </a:lnRef>
+          <a:fillRef idx="1">
+            <a:schemeClr val="accent1"/>
+          </a:fillRef>
+          <a:effectRef idx="0">
+            <a:schemeClr val="accent1"/>
+          </a:effectRef>
+          <a:fontRef idx="minor">
+            <a:schemeClr val="lt1"/>
+          </a:fontRef>
+        </p:style>
+        <p:txBody>
+          <a:bodyPr rtlCol="0" anchor="ctr"/>
+          <a:lstStyle/>
+          <a:p>
+            <a:pPr algn="ctr"/>
+            <a:endParaRPr lang="en-GB"/>
+          </a:p>
+        </p:txBody>
+      </p:sp>
+    </p:spTree>
+    <p:extLst>
+      <p:ext uri="{BB962C8B-B14F-4D97-AF65-F5344CB8AC3E}">
+        <p14:creationId xmlns:p14="http://schemas.microsoft.com/office/powerpoint/2010/main" val="2381130454"/>
+      </p:ext>
+    </p:extLst>
+  </p:cSld>
+  <p:clrMapOvr>
+    <a:masterClrMapping/>
+  </p:clrMapOvr>
+  <p:timing>
+    <p:tnLst>
+      <p:par>
+        <p:cTn id="1" dur="indefinite" restart="never" nodeType="tmRoot"/>
+      </p:par>
+    </p:tnLst>
+  </p:timing>
 </p:sld>
 </file>
 

</xml_diff>

<commit_message>
Inhalte aufgeführt. Welche Codestelle bin ich noch nicht ganz sicher... Sorry für den späten upload
</commit_message>
<xml_diff>
--- a/Documents/Task 14/Task 14.pptx
+++ b/Documents/Task 14/Task 14.pptx
@@ -751,7 +751,7 @@
           <a:p>
             <a:fld id="{47B9CC14-C19A-4133-BA5B-215623135375}" type="datetimeFigureOut">
               <a:rPr lang="de-CH" smtClean="0"/>
-              <a:t>20.01.2016</a:t>
+              <a:t>21.01.16</a:t>
             </a:fld>
             <a:endParaRPr lang="de-CH"/>
           </a:p>
@@ -941,7 +941,7 @@
           <a:p>
             <a:fld id="{47B9CC14-C19A-4133-BA5B-215623135375}" type="datetimeFigureOut">
               <a:rPr lang="de-CH" smtClean="0"/>
-              <a:t>20.01.2016</a:t>
+              <a:t>21.01.16</a:t>
             </a:fld>
             <a:endParaRPr lang="de-CH"/>
           </a:p>
@@ -1116,7 +1116,7 @@
           <a:p>
             <a:fld id="{47B9CC14-C19A-4133-BA5B-215623135375}" type="datetimeFigureOut">
               <a:rPr lang="de-CH" smtClean="0"/>
-              <a:t>20.01.2016</a:t>
+              <a:t>21.01.16</a:t>
             </a:fld>
             <a:endParaRPr lang="de-CH"/>
           </a:p>
@@ -1258,7 +1258,7 @@
           <a:p>
             <a:fld id="{47B9CC14-C19A-4133-BA5B-215623135375}" type="datetimeFigureOut">
               <a:rPr lang="de-CH" smtClean="0"/>
-              <a:t>20.01.2016</a:t>
+              <a:t>21.01.16</a:t>
             </a:fld>
             <a:endParaRPr lang="de-CH"/>
           </a:p>
@@ -1505,7 +1505,7 @@
           <a:p>
             <a:fld id="{47B9CC14-C19A-4133-BA5B-215623135375}" type="datetimeFigureOut">
               <a:rPr lang="de-CH" smtClean="0"/>
-              <a:t>20.01.2016</a:t>
+              <a:t>21.01.16</a:t>
             </a:fld>
             <a:endParaRPr lang="de-CH"/>
           </a:p>
@@ -1904,7 +1904,7 @@
           <a:p>
             <a:fld id="{47B9CC14-C19A-4133-BA5B-215623135375}" type="datetimeFigureOut">
               <a:rPr lang="de-CH" smtClean="0"/>
-              <a:t>20.01.2016</a:t>
+              <a:t>21.01.16</a:t>
             </a:fld>
             <a:endParaRPr lang="de-CH"/>
           </a:p>
@@ -2342,7 +2342,7 @@
           <a:p>
             <a:fld id="{47B9CC14-C19A-4133-BA5B-215623135375}" type="datetimeFigureOut">
               <a:rPr lang="de-CH" smtClean="0"/>
-              <a:t>20.01.2016</a:t>
+              <a:t>21.01.16</a:t>
             </a:fld>
             <a:endParaRPr lang="de-CH"/>
           </a:p>
@@ -2437,7 +2437,7 @@
           <a:p>
             <a:fld id="{47B9CC14-C19A-4133-BA5B-215623135375}" type="datetimeFigureOut">
               <a:rPr lang="de-CH" smtClean="0"/>
-              <a:t>20.01.2016</a:t>
+              <a:t>21.01.16</a:t>
             </a:fld>
             <a:endParaRPr lang="de-CH"/>
           </a:p>
@@ -2550,7 +2550,7 @@
           <a:p>
             <a:fld id="{47B9CC14-C19A-4133-BA5B-215623135375}" type="datetimeFigureOut">
               <a:rPr lang="de-CH" smtClean="0"/>
-              <a:t>20.01.2016</a:t>
+              <a:t>21.01.16</a:t>
             </a:fld>
             <a:endParaRPr lang="de-CH"/>
           </a:p>
@@ -2818,7 +2818,7 @@
           <a:p>
             <a:fld id="{47B9CC14-C19A-4133-BA5B-215623135375}" type="datetimeFigureOut">
               <a:rPr lang="de-CH" smtClean="0"/>
-              <a:t>20.01.2016</a:t>
+              <a:t>21.01.16</a:t>
             </a:fld>
             <a:endParaRPr lang="de-CH"/>
           </a:p>
@@ -3019,7 +3019,7 @@
           <a:p>
             <a:fld id="{47B9CC14-C19A-4133-BA5B-215623135375}" type="datetimeFigureOut">
               <a:rPr lang="de-CH" smtClean="0"/>
-              <a:t>20.01.2016</a:t>
+              <a:t>21.01.16</a:t>
             </a:fld>
             <a:endParaRPr lang="de-CH"/>
           </a:p>
@@ -4108,7 +4108,7 @@
           <a:p>
             <a:fld id="{47B9CC14-C19A-4133-BA5B-215623135375}" type="datetimeFigureOut">
               <a:rPr lang="de-CH" smtClean="0"/>
-              <a:t>20.01.2016</a:t>
+              <a:t>21.01.16</a:t>
             </a:fld>
             <a:endParaRPr lang="de-CH"/>
           </a:p>
@@ -4536,14 +4536,10 @@
           <a:lstStyle/>
           <a:p>
             <a:r>
-              <a:rPr lang="de-CH" dirty="0" smtClean="0"/>
-              <a:t>Task 14: Final </a:t>
-            </a:r>
-            <a:r>
-              <a:rPr lang="de-CH" dirty="0" err="1" smtClean="0"/>
-              <a:t>Presentation</a:t>
-            </a:r>
-            <a:endParaRPr lang="de-CH" dirty="0"/>
+              <a:rPr lang="en-US" dirty="0" smtClean="0"/>
+              <a:t>Task 14: Final Presentation</a:t>
+            </a:r>
+            <a:endParaRPr lang="en-US" dirty="0"/>
           </a:p>
         </p:txBody>
       </p:sp>
@@ -4681,11 +4677,7 @@
             </a:r>
             <a:r>
               <a:rPr lang="de-CH" dirty="0" smtClean="0"/>
-              <a:t> </a:t>
-            </a:r>
-            <a:r>
-              <a:rPr lang="de-CH" dirty="0" smtClean="0"/>
-              <a:t>Michel Murbach</a:t>
+              <a:t> Michel Murbach</a:t>
             </a:r>
             <a:endParaRPr lang="de-CH" dirty="0"/>
           </a:p>
@@ -4882,11 +4874,7 @@
             </a:r>
             <a:r>
               <a:rPr lang="de-CH" dirty="0" smtClean="0"/>
-              <a:t> </a:t>
-            </a:r>
-            <a:r>
-              <a:rPr lang="de-CH" dirty="0" smtClean="0"/>
-              <a:t>Michel Murbach</a:t>
+              <a:t> Michel Murbach</a:t>
             </a:r>
             <a:endParaRPr lang="de-CH" dirty="0"/>
           </a:p>
@@ -4974,7 +4962,123 @@
           <a:bodyPr/>
           <a:lstStyle/>
           <a:p>
-            <a:endParaRPr lang="de-CH"/>
+            <a:r>
+              <a:rPr lang="de-CH" dirty="0" err="1" smtClean="0"/>
+              <a:t>Creating</a:t>
+            </a:r>
+            <a:r>
+              <a:rPr lang="de-CH" dirty="0" smtClean="0"/>
+              <a:t> </a:t>
+            </a:r>
+            <a:r>
+              <a:rPr lang="de-CH" dirty="0" err="1" smtClean="0"/>
+              <a:t>Overview</a:t>
+            </a:r>
+            <a:r>
+              <a:rPr lang="de-CH" dirty="0" smtClean="0"/>
+              <a:t> </a:t>
+            </a:r>
+            <a:r>
+              <a:rPr lang="de-CH" dirty="0" err="1" smtClean="0"/>
+              <a:t>of</a:t>
+            </a:r>
+            <a:r>
+              <a:rPr lang="de-CH" dirty="0" smtClean="0"/>
+              <a:t> </a:t>
+            </a:r>
+            <a:r>
+              <a:rPr lang="de-CH" dirty="0" err="1" smtClean="0"/>
+              <a:t>Medication</a:t>
+            </a:r>
+            <a:endParaRPr lang="de-CH" dirty="0"/>
+          </a:p>
+          <a:p>
+            <a:r>
+              <a:rPr lang="de-CH" dirty="0" smtClean="0"/>
+              <a:t>Styling all Element </a:t>
+            </a:r>
+            <a:r>
+              <a:rPr lang="de-CH" dirty="0" err="1" smtClean="0"/>
+              <a:t>with</a:t>
+            </a:r>
+            <a:r>
+              <a:rPr lang="de-CH" dirty="0" smtClean="0"/>
+              <a:t> </a:t>
+            </a:r>
+            <a:r>
+              <a:rPr lang="de-CH" dirty="0" err="1" smtClean="0"/>
+              <a:t>mytheme.scss</a:t>
+            </a:r>
+            <a:endParaRPr lang="de-CH" dirty="0"/>
+          </a:p>
+          <a:p>
+            <a:r>
+              <a:rPr lang="de-CH" dirty="0" smtClean="0"/>
+              <a:t>Support </a:t>
+            </a:r>
+            <a:r>
+              <a:rPr lang="de-CH" dirty="0"/>
+              <a:t>/ Pair </a:t>
+            </a:r>
+            <a:r>
+              <a:rPr lang="de-CH" dirty="0" err="1" smtClean="0"/>
+              <a:t>Programming</a:t>
+            </a:r>
+            <a:r>
+              <a:rPr lang="de-CH" dirty="0" smtClean="0"/>
+              <a:t> </a:t>
+            </a:r>
+            <a:r>
+              <a:rPr lang="de-CH" dirty="0" err="1" smtClean="0"/>
+              <a:t>other</a:t>
+            </a:r>
+            <a:r>
+              <a:rPr lang="de-CH" dirty="0" smtClean="0"/>
+              <a:t> </a:t>
+            </a:r>
+            <a:r>
+              <a:rPr lang="de-CH" dirty="0" err="1" smtClean="0"/>
+              <a:t>Teammembers</a:t>
+            </a:r>
+            <a:endParaRPr lang="de-CH" dirty="0" smtClean="0"/>
+          </a:p>
+          <a:p>
+            <a:r>
+              <a:rPr lang="de-CH" dirty="0" smtClean="0"/>
+              <a:t>Test </a:t>
+            </a:r>
+            <a:r>
+              <a:rPr lang="de-CH" dirty="0" err="1" smtClean="0"/>
+              <a:t>Classes</a:t>
+            </a:r>
+            <a:r>
+              <a:rPr lang="de-CH" dirty="0" smtClean="0"/>
+              <a:t> </a:t>
+            </a:r>
+            <a:r>
+              <a:rPr lang="de-CH" dirty="0" err="1" smtClean="0"/>
+              <a:t>MsssqlRepository</a:t>
+            </a:r>
+            <a:r>
+              <a:rPr lang="de-CH" dirty="0" smtClean="0"/>
+              <a:t> </a:t>
+            </a:r>
+            <a:r>
+              <a:rPr lang="de-CH" dirty="0" err="1" smtClean="0"/>
+              <a:t>and</a:t>
+            </a:r>
+            <a:r>
+              <a:rPr lang="de-CH" dirty="0" smtClean="0"/>
+              <a:t> </a:t>
+            </a:r>
+            <a:r>
+              <a:rPr lang="de-CH" dirty="0" err="1" smtClean="0"/>
+              <a:t>PerscriptionRepository</a:t>
+            </a:r>
+            <a:endParaRPr lang="de-CH" dirty="0"/>
+          </a:p>
+          <a:p>
+            <a:endParaRPr lang="de-CH" dirty="0"/>
           </a:p>
         </p:txBody>
       </p:sp>
@@ -4993,7 +5097,15 @@
           <a:bodyPr/>
           <a:lstStyle/>
           <a:p>
-            <a:endParaRPr lang="de-CH"/>
+            <a:r>
+              <a:rPr lang="de-CH" dirty="0" err="1" smtClean="0"/>
+              <a:t>Contribution</a:t>
+            </a:r>
+            <a:r>
+              <a:rPr lang="de-CH" dirty="0" smtClean="0"/>
+              <a:t> Carole Kaiser</a:t>
+            </a:r>
+            <a:endParaRPr lang="de-CH" dirty="0"/>
           </a:p>
         </p:txBody>
       </p:sp>
@@ -5761,11 +5873,7 @@
             </a:r>
             <a:r>
               <a:rPr lang="de-CH" dirty="0" smtClean="0"/>
-              <a:t> </a:t>
-            </a:r>
-            <a:r>
-              <a:rPr lang="de-CH" dirty="0" smtClean="0"/>
-              <a:t>Michel Murbach</a:t>
+              <a:t> Michel Murbach</a:t>
             </a:r>
             <a:endParaRPr lang="de-CH" dirty="0"/>
           </a:p>
@@ -5984,11 +6092,7 @@
             </a:r>
             <a:r>
               <a:rPr lang="de-CH" dirty="0" smtClean="0"/>
-              <a:t> </a:t>
-            </a:r>
-            <a:r>
-              <a:rPr lang="de-CH" dirty="0" smtClean="0"/>
-              <a:t>Michel Murbach</a:t>
+              <a:t> Michel Murbach</a:t>
             </a:r>
             <a:endParaRPr lang="de-CH" dirty="0"/>
           </a:p>
@@ -6139,11 +6243,7 @@
             </a:r>
             <a:r>
               <a:rPr lang="de-CH" dirty="0" smtClean="0"/>
-              <a:t> </a:t>
-            </a:r>
-            <a:r>
-              <a:rPr lang="de-CH" dirty="0" smtClean="0"/>
-              <a:t>Michel Murbach</a:t>
+              <a:t> Michel Murbach</a:t>
             </a:r>
             <a:endParaRPr lang="de-CH" dirty="0"/>
           </a:p>

</xml_diff>

<commit_message>
Task 14 part from Mete Turna
</commit_message>
<xml_diff>
--- a/Documents/Task 14/Task 14.pptx
+++ b/Documents/Task 14/Task 14.pptx
@@ -11,12 +11,15 @@
     <p:sldId id="261" r:id="rId5"/>
     <p:sldId id="264" r:id="rId6"/>
     <p:sldId id="262" r:id="rId7"/>
-    <p:sldId id="265" r:id="rId8"/>
-    <p:sldId id="266" r:id="rId9"/>
-    <p:sldId id="267" r:id="rId10"/>
-    <p:sldId id="268" r:id="rId11"/>
-    <p:sldId id="269" r:id="rId12"/>
-    <p:sldId id="263" r:id="rId13"/>
+    <p:sldId id="270" r:id="rId8"/>
+    <p:sldId id="271" r:id="rId9"/>
+    <p:sldId id="272" r:id="rId10"/>
+    <p:sldId id="265" r:id="rId11"/>
+    <p:sldId id="266" r:id="rId12"/>
+    <p:sldId id="267" r:id="rId13"/>
+    <p:sldId id="268" r:id="rId14"/>
+    <p:sldId id="269" r:id="rId15"/>
+    <p:sldId id="263" r:id="rId16"/>
   </p:sldIdLst>
   <p:sldSz cx="9144000" cy="6858000" type="screen4x3"/>
   <p:notesSz cx="6858000" cy="9144000"/>
@@ -751,7 +754,7 @@
           <a:p>
             <a:fld id="{47B9CC14-C19A-4133-BA5B-215623135375}" type="datetimeFigureOut">
               <a:rPr lang="de-CH" smtClean="0"/>
-              <a:t>21.01.16</a:t>
+              <a:t>tt.01.jjjj</a:t>
             </a:fld>
             <a:endParaRPr lang="de-CH"/>
           </a:p>
@@ -941,7 +944,7 @@
           <a:p>
             <a:fld id="{47B9CC14-C19A-4133-BA5B-215623135375}" type="datetimeFigureOut">
               <a:rPr lang="de-CH" smtClean="0"/>
-              <a:t>21.01.16</a:t>
+              <a:t>tt.01.jjjj</a:t>
             </a:fld>
             <a:endParaRPr lang="de-CH"/>
           </a:p>
@@ -1116,7 +1119,7 @@
           <a:p>
             <a:fld id="{47B9CC14-C19A-4133-BA5B-215623135375}" type="datetimeFigureOut">
               <a:rPr lang="de-CH" smtClean="0"/>
-              <a:t>21.01.16</a:t>
+              <a:t>tt.01.jjjj</a:t>
             </a:fld>
             <a:endParaRPr lang="de-CH"/>
           </a:p>
@@ -1258,7 +1261,7 @@
           <a:p>
             <a:fld id="{47B9CC14-C19A-4133-BA5B-215623135375}" type="datetimeFigureOut">
               <a:rPr lang="de-CH" smtClean="0"/>
-              <a:t>21.01.16</a:t>
+              <a:t>tt.01.jjjj</a:t>
             </a:fld>
             <a:endParaRPr lang="de-CH"/>
           </a:p>
@@ -1505,7 +1508,7 @@
           <a:p>
             <a:fld id="{47B9CC14-C19A-4133-BA5B-215623135375}" type="datetimeFigureOut">
               <a:rPr lang="de-CH" smtClean="0"/>
-              <a:t>21.01.16</a:t>
+              <a:t>tt.01.jjjj</a:t>
             </a:fld>
             <a:endParaRPr lang="de-CH"/>
           </a:p>
@@ -1904,7 +1907,7 @@
           <a:p>
             <a:fld id="{47B9CC14-C19A-4133-BA5B-215623135375}" type="datetimeFigureOut">
               <a:rPr lang="de-CH" smtClean="0"/>
-              <a:t>21.01.16</a:t>
+              <a:t>tt.01.jjjj</a:t>
             </a:fld>
             <a:endParaRPr lang="de-CH"/>
           </a:p>
@@ -2342,7 +2345,7 @@
           <a:p>
             <a:fld id="{47B9CC14-C19A-4133-BA5B-215623135375}" type="datetimeFigureOut">
               <a:rPr lang="de-CH" smtClean="0"/>
-              <a:t>21.01.16</a:t>
+              <a:t>tt.01.jjjj</a:t>
             </a:fld>
             <a:endParaRPr lang="de-CH"/>
           </a:p>
@@ -2437,7 +2440,7 @@
           <a:p>
             <a:fld id="{47B9CC14-C19A-4133-BA5B-215623135375}" type="datetimeFigureOut">
               <a:rPr lang="de-CH" smtClean="0"/>
-              <a:t>21.01.16</a:t>
+              <a:t>tt.01.jjjj</a:t>
             </a:fld>
             <a:endParaRPr lang="de-CH"/>
           </a:p>
@@ -2550,7 +2553,7 @@
           <a:p>
             <a:fld id="{47B9CC14-C19A-4133-BA5B-215623135375}" type="datetimeFigureOut">
               <a:rPr lang="de-CH" smtClean="0"/>
-              <a:t>21.01.16</a:t>
+              <a:t>tt.01.jjjj</a:t>
             </a:fld>
             <a:endParaRPr lang="de-CH"/>
           </a:p>
@@ -2818,7 +2821,7 @@
           <a:p>
             <a:fld id="{47B9CC14-C19A-4133-BA5B-215623135375}" type="datetimeFigureOut">
               <a:rPr lang="de-CH" smtClean="0"/>
-              <a:t>21.01.16</a:t>
+              <a:t>tt.01.jjjj</a:t>
             </a:fld>
             <a:endParaRPr lang="de-CH"/>
           </a:p>
@@ -3019,7 +3022,7 @@
           <a:p>
             <a:fld id="{47B9CC14-C19A-4133-BA5B-215623135375}" type="datetimeFigureOut">
               <a:rPr lang="de-CH" smtClean="0"/>
-              <a:t>21.01.16</a:t>
+              <a:t>tt.01.jjjj</a:t>
             </a:fld>
             <a:endParaRPr lang="de-CH"/>
           </a:p>
@@ -4108,7 +4111,7 @@
           <a:p>
             <a:fld id="{47B9CC14-C19A-4133-BA5B-215623135375}" type="datetimeFigureOut">
               <a:rPr lang="de-CH" smtClean="0"/>
-              <a:t>21.01.16</a:t>
+              <a:t>tt.01.jjjj</a:t>
             </a:fld>
             <a:endParaRPr lang="de-CH"/>
           </a:p>
@@ -4572,13 +4575,6 @@
   <p:clrMapOvr>
     <a:masterClrMapping/>
   </p:clrMapOvr>
-  <p:timing>
-    <p:tnLst>
-      <p:par>
-        <p:cTn id="1" dur="indefinite" restart="never" nodeType="tmRoot"/>
-      </p:par>
-    </p:tnLst>
-  </p:timing>
 </p:sld>
 </file>
 
@@ -4705,17 +4701,373 @@
         </p:blipFill>
         <p:spPr>
           <a:xfrm>
-            <a:off x="925244" y="2204864"/>
-            <a:ext cx="7293511" cy="3514395"/>
+            <a:off x="596163" y="1940654"/>
+            <a:ext cx="8107680" cy="2156460"/>
           </a:xfrm>
           <a:prstGeom prst="rect">
             <a:avLst/>
           </a:prstGeom>
         </p:spPr>
       </p:pic>
-      <p:sp>
-        <p:nvSpPr>
-          <p:cNvPr id="6" name="Rechteck 5"/>
+      <p:pic>
+        <p:nvPicPr>
+          <p:cNvPr id="5" name="Grafik 4"/>
+          <p:cNvPicPr>
+            <a:picLocks noChangeAspect="1"/>
+          </p:cNvPicPr>
+          <p:nvPr/>
+        </p:nvPicPr>
+        <p:blipFill>
+          <a:blip r:embed="rId3">
+            <a:extLst>
+              <a:ext uri="{28A0092B-C50C-407E-A947-70E740481C1C}">
+                <a14:useLocalDpi xmlns:a14="http://schemas.microsoft.com/office/drawing/2010/main" val="0"/>
+              </a:ext>
+            </a:extLst>
+          </a:blip>
+          <a:stretch>
+            <a:fillRect/>
+          </a:stretch>
+        </p:blipFill>
+        <p:spPr>
+          <a:xfrm>
+            <a:off x="613206" y="4897270"/>
+            <a:ext cx="8073594" cy="1960730"/>
+          </a:xfrm>
+          <a:prstGeom prst="rect">
+            <a:avLst/>
+          </a:prstGeom>
+        </p:spPr>
+      </p:pic>
+      <p:sp>
+        <p:nvSpPr>
+          <p:cNvPr id="6" name="Textfeld 5"/>
+          <p:cNvSpPr txBox="1"/>
+          <p:nvPr/>
+        </p:nvSpPr>
+        <p:spPr>
+          <a:xfrm>
+            <a:off x="3347864" y="4435464"/>
+            <a:ext cx="2448272" cy="369332"/>
+          </a:xfrm>
+          <a:prstGeom prst="rect">
+            <a:avLst/>
+          </a:prstGeom>
+          <a:noFill/>
+        </p:spPr>
+        <p:txBody>
+          <a:bodyPr wrap="square" rtlCol="0">
+            <a:spAutoFit/>
+          </a:bodyPr>
+          <a:lstStyle/>
+          <a:p>
+            <a:r>
+              <a:rPr lang="en-GB" dirty="0" err="1" smtClean="0"/>
+              <a:t>Aufruf</a:t>
+            </a:r>
+            <a:r>
+              <a:rPr lang="en-GB" dirty="0" smtClean="0"/>
+              <a:t> der </a:t>
+            </a:r>
+            <a:r>
+              <a:rPr lang="en-GB" dirty="0" err="1" smtClean="0"/>
+              <a:t>Methode</a:t>
+            </a:r>
+            <a:endParaRPr lang="en-GB" dirty="0"/>
+          </a:p>
+        </p:txBody>
+      </p:sp>
+    </p:spTree>
+    <p:extLst>
+      <p:ext uri="{BB962C8B-B14F-4D97-AF65-F5344CB8AC3E}">
+        <p14:creationId xmlns:p14="http://schemas.microsoft.com/office/powerpoint/2010/main" val="3880234993"/>
+      </p:ext>
+    </p:extLst>
+  </p:cSld>
+  <p:clrMapOvr>
+    <a:masterClrMapping/>
+  </p:clrMapOvr>
+</p:sld>
+</file>
+
+<file path=ppt/slides/slide11.xml><?xml version="1.0" encoding="utf-8"?>
+<p:sld xmlns:a="http://schemas.openxmlformats.org/drawingml/2006/main" xmlns:r="http://schemas.openxmlformats.org/officeDocument/2006/relationships" xmlns:p="http://schemas.openxmlformats.org/presentationml/2006/main">
+  <p:cSld>
+    <p:spTree>
+      <p:nvGrpSpPr>
+        <p:cNvPr id="1" name=""/>
+        <p:cNvGrpSpPr/>
+        <p:nvPr/>
+      </p:nvGrpSpPr>
+      <p:grpSpPr>
+        <a:xfrm>
+          <a:off x="0" y="0"/>
+          <a:ext cx="0" cy="0"/>
+          <a:chOff x="0" y="0"/>
+          <a:chExt cx="0" cy="0"/>
+        </a:xfrm>
+      </p:grpSpPr>
+      <p:sp>
+        <p:nvSpPr>
+          <p:cNvPr id="2" name="Inhaltsplatzhalter 1"/>
+          <p:cNvSpPr>
+            <a:spLocks noGrp="1"/>
+          </p:cNvSpPr>
+          <p:nvPr>
+            <p:ph idx="1"/>
+          </p:nvPr>
+        </p:nvSpPr>
+        <p:spPr/>
+        <p:txBody>
+          <a:bodyPr/>
+          <a:lstStyle/>
+          <a:p>
+            <a:r>
+              <a:rPr lang="de-CH" dirty="0" err="1" smtClean="0"/>
+              <a:t>Deleting</a:t>
+            </a:r>
+            <a:r>
+              <a:rPr lang="de-CH" dirty="0" smtClean="0"/>
+              <a:t> a </a:t>
+            </a:r>
+            <a:r>
+              <a:rPr lang="de-CH" dirty="0" err="1" smtClean="0"/>
+              <a:t>new</a:t>
+            </a:r>
+            <a:r>
+              <a:rPr lang="de-CH" dirty="0" smtClean="0"/>
+              <a:t> </a:t>
+            </a:r>
+            <a:r>
+              <a:rPr lang="de-CH" dirty="0" err="1" smtClean="0"/>
+              <a:t>prescription</a:t>
+            </a:r>
+            <a:endParaRPr lang="de-CH" dirty="0" smtClean="0"/>
+          </a:p>
+          <a:p>
+            <a:endParaRPr lang="de-CH" dirty="0"/>
+          </a:p>
+          <a:p>
+            <a:endParaRPr lang="de-CH" dirty="0" smtClean="0"/>
+          </a:p>
+          <a:p>
+            <a:pPr marL="109728" indent="0">
+              <a:buNone/>
+            </a:pPr>
+            <a:endParaRPr lang="de-CH" dirty="0" smtClean="0"/>
+          </a:p>
+          <a:p>
+            <a:pPr marL="109728" indent="0">
+              <a:buNone/>
+            </a:pPr>
+            <a:endParaRPr lang="de-CH" dirty="0"/>
+          </a:p>
+        </p:txBody>
+      </p:sp>
+      <p:sp>
+        <p:nvSpPr>
+          <p:cNvPr id="3" name="Titel 2"/>
+          <p:cNvSpPr>
+            <a:spLocks noGrp="1"/>
+          </p:cNvSpPr>
+          <p:nvPr>
+            <p:ph type="title"/>
+          </p:nvPr>
+        </p:nvSpPr>
+        <p:spPr/>
+        <p:txBody>
+          <a:bodyPr/>
+          <a:lstStyle/>
+          <a:p>
+            <a:r>
+              <a:rPr lang="de-CH" dirty="0" err="1" smtClean="0"/>
+              <a:t>Contribution</a:t>
+            </a:r>
+            <a:r>
+              <a:rPr lang="de-CH" dirty="0" smtClean="0"/>
+              <a:t> Michel Murbach</a:t>
+            </a:r>
+            <a:endParaRPr lang="de-CH" dirty="0"/>
+          </a:p>
+        </p:txBody>
+      </p:sp>
+      <p:pic>
+        <p:nvPicPr>
+          <p:cNvPr id="7" name="Grafik 6"/>
+          <p:cNvPicPr>
+            <a:picLocks noChangeAspect="1"/>
+          </p:cNvPicPr>
+          <p:nvPr/>
+        </p:nvPicPr>
+        <p:blipFill>
+          <a:blip r:embed="rId2">
+            <a:extLst>
+              <a:ext uri="{28A0092B-C50C-407E-A947-70E740481C1C}">
+                <a14:useLocalDpi xmlns:a14="http://schemas.microsoft.com/office/drawing/2010/main" val="0"/>
+              </a:ext>
+            </a:extLst>
+          </a:blip>
+          <a:stretch>
+            <a:fillRect/>
+          </a:stretch>
+        </p:blipFill>
+        <p:spPr>
+          <a:xfrm>
+            <a:off x="1547664" y="1988840"/>
+            <a:ext cx="6386049" cy="4869160"/>
+          </a:xfrm>
+          <a:prstGeom prst="rect">
+            <a:avLst/>
+          </a:prstGeom>
+        </p:spPr>
+      </p:pic>
+    </p:spTree>
+    <p:extLst>
+      <p:ext uri="{BB962C8B-B14F-4D97-AF65-F5344CB8AC3E}">
+        <p14:creationId xmlns:p14="http://schemas.microsoft.com/office/powerpoint/2010/main" val="129360929"/>
+      </p:ext>
+    </p:extLst>
+  </p:cSld>
+  <p:clrMapOvr>
+    <a:masterClrMapping/>
+  </p:clrMapOvr>
+</p:sld>
+</file>
+
+<file path=ppt/slides/slide12.xml><?xml version="1.0" encoding="utf-8"?>
+<p:sld xmlns:a="http://schemas.openxmlformats.org/drawingml/2006/main" xmlns:r="http://schemas.openxmlformats.org/officeDocument/2006/relationships" xmlns:p="http://schemas.openxmlformats.org/presentationml/2006/main">
+  <p:cSld>
+    <p:spTree>
+      <p:nvGrpSpPr>
+        <p:cNvPr id="1" name=""/>
+        <p:cNvGrpSpPr/>
+        <p:nvPr/>
+      </p:nvGrpSpPr>
+      <p:grpSpPr>
+        <a:xfrm>
+          <a:off x="0" y="0"/>
+          <a:ext cx="0" cy="0"/>
+          <a:chOff x="0" y="0"/>
+          <a:chExt cx="0" cy="0"/>
+        </a:xfrm>
+      </p:grpSpPr>
+      <p:sp>
+        <p:nvSpPr>
+          <p:cNvPr id="2" name="Inhaltsplatzhalter 1"/>
+          <p:cNvSpPr>
+            <a:spLocks noGrp="1"/>
+          </p:cNvSpPr>
+          <p:nvPr>
+            <p:ph idx="1"/>
+          </p:nvPr>
+        </p:nvSpPr>
+        <p:spPr/>
+        <p:txBody>
+          <a:bodyPr/>
+          <a:lstStyle/>
+          <a:p>
+            <a:r>
+              <a:rPr lang="de-CH" dirty="0" err="1" smtClean="0"/>
+              <a:t>Deleting</a:t>
+            </a:r>
+            <a:r>
+              <a:rPr lang="de-CH" dirty="0" smtClean="0"/>
+              <a:t> a </a:t>
+            </a:r>
+            <a:r>
+              <a:rPr lang="de-CH" dirty="0" err="1" smtClean="0"/>
+              <a:t>new</a:t>
+            </a:r>
+            <a:r>
+              <a:rPr lang="de-CH" dirty="0" smtClean="0"/>
+              <a:t> </a:t>
+            </a:r>
+            <a:r>
+              <a:rPr lang="de-CH" dirty="0" err="1" smtClean="0"/>
+              <a:t>prescription</a:t>
+            </a:r>
+            <a:endParaRPr lang="de-CH" dirty="0" smtClean="0"/>
+          </a:p>
+          <a:p>
+            <a:endParaRPr lang="de-CH" dirty="0"/>
+          </a:p>
+          <a:p>
+            <a:endParaRPr lang="de-CH" dirty="0" smtClean="0"/>
+          </a:p>
+          <a:p>
+            <a:pPr marL="109728" indent="0">
+              <a:buNone/>
+            </a:pPr>
+            <a:endParaRPr lang="de-CH" dirty="0" smtClean="0"/>
+          </a:p>
+          <a:p>
+            <a:pPr marL="109728" indent="0">
+              <a:buNone/>
+            </a:pPr>
+            <a:endParaRPr lang="de-CH" dirty="0"/>
+          </a:p>
+        </p:txBody>
+      </p:sp>
+      <p:sp>
+        <p:nvSpPr>
+          <p:cNvPr id="3" name="Titel 2"/>
+          <p:cNvSpPr>
+            <a:spLocks noGrp="1"/>
+          </p:cNvSpPr>
+          <p:nvPr>
+            <p:ph type="title"/>
+          </p:nvPr>
+        </p:nvSpPr>
+        <p:spPr/>
+        <p:txBody>
+          <a:bodyPr/>
+          <a:lstStyle/>
+          <a:p>
+            <a:r>
+              <a:rPr lang="de-CH" dirty="0" err="1" smtClean="0"/>
+              <a:t>Contribution</a:t>
+            </a:r>
+            <a:r>
+              <a:rPr lang="de-CH" dirty="0" smtClean="0"/>
+              <a:t> Michel Murbach</a:t>
+            </a:r>
+            <a:endParaRPr lang="de-CH" dirty="0"/>
+          </a:p>
+        </p:txBody>
+      </p:sp>
+      <p:pic>
+        <p:nvPicPr>
+          <p:cNvPr id="4" name="Grafik 3"/>
+          <p:cNvPicPr>
+            <a:picLocks noChangeAspect="1"/>
+          </p:cNvPicPr>
+          <p:nvPr/>
+        </p:nvPicPr>
+        <p:blipFill>
+          <a:blip r:embed="rId2">
+            <a:extLst>
+              <a:ext uri="{28A0092B-C50C-407E-A947-70E740481C1C}">
+                <a14:useLocalDpi xmlns:a14="http://schemas.microsoft.com/office/drawing/2010/main" val="0"/>
+              </a:ext>
+            </a:extLst>
+          </a:blip>
+          <a:stretch>
+            <a:fillRect/>
+          </a:stretch>
+        </p:blipFill>
+        <p:spPr>
+          <a:xfrm>
+            <a:off x="794566" y="2132856"/>
+            <a:ext cx="7554868" cy="3615680"/>
+          </a:xfrm>
+          <a:prstGeom prst="rect">
+            <a:avLst/>
+          </a:prstGeom>
+        </p:spPr>
+      </p:pic>
+      <p:sp>
+        <p:nvSpPr>
+          <p:cNvPr id="5" name="Rechteck 4"/>
           <p:cNvSpPr/>
           <p:nvPr/>
         </p:nvSpPr>
@@ -4762,6 +5114,196 @@
     </p:spTree>
     <p:extLst>
       <p:ext uri="{BB962C8B-B14F-4D97-AF65-F5344CB8AC3E}">
+        <p14:creationId xmlns:p14="http://schemas.microsoft.com/office/powerpoint/2010/main" val="2381130454"/>
+      </p:ext>
+    </p:extLst>
+  </p:cSld>
+  <p:clrMapOvr>
+    <a:masterClrMapping/>
+  </p:clrMapOvr>
+</p:sld>
+</file>
+
+<file path=ppt/slides/slide13.xml><?xml version="1.0" encoding="utf-8"?>
+<p:sld xmlns:a="http://schemas.openxmlformats.org/drawingml/2006/main" xmlns:r="http://schemas.openxmlformats.org/officeDocument/2006/relationships" xmlns:p="http://schemas.openxmlformats.org/presentationml/2006/main">
+  <p:cSld>
+    <p:spTree>
+      <p:nvGrpSpPr>
+        <p:cNvPr id="1" name=""/>
+        <p:cNvGrpSpPr/>
+        <p:nvPr/>
+      </p:nvGrpSpPr>
+      <p:grpSpPr>
+        <a:xfrm>
+          <a:off x="0" y="0"/>
+          <a:ext cx="0" cy="0"/>
+          <a:chOff x="0" y="0"/>
+          <a:chExt cx="0" cy="0"/>
+        </a:xfrm>
+      </p:grpSpPr>
+      <p:sp>
+        <p:nvSpPr>
+          <p:cNvPr id="2" name="Inhaltsplatzhalter 1"/>
+          <p:cNvSpPr>
+            <a:spLocks noGrp="1"/>
+          </p:cNvSpPr>
+          <p:nvPr>
+            <p:ph idx="1"/>
+          </p:nvPr>
+        </p:nvSpPr>
+        <p:spPr/>
+        <p:txBody>
+          <a:bodyPr/>
+          <a:lstStyle/>
+          <a:p>
+            <a:r>
+              <a:rPr lang="de-CH" dirty="0" err="1" smtClean="0"/>
+              <a:t>Deleting</a:t>
+            </a:r>
+            <a:r>
+              <a:rPr lang="de-CH" dirty="0" smtClean="0"/>
+              <a:t> a </a:t>
+            </a:r>
+            <a:r>
+              <a:rPr lang="de-CH" dirty="0" err="1" smtClean="0"/>
+              <a:t>new</a:t>
+            </a:r>
+            <a:r>
+              <a:rPr lang="de-CH" dirty="0" smtClean="0"/>
+              <a:t> </a:t>
+            </a:r>
+            <a:r>
+              <a:rPr lang="de-CH" dirty="0" err="1" smtClean="0"/>
+              <a:t>prescription</a:t>
+            </a:r>
+            <a:endParaRPr lang="de-CH" dirty="0" smtClean="0"/>
+          </a:p>
+          <a:p>
+            <a:endParaRPr lang="de-CH" dirty="0"/>
+          </a:p>
+          <a:p>
+            <a:endParaRPr lang="de-CH" dirty="0" smtClean="0"/>
+          </a:p>
+          <a:p>
+            <a:pPr marL="109728" indent="0">
+              <a:buNone/>
+            </a:pPr>
+            <a:endParaRPr lang="de-CH" dirty="0" smtClean="0"/>
+          </a:p>
+          <a:p>
+            <a:pPr marL="109728" indent="0">
+              <a:buNone/>
+            </a:pPr>
+            <a:endParaRPr lang="de-CH" dirty="0"/>
+          </a:p>
+        </p:txBody>
+      </p:sp>
+      <p:sp>
+        <p:nvSpPr>
+          <p:cNvPr id="3" name="Titel 2"/>
+          <p:cNvSpPr>
+            <a:spLocks noGrp="1"/>
+          </p:cNvSpPr>
+          <p:nvPr>
+            <p:ph type="title"/>
+          </p:nvPr>
+        </p:nvSpPr>
+        <p:spPr/>
+        <p:txBody>
+          <a:bodyPr/>
+          <a:lstStyle/>
+          <a:p>
+            <a:r>
+              <a:rPr lang="de-CH" dirty="0" err="1" smtClean="0"/>
+              <a:t>Contribution</a:t>
+            </a:r>
+            <a:r>
+              <a:rPr lang="de-CH" dirty="0" smtClean="0"/>
+              <a:t> Michel Murbach</a:t>
+            </a:r>
+            <a:endParaRPr lang="de-CH" dirty="0"/>
+          </a:p>
+        </p:txBody>
+      </p:sp>
+      <p:pic>
+        <p:nvPicPr>
+          <p:cNvPr id="4" name="Grafik 3"/>
+          <p:cNvPicPr>
+            <a:picLocks noChangeAspect="1"/>
+          </p:cNvPicPr>
+          <p:nvPr/>
+        </p:nvPicPr>
+        <p:blipFill>
+          <a:blip r:embed="rId2">
+            <a:extLst>
+              <a:ext uri="{28A0092B-C50C-407E-A947-70E740481C1C}">
+                <a14:useLocalDpi xmlns:a14="http://schemas.microsoft.com/office/drawing/2010/main" val="0"/>
+              </a:ext>
+            </a:extLst>
+          </a:blip>
+          <a:stretch>
+            <a:fillRect/>
+          </a:stretch>
+        </p:blipFill>
+        <p:spPr>
+          <a:xfrm>
+            <a:off x="925244" y="2204864"/>
+            <a:ext cx="7293511" cy="3514395"/>
+          </a:xfrm>
+          <a:prstGeom prst="rect">
+            <a:avLst/>
+          </a:prstGeom>
+        </p:spPr>
+      </p:pic>
+      <p:sp>
+        <p:nvSpPr>
+          <p:cNvPr id="6" name="Rechteck 5"/>
+          <p:cNvSpPr/>
+          <p:nvPr/>
+        </p:nvSpPr>
+        <p:spPr>
+          <a:xfrm>
+            <a:off x="2411760" y="5301208"/>
+            <a:ext cx="4896544" cy="360040"/>
+          </a:xfrm>
+          <a:prstGeom prst="rect">
+            <a:avLst/>
+          </a:prstGeom>
+          <a:noFill/>
+          <a:ln>
+            <a:solidFill>
+              <a:schemeClr val="accent2"/>
+            </a:solidFill>
+          </a:ln>
+        </p:spPr>
+        <p:style>
+          <a:lnRef idx="2">
+            <a:schemeClr val="accent1">
+              <a:shade val="50000"/>
+            </a:schemeClr>
+          </a:lnRef>
+          <a:fillRef idx="1">
+            <a:schemeClr val="accent1"/>
+          </a:fillRef>
+          <a:effectRef idx="0">
+            <a:schemeClr val="accent1"/>
+          </a:effectRef>
+          <a:fontRef idx="minor">
+            <a:schemeClr val="lt1"/>
+          </a:fontRef>
+        </p:style>
+        <p:txBody>
+          <a:bodyPr rtlCol="0" anchor="ctr"/>
+          <a:lstStyle/>
+          <a:p>
+            <a:pPr algn="ctr"/>
+            <a:endParaRPr lang="en-GB"/>
+          </a:p>
+        </p:txBody>
+      </p:sp>
+    </p:spTree>
+    <p:extLst>
+      <p:ext uri="{BB962C8B-B14F-4D97-AF65-F5344CB8AC3E}">
         <p14:creationId xmlns:p14="http://schemas.microsoft.com/office/powerpoint/2010/main" val="1513813094"/>
       </p:ext>
     </p:extLst>
@@ -4769,17 +5311,10 @@
   <p:clrMapOvr>
     <a:masterClrMapping/>
   </p:clrMapOvr>
-  <p:timing>
-    <p:tnLst>
-      <p:par>
-        <p:cTn id="1" dur="indefinite" restart="never" nodeType="tmRoot"/>
-      </p:par>
-    </p:tnLst>
-  </p:timing>
 </p:sld>
 </file>
 
-<file path=ppt/slides/slide11.xml><?xml version="1.0" encoding="utf-8"?>
+<file path=ppt/slides/slide14.xml><?xml version="1.0" encoding="utf-8"?>
 <p:sld xmlns:a="http://schemas.openxmlformats.org/drawingml/2006/main" xmlns:r="http://schemas.openxmlformats.org/officeDocument/2006/relationships" xmlns:p="http://schemas.openxmlformats.org/presentationml/2006/main">
   <p:cSld>
     <p:spTree>
@@ -4920,17 +5455,10 @@
   <p:clrMapOvr>
     <a:masterClrMapping/>
   </p:clrMapOvr>
-  <p:timing>
-    <p:tnLst>
-      <p:par>
-        <p:cTn id="1" dur="indefinite" restart="never" nodeType="tmRoot"/>
-      </p:par>
-    </p:tnLst>
-  </p:timing>
 </p:sld>
 </file>
 
-<file path=ppt/slides/slide12.xml><?xml version="1.0" encoding="utf-8"?>
+<file path=ppt/slides/slide15.xml><?xml version="1.0" encoding="utf-8"?>
 <p:sld xmlns:a="http://schemas.openxmlformats.org/drawingml/2006/main" xmlns:r="http://schemas.openxmlformats.org/officeDocument/2006/relationships" xmlns:p="http://schemas.openxmlformats.org/presentationml/2006/main">
   <p:cSld>
     <p:spTree>
@@ -5119,13 +5647,6 @@
   <p:clrMapOvr>
     <a:masterClrMapping/>
   </p:clrMapOvr>
-  <p:timing>
-    <p:tnLst>
-      <p:par>
-        <p:cTn id="1" dur="indefinite" restart="never" nodeType="tmRoot"/>
-      </p:par>
-    </p:tnLst>
-  </p:timing>
 </p:sld>
 </file>
 
@@ -5208,13 +5729,6 @@
   <p:clrMapOvr>
     <a:masterClrMapping/>
   </p:clrMapOvr>
-  <p:timing>
-    <p:tnLst>
-      <p:par>
-        <p:cTn id="1" dur="indefinite" restart="never" nodeType="tmRoot"/>
-      </p:par>
-    </p:tnLst>
-  </p:timing>
 </p:sld>
 </file>
 
@@ -5297,13 +5811,6 @@
   <p:clrMapOvr>
     <a:masterClrMapping/>
   </p:clrMapOvr>
-  <p:timing>
-    <p:tnLst>
-      <p:par>
-        <p:cTn id="1" dur="indefinite" restart="never" nodeType="tmRoot"/>
-      </p:par>
-    </p:tnLst>
-  </p:timing>
 </p:sld>
 </file>
 
@@ -5522,13 +6029,6 @@
   <p:clrMapOvr>
     <a:masterClrMapping/>
   </p:clrMapOvr>
-  <p:timing>
-    <p:tnLst>
-      <p:par>
-        <p:cTn id="1" dur="indefinite" restart="never" nodeType="tmRoot"/>
-      </p:par>
-    </p:tnLst>
-  </p:timing>
 </p:sld>
 </file>
 
@@ -5768,13 +6268,6 @@
   <p:clrMapOvr>
     <a:masterClrMapping/>
   </p:clrMapOvr>
-  <p:timing>
-    <p:tnLst>
-      <p:par>
-        <p:cTn id="1" dur="indefinite" restart="never" nodeType="tmRoot"/>
-      </p:par>
-    </p:tnLst>
-  </p:timing>
 </p:sld>
 </file>
 
@@ -5797,12 +6290,12 @@
       </p:grpSpPr>
       <p:sp>
         <p:nvSpPr>
-          <p:cNvPr id="2" name="Inhaltsplatzhalter 1"/>
-          <p:cNvSpPr>
-            <a:spLocks noGrp="1"/>
-          </p:cNvSpPr>
-          <p:nvPr>
-            <p:ph idx="1"/>
+          <p:cNvPr id="3" name="Titel 2"/>
+          <p:cNvSpPr>
+            <a:spLocks noGrp="1"/>
+          </p:cNvSpPr>
+          <p:nvPr>
+            <p:ph type="title"/>
           </p:nvPr>
         </p:nvSpPr>
         <p:spPr/>
@@ -5812,103 +6305,256 @@
           <a:p>
             <a:r>
               <a:rPr lang="de-CH" dirty="0" err="1" smtClean="0"/>
-              <a:t>Deleting</a:t>
+              <a:t>Contribution</a:t>
             </a:r>
             <a:r>
               <a:rPr lang="de-CH" dirty="0" smtClean="0"/>
-              <a:t> a </a:t>
-            </a:r>
-            <a:r>
-              <a:rPr lang="de-CH" dirty="0" err="1" smtClean="0"/>
-              <a:t>new</a:t>
-            </a:r>
-            <a:r>
-              <a:rPr lang="de-CH" dirty="0" smtClean="0"/>
-              <a:t> </a:t>
-            </a:r>
-            <a:r>
-              <a:rPr lang="de-CH" dirty="0" err="1" smtClean="0"/>
-              <a:t>prescription</a:t>
-            </a:r>
-            <a:endParaRPr lang="de-CH" dirty="0" smtClean="0"/>
-          </a:p>
-          <a:p>
+              <a:t> Mete Turna</a:t>
+            </a:r>
             <a:endParaRPr lang="de-CH" dirty="0"/>
           </a:p>
-          <a:p>
-            <a:endParaRPr lang="de-CH" dirty="0" smtClean="0"/>
-          </a:p>
-          <a:p>
-            <a:pPr marL="109728" indent="0">
-              <a:buNone/>
-            </a:pPr>
-            <a:endParaRPr lang="de-CH" dirty="0" smtClean="0"/>
-          </a:p>
-          <a:p>
-            <a:pPr marL="109728" indent="0">
-              <a:buNone/>
-            </a:pPr>
-            <a:endParaRPr lang="de-CH" dirty="0"/>
-          </a:p>
-        </p:txBody>
-      </p:sp>
-      <p:sp>
-        <p:nvSpPr>
-          <p:cNvPr id="3" name="Titel 2"/>
-          <p:cNvSpPr>
-            <a:spLocks noGrp="1"/>
-          </p:cNvSpPr>
-          <p:nvPr>
-            <p:ph type="title"/>
-          </p:nvPr>
-        </p:nvSpPr>
-        <p:spPr/>
-        <p:txBody>
-          <a:bodyPr/>
-          <a:lstStyle/>
-          <a:p>
-            <a:r>
-              <a:rPr lang="de-CH" dirty="0" err="1" smtClean="0"/>
-              <a:t>Contribution</a:t>
-            </a:r>
-            <a:r>
-              <a:rPr lang="de-CH" dirty="0" smtClean="0"/>
-              <a:t> Michel Murbach</a:t>
-            </a:r>
-            <a:endParaRPr lang="de-CH" dirty="0"/>
-          </a:p>
-        </p:txBody>
-      </p:sp>
-      <p:pic>
-        <p:nvPicPr>
-          <p:cNvPr id="4" name="Grafik 3"/>
-          <p:cNvPicPr>
-            <a:picLocks noChangeAspect="1"/>
-          </p:cNvPicPr>
+        </p:txBody>
+      </p:sp>
+      <p:sp>
+        <p:nvSpPr>
+          <p:cNvPr id="4" name="Inhaltsplatzhalter 2"/>
+          <p:cNvSpPr txBox="1">
+            <a:spLocks/>
+          </p:cNvSpPr>
           <p:nvPr/>
-        </p:nvPicPr>
-        <p:blipFill>
-          <a:blip r:embed="rId2">
-            <a:extLst>
-              <a:ext uri="{28A0092B-C50C-407E-A947-70E740481C1C}">
-                <a14:useLocalDpi xmlns:a14="http://schemas.microsoft.com/office/drawing/2010/main" val="0"/>
-              </a:ext>
-            </a:extLst>
-          </a:blip>
-          <a:stretch>
-            <a:fillRect/>
-          </a:stretch>
-        </p:blipFill>
+        </p:nvSpPr>
         <p:spPr>
           <a:xfrm>
-            <a:off x="596163" y="1940654"/>
-            <a:ext cx="8107680" cy="2156460"/>
+            <a:off x="0" y="1628800"/>
+            <a:ext cx="9058159" cy="3725086"/>
           </a:xfrm>
           <a:prstGeom prst="rect">
             <a:avLst/>
           </a:prstGeom>
         </p:spPr>
-      </p:pic>
+        <p:txBody>
+          <a:bodyPr vert="horz">
+            <a:normAutofit/>
+          </a:bodyPr>
+          <a:lstStyle>
+            <a:lvl1pPr marL="365760" indent="-256032" algn="l" rtl="0" eaLnBrk="1" latinLnBrk="0" hangingPunct="1">
+              <a:spcBef>
+                <a:spcPts val="400"/>
+              </a:spcBef>
+              <a:spcAft>
+                <a:spcPts val="0"/>
+              </a:spcAft>
+              <a:buClr>
+                <a:schemeClr val="accent1"/>
+              </a:buClr>
+              <a:buSzPct val="68000"/>
+              <a:buFont typeface="Wingdings 3"/>
+              <a:buChar char=""/>
+              <a:defRPr kumimoji="0" sz="2700" kern="1200">
+                <a:solidFill>
+                  <a:schemeClr val="tx1"/>
+                </a:solidFill>
+                <a:latin typeface="+mn-lt"/>
+                <a:ea typeface="+mn-ea"/>
+                <a:cs typeface="+mn-cs"/>
+              </a:defRPr>
+            </a:lvl1pPr>
+            <a:lvl2pPr marL="621792" indent="-228600" algn="l" rtl="0" eaLnBrk="1" latinLnBrk="0" hangingPunct="1">
+              <a:spcBef>
+                <a:spcPts val="324"/>
+              </a:spcBef>
+              <a:buClr>
+                <a:schemeClr val="accent1"/>
+              </a:buClr>
+              <a:buFont typeface="Verdana"/>
+              <a:buChar char="◦"/>
+              <a:defRPr kumimoji="0" sz="2300" kern="1200">
+                <a:solidFill>
+                  <a:schemeClr val="tx1"/>
+                </a:solidFill>
+                <a:latin typeface="+mn-lt"/>
+                <a:ea typeface="+mn-ea"/>
+                <a:cs typeface="+mn-cs"/>
+              </a:defRPr>
+            </a:lvl2pPr>
+            <a:lvl3pPr marL="859536" indent="-228600" algn="l" rtl="0" eaLnBrk="1" latinLnBrk="0" hangingPunct="1">
+              <a:spcBef>
+                <a:spcPts val="350"/>
+              </a:spcBef>
+              <a:buClr>
+                <a:schemeClr val="accent2"/>
+              </a:buClr>
+              <a:buSzPct val="100000"/>
+              <a:buFont typeface="Wingdings 2"/>
+              <a:buChar char=""/>
+              <a:defRPr kumimoji="0" sz="2100" kern="1200">
+                <a:solidFill>
+                  <a:schemeClr val="tx1"/>
+                </a:solidFill>
+                <a:latin typeface="+mn-lt"/>
+                <a:ea typeface="+mn-ea"/>
+                <a:cs typeface="+mn-cs"/>
+              </a:defRPr>
+            </a:lvl3pPr>
+            <a:lvl4pPr marL="1143000" indent="-228600" algn="l" rtl="0" eaLnBrk="1" latinLnBrk="0" hangingPunct="1">
+              <a:spcBef>
+                <a:spcPts val="350"/>
+              </a:spcBef>
+              <a:buClr>
+                <a:schemeClr val="accent2"/>
+              </a:buClr>
+              <a:buFont typeface="Wingdings 2"/>
+              <a:buChar char=""/>
+              <a:defRPr kumimoji="0" sz="1900" kern="1200">
+                <a:solidFill>
+                  <a:schemeClr val="tx1"/>
+                </a:solidFill>
+                <a:latin typeface="+mn-lt"/>
+                <a:ea typeface="+mn-ea"/>
+                <a:cs typeface="+mn-cs"/>
+              </a:defRPr>
+            </a:lvl4pPr>
+            <a:lvl5pPr marL="1371600" indent="-228600" algn="l" rtl="0" eaLnBrk="1" latinLnBrk="0" hangingPunct="1">
+              <a:spcBef>
+                <a:spcPts val="350"/>
+              </a:spcBef>
+              <a:buClr>
+                <a:schemeClr val="accent2"/>
+              </a:buClr>
+              <a:buFont typeface="Wingdings 2"/>
+              <a:buChar char=""/>
+              <a:defRPr kumimoji="0" sz="1800" kern="1200">
+                <a:solidFill>
+                  <a:schemeClr val="tx1"/>
+                </a:solidFill>
+                <a:latin typeface="+mn-lt"/>
+                <a:ea typeface="+mn-ea"/>
+                <a:cs typeface="+mn-cs"/>
+              </a:defRPr>
+            </a:lvl5pPr>
+            <a:lvl6pPr marL="1600200" indent="-228600" algn="l" rtl="0" eaLnBrk="1" latinLnBrk="0" hangingPunct="1">
+              <a:spcBef>
+                <a:spcPts val="350"/>
+              </a:spcBef>
+              <a:buClr>
+                <a:schemeClr val="accent3"/>
+              </a:buClr>
+              <a:buFont typeface="Wingdings 2"/>
+              <a:buChar char=""/>
+              <a:defRPr kumimoji="0" sz="1800" kern="1200">
+                <a:solidFill>
+                  <a:schemeClr val="tx1"/>
+                </a:solidFill>
+                <a:latin typeface="+mn-lt"/>
+                <a:ea typeface="+mn-ea"/>
+                <a:cs typeface="+mn-cs"/>
+              </a:defRPr>
+            </a:lvl6pPr>
+            <a:lvl7pPr marL="1828800" indent="-228600" algn="l" rtl="0" eaLnBrk="1" latinLnBrk="0" hangingPunct="1">
+              <a:spcBef>
+                <a:spcPts val="350"/>
+              </a:spcBef>
+              <a:buClr>
+                <a:schemeClr val="accent3"/>
+              </a:buClr>
+              <a:buFont typeface="Wingdings 2"/>
+              <a:buChar char=""/>
+              <a:defRPr kumimoji="0" sz="1600" kern="1200">
+                <a:solidFill>
+                  <a:schemeClr val="tx1"/>
+                </a:solidFill>
+                <a:latin typeface="+mn-lt"/>
+                <a:ea typeface="+mn-ea"/>
+                <a:cs typeface="+mn-cs"/>
+              </a:defRPr>
+            </a:lvl7pPr>
+            <a:lvl8pPr marL="2057400" indent="-228600" algn="l" rtl="0" eaLnBrk="1" latinLnBrk="0" hangingPunct="1">
+              <a:spcBef>
+                <a:spcPts val="350"/>
+              </a:spcBef>
+              <a:buClr>
+                <a:schemeClr val="accent3"/>
+              </a:buClr>
+              <a:buFont typeface="Wingdings 2"/>
+              <a:buChar char=""/>
+              <a:defRPr kumimoji="0" sz="1600" kern="1200">
+                <a:solidFill>
+                  <a:schemeClr val="tx1"/>
+                </a:solidFill>
+                <a:latin typeface="+mn-lt"/>
+                <a:ea typeface="+mn-ea"/>
+                <a:cs typeface="+mn-cs"/>
+              </a:defRPr>
+            </a:lvl8pPr>
+            <a:lvl9pPr marL="2286000" indent="-228600" algn="l" rtl="0" eaLnBrk="1" latinLnBrk="0" hangingPunct="1">
+              <a:spcBef>
+                <a:spcPts val="350"/>
+              </a:spcBef>
+              <a:buClr>
+                <a:schemeClr val="accent3"/>
+              </a:buClr>
+              <a:buFont typeface="Wingdings 2"/>
+              <a:buChar char=""/>
+              <a:defRPr kumimoji="0" sz="1600" kern="1200" baseline="0">
+                <a:solidFill>
+                  <a:schemeClr val="tx1"/>
+                </a:solidFill>
+                <a:latin typeface="+mn-lt"/>
+                <a:ea typeface="+mn-ea"/>
+                <a:cs typeface="+mn-cs"/>
+              </a:defRPr>
+            </a:lvl9pPr>
+            <a:extLst/>
+          </a:lstStyle>
+          <a:p>
+            <a:r>
+              <a:rPr lang="de-CH" sz="2400" dirty="0" smtClean="0"/>
+              <a:t>Class:		</a:t>
+            </a:r>
+            <a:r>
+              <a:rPr lang="de-CH" sz="2400" dirty="0" err="1" smtClean="0"/>
+              <a:t>MedicationEditModel</a:t>
+            </a:r>
+            <a:endParaRPr lang="de-CH" sz="2400" dirty="0" smtClean="0"/>
+          </a:p>
+          <a:p>
+            <a:r>
+              <a:rPr lang="de-CH" sz="2400" dirty="0" err="1" smtClean="0"/>
+              <a:t>Function</a:t>
+            </a:r>
+            <a:r>
+              <a:rPr lang="de-CH" sz="2400" dirty="0" smtClean="0"/>
+              <a:t>:		Read-, Edit- &amp; Update </a:t>
+            </a:r>
+            <a:r>
+              <a:rPr lang="de-CH" sz="2400" dirty="0" err="1" smtClean="0"/>
+              <a:t>Prescription</a:t>
+            </a:r>
+            <a:endParaRPr lang="de-CH" sz="2400" dirty="0" smtClean="0"/>
+          </a:p>
+          <a:p>
+            <a:r>
+              <a:rPr lang="de-CH" sz="2400" dirty="0" smtClean="0"/>
+              <a:t>Methode:		</a:t>
+            </a:r>
+            <a:r>
+              <a:rPr lang="de-CH" sz="2400" dirty="0" err="1" smtClean="0"/>
+              <a:t>loadData</a:t>
+            </a:r>
+            <a:r>
+              <a:rPr lang="de-CH" sz="2400" dirty="0" smtClean="0"/>
+              <a:t>()</a:t>
+            </a:r>
+          </a:p>
+          <a:p>
+            <a:pPr marL="0" indent="0">
+              <a:buFont typeface="Wingdings 3"/>
+              <a:buNone/>
+            </a:pPr>
+            <a:endParaRPr lang="de-CH" dirty="0" smtClean="0"/>
+          </a:p>
+        </p:txBody>
+      </p:sp>
       <p:pic>
         <p:nvPicPr>
           <p:cNvPr id="5" name="Grafik 4"/>
@@ -5918,69 +6564,25 @@
           <p:nvPr/>
         </p:nvPicPr>
         <p:blipFill>
-          <a:blip r:embed="rId3">
-            <a:extLst>
-              <a:ext uri="{28A0092B-C50C-407E-A947-70E740481C1C}">
-                <a14:useLocalDpi xmlns:a14="http://schemas.microsoft.com/office/drawing/2010/main" val="0"/>
-              </a:ext>
-            </a:extLst>
-          </a:blip>
+          <a:blip r:embed="rId2"/>
           <a:stretch>
             <a:fillRect/>
           </a:stretch>
         </p:blipFill>
         <p:spPr>
           <a:xfrm>
-            <a:off x="613206" y="4897270"/>
-            <a:ext cx="8073594" cy="1960730"/>
+            <a:off x="619350" y="3462113"/>
+            <a:ext cx="8524650" cy="2285268"/>
           </a:xfrm>
           <a:prstGeom prst="rect">
             <a:avLst/>
           </a:prstGeom>
         </p:spPr>
       </p:pic>
-      <p:sp>
-        <p:nvSpPr>
-          <p:cNvPr id="6" name="Textfeld 5"/>
-          <p:cNvSpPr txBox="1"/>
-          <p:nvPr/>
-        </p:nvSpPr>
-        <p:spPr>
-          <a:xfrm>
-            <a:off x="3347864" y="4435464"/>
-            <a:ext cx="2448272" cy="369332"/>
-          </a:xfrm>
-          <a:prstGeom prst="rect">
-            <a:avLst/>
-          </a:prstGeom>
-          <a:noFill/>
-        </p:spPr>
-        <p:txBody>
-          <a:bodyPr wrap="square" rtlCol="0">
-            <a:spAutoFit/>
-          </a:bodyPr>
-          <a:lstStyle/>
-          <a:p>
-            <a:r>
-              <a:rPr lang="en-GB" dirty="0" err="1" smtClean="0"/>
-              <a:t>Aufruf</a:t>
-            </a:r>
-            <a:r>
-              <a:rPr lang="en-GB" dirty="0" smtClean="0"/>
-              <a:t> der </a:t>
-            </a:r>
-            <a:r>
-              <a:rPr lang="en-GB" dirty="0" err="1" smtClean="0"/>
-              <a:t>Methode</a:t>
-            </a:r>
-            <a:endParaRPr lang="en-GB" dirty="0"/>
-          </a:p>
-        </p:txBody>
-      </p:sp>
     </p:spTree>
     <p:extLst>
       <p:ext uri="{BB962C8B-B14F-4D97-AF65-F5344CB8AC3E}">
-        <p14:creationId xmlns:p14="http://schemas.microsoft.com/office/powerpoint/2010/main" val="3880234993"/>
+        <p14:creationId xmlns:p14="http://schemas.microsoft.com/office/powerpoint/2010/main" val="3070939274"/>
       </p:ext>
     </p:extLst>
   </p:cSld>
@@ -5990,7 +6592,204 @@
   <p:timing>
     <p:tnLst>
       <p:par>
-        <p:cTn id="1" dur="indefinite" restart="never" nodeType="tmRoot"/>
+        <p:cTn id="1" dur="indefinite" restart="never" nodeType="tmRoot">
+          <p:childTnLst>
+            <p:seq concurrent="1" nextAc="seek">
+              <p:cTn id="2" dur="indefinite" nodeType="mainSeq">
+                <p:childTnLst>
+                  <p:par>
+                    <p:cTn id="3" fill="hold">
+                      <p:stCondLst>
+                        <p:cond delay="indefinite"/>
+                      </p:stCondLst>
+                      <p:childTnLst>
+                        <p:par>
+                          <p:cTn id="4" fill="hold">
+                            <p:stCondLst>
+                              <p:cond delay="0"/>
+                            </p:stCondLst>
+                            <p:childTnLst>
+                              <p:par>
+                                <p:cTn id="5" presetID="1" presetClass="entr" presetSubtype="0" fill="hold" nodeType="clickEffect">
+                                  <p:stCondLst>
+                                    <p:cond delay="0"/>
+                                  </p:stCondLst>
+                                  <p:childTnLst>
+                                    <p:set>
+                                      <p:cBhvr>
+                                        <p:cTn id="6" dur="1" fill="hold">
+                                          <p:stCondLst>
+                                            <p:cond delay="0"/>
+                                          </p:stCondLst>
+                                        </p:cTn>
+                                        <p:tgtEl>
+                                          <p:spTgt spid="4">
+                                            <p:txEl>
+                                              <p:pRg st="0" end="0"/>
+                                            </p:txEl>
+                                          </p:spTgt>
+                                        </p:tgtEl>
+                                        <p:attrNameLst>
+                                          <p:attrName>style.visibility</p:attrName>
+                                        </p:attrNameLst>
+                                      </p:cBhvr>
+                                      <p:to>
+                                        <p:strVal val="visible"/>
+                                      </p:to>
+                                    </p:set>
+                                  </p:childTnLst>
+                                </p:cTn>
+                              </p:par>
+                            </p:childTnLst>
+                          </p:cTn>
+                        </p:par>
+                      </p:childTnLst>
+                    </p:cTn>
+                  </p:par>
+                  <p:par>
+                    <p:cTn id="7" fill="hold">
+                      <p:stCondLst>
+                        <p:cond delay="indefinite"/>
+                      </p:stCondLst>
+                      <p:childTnLst>
+                        <p:par>
+                          <p:cTn id="8" fill="hold">
+                            <p:stCondLst>
+                              <p:cond delay="0"/>
+                            </p:stCondLst>
+                            <p:childTnLst>
+                              <p:par>
+                                <p:cTn id="9" presetID="1" presetClass="entr" presetSubtype="0" fill="hold" nodeType="clickEffect">
+                                  <p:stCondLst>
+                                    <p:cond delay="0"/>
+                                  </p:stCondLst>
+                                  <p:childTnLst>
+                                    <p:set>
+                                      <p:cBhvr>
+                                        <p:cTn id="10" dur="1" fill="hold">
+                                          <p:stCondLst>
+                                            <p:cond delay="0"/>
+                                          </p:stCondLst>
+                                        </p:cTn>
+                                        <p:tgtEl>
+                                          <p:spTgt spid="4">
+                                            <p:txEl>
+                                              <p:pRg st="1" end="1"/>
+                                            </p:txEl>
+                                          </p:spTgt>
+                                        </p:tgtEl>
+                                        <p:attrNameLst>
+                                          <p:attrName>style.visibility</p:attrName>
+                                        </p:attrNameLst>
+                                      </p:cBhvr>
+                                      <p:to>
+                                        <p:strVal val="visible"/>
+                                      </p:to>
+                                    </p:set>
+                                  </p:childTnLst>
+                                </p:cTn>
+                              </p:par>
+                            </p:childTnLst>
+                          </p:cTn>
+                        </p:par>
+                      </p:childTnLst>
+                    </p:cTn>
+                  </p:par>
+                  <p:par>
+                    <p:cTn id="11" fill="hold">
+                      <p:stCondLst>
+                        <p:cond delay="indefinite"/>
+                      </p:stCondLst>
+                      <p:childTnLst>
+                        <p:par>
+                          <p:cTn id="12" fill="hold">
+                            <p:stCondLst>
+                              <p:cond delay="0"/>
+                            </p:stCondLst>
+                            <p:childTnLst>
+                              <p:par>
+                                <p:cTn id="13" presetID="1" presetClass="entr" presetSubtype="0" fill="hold" nodeType="clickEffect">
+                                  <p:stCondLst>
+                                    <p:cond delay="0"/>
+                                  </p:stCondLst>
+                                  <p:childTnLst>
+                                    <p:set>
+                                      <p:cBhvr>
+                                        <p:cTn id="14" dur="1" fill="hold">
+                                          <p:stCondLst>
+                                            <p:cond delay="0"/>
+                                          </p:stCondLst>
+                                        </p:cTn>
+                                        <p:tgtEl>
+                                          <p:spTgt spid="4">
+                                            <p:txEl>
+                                              <p:pRg st="2" end="2"/>
+                                            </p:txEl>
+                                          </p:spTgt>
+                                        </p:tgtEl>
+                                        <p:attrNameLst>
+                                          <p:attrName>style.visibility</p:attrName>
+                                        </p:attrNameLst>
+                                      </p:cBhvr>
+                                      <p:to>
+                                        <p:strVal val="visible"/>
+                                      </p:to>
+                                    </p:set>
+                                  </p:childTnLst>
+                                </p:cTn>
+                              </p:par>
+                              <p:par>
+                                <p:cTn id="15" presetID="1" presetClass="entr" presetSubtype="0" fill="hold" nodeType="withEffect">
+                                  <p:stCondLst>
+                                    <p:cond delay="0"/>
+                                  </p:stCondLst>
+                                  <p:childTnLst>
+                                    <p:set>
+                                      <p:cBhvr>
+                                        <p:cTn id="16" dur="1" fill="hold">
+                                          <p:stCondLst>
+                                            <p:cond delay="0"/>
+                                          </p:stCondLst>
+                                        </p:cTn>
+                                        <p:tgtEl>
+                                          <p:spTgt spid="5"/>
+                                        </p:tgtEl>
+                                        <p:attrNameLst>
+                                          <p:attrName>style.visibility</p:attrName>
+                                        </p:attrNameLst>
+                                      </p:cBhvr>
+                                      <p:to>
+                                        <p:strVal val="visible"/>
+                                      </p:to>
+                                    </p:set>
+                                  </p:childTnLst>
+                                </p:cTn>
+                              </p:par>
+                            </p:childTnLst>
+                          </p:cTn>
+                        </p:par>
+                      </p:childTnLst>
+                    </p:cTn>
+                  </p:par>
+                </p:childTnLst>
+              </p:cTn>
+              <p:prevCondLst>
+                <p:cond evt="onPrev" delay="0">
+                  <p:tgtEl>
+                    <p:sldTgt/>
+                  </p:tgtEl>
+                </p:cond>
+              </p:prevCondLst>
+              <p:nextCondLst>
+                <p:cond evt="onNext" delay="0">
+                  <p:tgtEl>
+                    <p:sldTgt/>
+                  </p:tgtEl>
+                </p:cond>
+              </p:nextCondLst>
+            </p:seq>
+          </p:childTnLst>
+        </p:cTn>
       </p:par>
     </p:tnLst>
   </p:timing>
@@ -6029,44 +6828,6 @@
           <a:bodyPr/>
           <a:lstStyle/>
           <a:p>
-            <a:r>
-              <a:rPr lang="de-CH" dirty="0" err="1" smtClean="0"/>
-              <a:t>Deleting</a:t>
-            </a:r>
-            <a:r>
-              <a:rPr lang="de-CH" dirty="0" smtClean="0"/>
-              <a:t> a </a:t>
-            </a:r>
-            <a:r>
-              <a:rPr lang="de-CH" dirty="0" err="1" smtClean="0"/>
-              <a:t>new</a:t>
-            </a:r>
-            <a:r>
-              <a:rPr lang="de-CH" dirty="0" smtClean="0"/>
-              <a:t> </a:t>
-            </a:r>
-            <a:r>
-              <a:rPr lang="de-CH" dirty="0" err="1" smtClean="0"/>
-              <a:t>prescription</a:t>
-            </a:r>
-            <a:endParaRPr lang="de-CH" dirty="0" smtClean="0"/>
-          </a:p>
-          <a:p>
-            <a:endParaRPr lang="de-CH" dirty="0"/>
-          </a:p>
-          <a:p>
-            <a:endParaRPr lang="de-CH" dirty="0" smtClean="0"/>
-          </a:p>
-          <a:p>
-            <a:pPr marL="109728" indent="0">
-              <a:buNone/>
-            </a:pPr>
-            <a:endParaRPr lang="de-CH" dirty="0" smtClean="0"/>
-          </a:p>
-          <a:p>
-            <a:pPr marL="109728" indent="0">
-              <a:buNone/>
-            </a:pPr>
             <a:endParaRPr lang="de-CH" dirty="0"/>
           </a:p>
         </p:txBody>
@@ -6087,51 +6848,323 @@
           <a:lstStyle/>
           <a:p>
             <a:r>
-              <a:rPr lang="de-CH" dirty="0" err="1" smtClean="0"/>
+              <a:rPr lang="de-CH" dirty="0" err="1"/>
               <a:t>Contribution</a:t>
             </a:r>
             <a:r>
-              <a:rPr lang="de-CH" dirty="0" smtClean="0"/>
-              <a:t> Michel Murbach</a:t>
-            </a:r>
-            <a:endParaRPr lang="de-CH" dirty="0"/>
+              <a:rPr lang="de-CH" dirty="0"/>
+              <a:t> Mete Turna</a:t>
+            </a:r>
           </a:p>
         </p:txBody>
       </p:sp>
       <p:pic>
         <p:nvPicPr>
-          <p:cNvPr id="7" name="Grafik 6"/>
+          <p:cNvPr id="4" name="Inhaltsplatzhalter 3"/>
           <p:cNvPicPr>
             <a:picLocks noChangeAspect="1"/>
           </p:cNvPicPr>
           <p:nvPr/>
         </p:nvPicPr>
         <p:blipFill>
-          <a:blip r:embed="rId2">
-            <a:extLst>
-              <a:ext uri="{28A0092B-C50C-407E-A947-70E740481C1C}">
-                <a14:useLocalDpi xmlns:a14="http://schemas.microsoft.com/office/drawing/2010/main" val="0"/>
-              </a:ext>
-            </a:extLst>
-          </a:blip>
+          <a:blip r:embed="rId2"/>
           <a:stretch>
             <a:fillRect/>
           </a:stretch>
         </p:blipFill>
         <p:spPr>
           <a:xfrm>
-            <a:off x="1547664" y="1988840"/>
-            <a:ext cx="6386049" cy="4869160"/>
+            <a:off x="171963" y="1578906"/>
+            <a:ext cx="6103480" cy="3722302"/>
           </a:xfrm>
           <a:prstGeom prst="rect">
             <a:avLst/>
           </a:prstGeom>
         </p:spPr>
       </p:pic>
+      <p:sp>
+        <p:nvSpPr>
+          <p:cNvPr id="5" name="Rechteck 4"/>
+          <p:cNvSpPr/>
+          <p:nvPr/>
+        </p:nvSpPr>
+        <p:spPr>
+          <a:xfrm>
+            <a:off x="425374" y="4077071"/>
+            <a:ext cx="4002610" cy="972955"/>
+          </a:xfrm>
+          <a:prstGeom prst="rect">
+            <a:avLst/>
+          </a:prstGeom>
+          <a:noFill/>
+          <a:ln>
+            <a:solidFill>
+              <a:srgbClr val="C00000"/>
+            </a:solidFill>
+          </a:ln>
+        </p:spPr>
+        <p:style>
+          <a:lnRef idx="2">
+            <a:schemeClr val="accent1">
+              <a:shade val="50000"/>
+            </a:schemeClr>
+          </a:lnRef>
+          <a:fillRef idx="1">
+            <a:schemeClr val="accent1"/>
+          </a:fillRef>
+          <a:effectRef idx="0">
+            <a:schemeClr val="accent1"/>
+          </a:effectRef>
+          <a:fontRef idx="minor">
+            <a:schemeClr val="lt1"/>
+          </a:fontRef>
+        </p:style>
+        <p:txBody>
+          <a:bodyPr rtlCol="0" anchor="ctr"/>
+          <a:lstStyle/>
+          <a:p>
+            <a:pPr algn="ctr"/>
+            <a:endParaRPr lang="de-CH"/>
+          </a:p>
+        </p:txBody>
+      </p:sp>
+      <p:pic>
+        <p:nvPicPr>
+          <p:cNvPr id="6" name="Grafik 5"/>
+          <p:cNvPicPr>
+            <a:picLocks noChangeAspect="1"/>
+          </p:cNvPicPr>
+          <p:nvPr/>
+        </p:nvPicPr>
+        <p:blipFill>
+          <a:blip r:embed="rId3"/>
+          <a:stretch>
+            <a:fillRect/>
+          </a:stretch>
+        </p:blipFill>
+        <p:spPr>
+          <a:xfrm>
+            <a:off x="6326124" y="1571142"/>
+            <a:ext cx="2788788" cy="3888432"/>
+          </a:xfrm>
+          <a:prstGeom prst="rect">
+            <a:avLst/>
+          </a:prstGeom>
+        </p:spPr>
+      </p:pic>
+      <p:sp>
+        <p:nvSpPr>
+          <p:cNvPr id="7" name="Rechteck 6"/>
+          <p:cNvSpPr/>
+          <p:nvPr/>
+        </p:nvSpPr>
+        <p:spPr>
+          <a:xfrm>
+            <a:off x="611560" y="1916833"/>
+            <a:ext cx="5670369" cy="360039"/>
+          </a:xfrm>
+          <a:prstGeom prst="rect">
+            <a:avLst/>
+          </a:prstGeom>
+          <a:noFill/>
+          <a:ln>
+            <a:solidFill>
+              <a:srgbClr val="C00000"/>
+            </a:solidFill>
+          </a:ln>
+        </p:spPr>
+        <p:style>
+          <a:lnRef idx="2">
+            <a:schemeClr val="accent1">
+              <a:shade val="50000"/>
+            </a:schemeClr>
+          </a:lnRef>
+          <a:fillRef idx="1">
+            <a:schemeClr val="accent1"/>
+          </a:fillRef>
+          <a:effectRef idx="0">
+            <a:schemeClr val="accent1"/>
+          </a:effectRef>
+          <a:fontRef idx="minor">
+            <a:schemeClr val="lt1"/>
+          </a:fontRef>
+        </p:style>
+        <p:txBody>
+          <a:bodyPr rtlCol="0" anchor="ctr"/>
+          <a:lstStyle/>
+          <a:p>
+            <a:pPr algn="ctr"/>
+            <a:endParaRPr lang="de-CH"/>
+          </a:p>
+        </p:txBody>
+      </p:sp>
+      <p:sp>
+        <p:nvSpPr>
+          <p:cNvPr id="8" name="Rechteck 7"/>
+          <p:cNvSpPr/>
+          <p:nvPr/>
+        </p:nvSpPr>
+        <p:spPr>
+          <a:xfrm>
+            <a:off x="6275444" y="2560004"/>
+            <a:ext cx="2137524" cy="231543"/>
+          </a:xfrm>
+          <a:prstGeom prst="rect">
+            <a:avLst/>
+          </a:prstGeom>
+          <a:noFill/>
+          <a:ln>
+            <a:solidFill>
+              <a:srgbClr val="C00000"/>
+            </a:solidFill>
+          </a:ln>
+        </p:spPr>
+        <p:style>
+          <a:lnRef idx="2">
+            <a:schemeClr val="accent1">
+              <a:shade val="50000"/>
+            </a:schemeClr>
+          </a:lnRef>
+          <a:fillRef idx="1">
+            <a:schemeClr val="accent1"/>
+          </a:fillRef>
+          <a:effectRef idx="0">
+            <a:schemeClr val="accent1"/>
+          </a:effectRef>
+          <a:fontRef idx="minor">
+            <a:schemeClr val="lt1"/>
+          </a:fontRef>
+        </p:style>
+        <p:txBody>
+          <a:bodyPr rtlCol="0" anchor="ctr"/>
+          <a:lstStyle/>
+          <a:p>
+            <a:pPr algn="ctr"/>
+            <a:endParaRPr lang="de-CH"/>
+          </a:p>
+        </p:txBody>
+      </p:sp>
+      <p:sp>
+        <p:nvSpPr>
+          <p:cNvPr id="9" name="Rechteck 8"/>
+          <p:cNvSpPr/>
+          <p:nvPr/>
+        </p:nvSpPr>
+        <p:spPr>
+          <a:xfrm>
+            <a:off x="7668344" y="2846045"/>
+            <a:ext cx="1368152" cy="438939"/>
+          </a:xfrm>
+          <a:prstGeom prst="rect">
+            <a:avLst/>
+          </a:prstGeom>
+          <a:noFill/>
+          <a:ln>
+            <a:solidFill>
+              <a:srgbClr val="C00000"/>
+            </a:solidFill>
+          </a:ln>
+        </p:spPr>
+        <p:style>
+          <a:lnRef idx="2">
+            <a:schemeClr val="accent1">
+              <a:shade val="50000"/>
+            </a:schemeClr>
+          </a:lnRef>
+          <a:fillRef idx="1">
+            <a:schemeClr val="accent1"/>
+          </a:fillRef>
+          <a:effectRef idx="0">
+            <a:schemeClr val="accent1"/>
+          </a:effectRef>
+          <a:fontRef idx="minor">
+            <a:schemeClr val="lt1"/>
+          </a:fontRef>
+        </p:style>
+        <p:txBody>
+          <a:bodyPr rtlCol="0" anchor="ctr"/>
+          <a:lstStyle/>
+          <a:p>
+            <a:pPr algn="ctr"/>
+            <a:endParaRPr lang="de-CH"/>
+          </a:p>
+        </p:txBody>
+      </p:sp>
+      <p:cxnSp>
+        <p:nvCxnSpPr>
+          <p:cNvPr id="10" name="Gerade Verbindung mit Pfeil 9"/>
+          <p:cNvCxnSpPr>
+            <a:stCxn id="5" idx="3"/>
+            <a:endCxn id="9" idx="1"/>
+          </p:cNvCxnSpPr>
+          <p:nvPr/>
+        </p:nvCxnSpPr>
+        <p:spPr>
+          <a:xfrm flipV="1">
+            <a:off x="4427984" y="3065515"/>
+            <a:ext cx="3240360" cy="1498034"/>
+          </a:xfrm>
+          <a:prstGeom prst="straightConnector1">
+            <a:avLst/>
+          </a:prstGeom>
+          <a:ln>
+            <a:tailEnd type="triangle"/>
+          </a:ln>
+        </p:spPr>
+        <p:style>
+          <a:lnRef idx="1">
+            <a:schemeClr val="accent1"/>
+          </a:lnRef>
+          <a:fillRef idx="0">
+            <a:schemeClr val="accent1"/>
+          </a:fillRef>
+          <a:effectRef idx="0">
+            <a:schemeClr val="accent1"/>
+          </a:effectRef>
+          <a:fontRef idx="minor">
+            <a:schemeClr val="tx1"/>
+          </a:fontRef>
+        </p:style>
+      </p:cxnSp>
+      <p:cxnSp>
+        <p:nvCxnSpPr>
+          <p:cNvPr id="11" name="Gerade Verbindung mit Pfeil 10"/>
+          <p:cNvCxnSpPr>
+            <a:endCxn id="8" idx="1"/>
+          </p:cNvCxnSpPr>
+          <p:nvPr/>
+        </p:nvCxnSpPr>
+        <p:spPr>
+          <a:xfrm>
+            <a:off x="1626976" y="2315491"/>
+            <a:ext cx="4648468" cy="360285"/>
+          </a:xfrm>
+          <a:prstGeom prst="straightConnector1">
+            <a:avLst/>
+          </a:prstGeom>
+          <a:ln>
+            <a:tailEnd type="triangle"/>
+          </a:ln>
+        </p:spPr>
+        <p:style>
+          <a:lnRef idx="1">
+            <a:schemeClr val="accent1"/>
+          </a:lnRef>
+          <a:fillRef idx="0">
+            <a:schemeClr val="accent1"/>
+          </a:fillRef>
+          <a:effectRef idx="0">
+            <a:schemeClr val="accent1"/>
+          </a:effectRef>
+          <a:fontRef idx="minor">
+            <a:schemeClr val="tx1"/>
+          </a:fontRef>
+        </p:style>
+      </p:cxnSp>
     </p:spTree>
     <p:extLst>
       <p:ext uri="{BB962C8B-B14F-4D97-AF65-F5344CB8AC3E}">
-        <p14:creationId xmlns:p14="http://schemas.microsoft.com/office/powerpoint/2010/main" val="129360929"/>
+        <p14:creationId xmlns:p14="http://schemas.microsoft.com/office/powerpoint/2010/main" val="4242681275"/>
       </p:ext>
     </p:extLst>
   </p:cSld>
@@ -6141,9 +7174,379 @@
   <p:timing>
     <p:tnLst>
       <p:par>
-        <p:cTn id="1" dur="indefinite" restart="never" nodeType="tmRoot"/>
+        <p:cTn id="1" dur="indefinite" restart="never" nodeType="tmRoot">
+          <p:childTnLst>
+            <p:seq concurrent="1" nextAc="seek">
+              <p:cTn id="2" dur="indefinite" nodeType="mainSeq">
+                <p:childTnLst>
+                  <p:par>
+                    <p:cTn id="3" fill="hold">
+                      <p:stCondLst>
+                        <p:cond delay="indefinite"/>
+                        <p:cond evt="onBegin" delay="0">
+                          <p:tn val="2"/>
+                        </p:cond>
+                      </p:stCondLst>
+                      <p:childTnLst>
+                        <p:par>
+                          <p:cTn id="4" fill="hold">
+                            <p:stCondLst>
+                              <p:cond delay="0"/>
+                            </p:stCondLst>
+                            <p:childTnLst>
+                              <p:par>
+                                <p:cTn id="5" presetID="1" presetClass="entr" presetSubtype="0" fill="hold" nodeType="withEffect">
+                                  <p:stCondLst>
+                                    <p:cond delay="0"/>
+                                  </p:stCondLst>
+                                  <p:childTnLst>
+                                    <p:set>
+                                      <p:cBhvr>
+                                        <p:cTn id="6" dur="1" fill="hold">
+                                          <p:stCondLst>
+                                            <p:cond delay="0"/>
+                                          </p:stCondLst>
+                                        </p:cTn>
+                                        <p:tgtEl>
+                                          <p:spTgt spid="4"/>
+                                        </p:tgtEl>
+                                        <p:attrNameLst>
+                                          <p:attrName>style.visibility</p:attrName>
+                                        </p:attrNameLst>
+                                      </p:cBhvr>
+                                      <p:to>
+                                        <p:strVal val="visible"/>
+                                      </p:to>
+                                    </p:set>
+                                  </p:childTnLst>
+                                </p:cTn>
+                              </p:par>
+                              <p:par>
+                                <p:cTn id="7" presetID="1" presetClass="entr" presetSubtype="0" fill="hold" nodeType="withEffect">
+                                  <p:stCondLst>
+                                    <p:cond delay="0"/>
+                                  </p:stCondLst>
+                                  <p:childTnLst>
+                                    <p:set>
+                                      <p:cBhvr>
+                                        <p:cTn id="8" dur="1" fill="hold">
+                                          <p:stCondLst>
+                                            <p:cond delay="0"/>
+                                          </p:stCondLst>
+                                        </p:cTn>
+                                        <p:tgtEl>
+                                          <p:spTgt spid="6"/>
+                                        </p:tgtEl>
+                                        <p:attrNameLst>
+                                          <p:attrName>style.visibility</p:attrName>
+                                        </p:attrNameLst>
+                                      </p:cBhvr>
+                                      <p:to>
+                                        <p:strVal val="visible"/>
+                                      </p:to>
+                                    </p:set>
+                                  </p:childTnLst>
+                                </p:cTn>
+                              </p:par>
+                            </p:childTnLst>
+                          </p:cTn>
+                        </p:par>
+                      </p:childTnLst>
+                    </p:cTn>
+                  </p:par>
+                  <p:par>
+                    <p:cTn id="9" fill="hold">
+                      <p:stCondLst>
+                        <p:cond delay="indefinite"/>
+                      </p:stCondLst>
+                      <p:childTnLst>
+                        <p:par>
+                          <p:cTn id="10" fill="hold">
+                            <p:stCondLst>
+                              <p:cond delay="0"/>
+                            </p:stCondLst>
+                            <p:childTnLst>
+                              <p:par>
+                                <p:cTn id="11" presetID="1" presetClass="entr" presetSubtype="0" fill="hold" grpId="0" nodeType="clickEffect">
+                                  <p:stCondLst>
+                                    <p:cond delay="0"/>
+                                  </p:stCondLst>
+                                  <p:childTnLst>
+                                    <p:set>
+                                      <p:cBhvr>
+                                        <p:cTn id="12" dur="1" fill="hold">
+                                          <p:stCondLst>
+                                            <p:cond delay="0"/>
+                                          </p:stCondLst>
+                                        </p:cTn>
+                                        <p:tgtEl>
+                                          <p:spTgt spid="7"/>
+                                        </p:tgtEl>
+                                        <p:attrNameLst>
+                                          <p:attrName>style.visibility</p:attrName>
+                                        </p:attrNameLst>
+                                      </p:cBhvr>
+                                      <p:to>
+                                        <p:strVal val="visible"/>
+                                      </p:to>
+                                    </p:set>
+                                  </p:childTnLst>
+                                </p:cTn>
+                              </p:par>
+                            </p:childTnLst>
+                          </p:cTn>
+                        </p:par>
+                      </p:childTnLst>
+                    </p:cTn>
+                  </p:par>
+                  <p:par>
+                    <p:cTn id="13" fill="hold">
+                      <p:stCondLst>
+                        <p:cond delay="indefinite"/>
+                      </p:stCondLst>
+                      <p:childTnLst>
+                        <p:par>
+                          <p:cTn id="14" fill="hold">
+                            <p:stCondLst>
+                              <p:cond delay="0"/>
+                            </p:stCondLst>
+                            <p:childTnLst>
+                              <p:par>
+                                <p:cTn id="15" presetID="22" presetClass="entr" presetSubtype="4" fill="hold" grpId="0" nodeType="clickEffect">
+                                  <p:stCondLst>
+                                    <p:cond delay="0"/>
+                                  </p:stCondLst>
+                                  <p:childTnLst>
+                                    <p:set>
+                                      <p:cBhvr>
+                                        <p:cTn id="16" dur="1" fill="hold">
+                                          <p:stCondLst>
+                                            <p:cond delay="0"/>
+                                          </p:stCondLst>
+                                        </p:cTn>
+                                        <p:tgtEl>
+                                          <p:spTgt spid="8"/>
+                                        </p:tgtEl>
+                                        <p:attrNameLst>
+                                          <p:attrName>style.visibility</p:attrName>
+                                        </p:attrNameLst>
+                                      </p:cBhvr>
+                                      <p:to>
+                                        <p:strVal val="visible"/>
+                                      </p:to>
+                                    </p:set>
+                                    <p:animEffect transition="in" filter="wipe(down)">
+                                      <p:cBhvr>
+                                        <p:cTn id="17" dur="500"/>
+                                        <p:tgtEl>
+                                          <p:spTgt spid="8"/>
+                                        </p:tgtEl>
+                                      </p:cBhvr>
+                                    </p:animEffect>
+                                  </p:childTnLst>
+                                </p:cTn>
+                              </p:par>
+                              <p:par>
+                                <p:cTn id="18" presetID="22" presetClass="entr" presetSubtype="4" fill="hold" nodeType="withEffect">
+                                  <p:stCondLst>
+                                    <p:cond delay="0"/>
+                                  </p:stCondLst>
+                                  <p:childTnLst>
+                                    <p:set>
+                                      <p:cBhvr>
+                                        <p:cTn id="19" dur="1" fill="hold">
+                                          <p:stCondLst>
+                                            <p:cond delay="0"/>
+                                          </p:stCondLst>
+                                        </p:cTn>
+                                        <p:tgtEl>
+                                          <p:spTgt spid="11"/>
+                                        </p:tgtEl>
+                                        <p:attrNameLst>
+                                          <p:attrName>style.visibility</p:attrName>
+                                        </p:attrNameLst>
+                                      </p:cBhvr>
+                                      <p:to>
+                                        <p:strVal val="visible"/>
+                                      </p:to>
+                                    </p:set>
+                                    <p:animEffect transition="in" filter="wipe(down)">
+                                      <p:cBhvr>
+                                        <p:cTn id="20" dur="500"/>
+                                        <p:tgtEl>
+                                          <p:spTgt spid="11"/>
+                                        </p:tgtEl>
+                                      </p:cBhvr>
+                                    </p:animEffect>
+                                  </p:childTnLst>
+                                </p:cTn>
+                              </p:par>
+                            </p:childTnLst>
+                          </p:cTn>
+                        </p:par>
+                      </p:childTnLst>
+                    </p:cTn>
+                  </p:par>
+                  <p:par>
+                    <p:cTn id="21" fill="hold">
+                      <p:stCondLst>
+                        <p:cond delay="indefinite"/>
+                      </p:stCondLst>
+                      <p:childTnLst>
+                        <p:par>
+                          <p:cTn id="22" fill="hold">
+                            <p:stCondLst>
+                              <p:cond delay="0"/>
+                            </p:stCondLst>
+                            <p:childTnLst>
+                              <p:par>
+                                <p:cTn id="23" presetID="1" presetClass="entr" presetSubtype="0" fill="hold" grpId="0" nodeType="clickEffect">
+                                  <p:stCondLst>
+                                    <p:cond delay="0"/>
+                                  </p:stCondLst>
+                                  <p:childTnLst>
+                                    <p:set>
+                                      <p:cBhvr>
+                                        <p:cTn id="24" dur="1" fill="hold">
+                                          <p:stCondLst>
+                                            <p:cond delay="0"/>
+                                          </p:stCondLst>
+                                        </p:cTn>
+                                        <p:tgtEl>
+                                          <p:spTgt spid="5"/>
+                                        </p:tgtEl>
+                                        <p:attrNameLst>
+                                          <p:attrName>style.visibility</p:attrName>
+                                        </p:attrNameLst>
+                                      </p:cBhvr>
+                                      <p:to>
+                                        <p:strVal val="visible"/>
+                                      </p:to>
+                                    </p:set>
+                                  </p:childTnLst>
+                                </p:cTn>
+                              </p:par>
+                            </p:childTnLst>
+                          </p:cTn>
+                        </p:par>
+                      </p:childTnLst>
+                    </p:cTn>
+                  </p:par>
+                  <p:par>
+                    <p:cTn id="25" fill="hold">
+                      <p:stCondLst>
+                        <p:cond delay="indefinite"/>
+                      </p:stCondLst>
+                      <p:childTnLst>
+                        <p:par>
+                          <p:cTn id="26" fill="hold">
+                            <p:stCondLst>
+                              <p:cond delay="0"/>
+                            </p:stCondLst>
+                            <p:childTnLst>
+                              <p:par>
+                                <p:cTn id="27" presetID="22" presetClass="entr" presetSubtype="4" fill="hold" nodeType="clickEffect">
+                                  <p:stCondLst>
+                                    <p:cond delay="0"/>
+                                  </p:stCondLst>
+                                  <p:childTnLst>
+                                    <p:set>
+                                      <p:cBhvr>
+                                        <p:cTn id="28" dur="1" fill="hold">
+                                          <p:stCondLst>
+                                            <p:cond delay="0"/>
+                                          </p:stCondLst>
+                                        </p:cTn>
+                                        <p:tgtEl>
+                                          <p:spTgt spid="10"/>
+                                        </p:tgtEl>
+                                        <p:attrNameLst>
+                                          <p:attrName>style.visibility</p:attrName>
+                                        </p:attrNameLst>
+                                      </p:cBhvr>
+                                      <p:to>
+                                        <p:strVal val="visible"/>
+                                      </p:to>
+                                    </p:set>
+                                    <p:animEffect transition="in" filter="wipe(down)">
+                                      <p:cBhvr>
+                                        <p:cTn id="29" dur="500"/>
+                                        <p:tgtEl>
+                                          <p:spTgt spid="10"/>
+                                        </p:tgtEl>
+                                      </p:cBhvr>
+                                    </p:animEffect>
+                                  </p:childTnLst>
+                                </p:cTn>
+                              </p:par>
+                              <p:par>
+                                <p:cTn id="30" presetID="22" presetClass="entr" presetSubtype="4" fill="hold" grpId="0" nodeType="withEffect">
+                                  <p:stCondLst>
+                                    <p:cond delay="0"/>
+                                  </p:stCondLst>
+                                  <p:childTnLst>
+                                    <p:set>
+                                      <p:cBhvr>
+                                        <p:cTn id="31" dur="1" fill="hold">
+                                          <p:stCondLst>
+                                            <p:cond delay="0"/>
+                                          </p:stCondLst>
+                                        </p:cTn>
+                                        <p:tgtEl>
+                                          <p:spTgt spid="9"/>
+                                        </p:tgtEl>
+                                        <p:attrNameLst>
+                                          <p:attrName>style.visibility</p:attrName>
+                                        </p:attrNameLst>
+                                      </p:cBhvr>
+                                      <p:to>
+                                        <p:strVal val="visible"/>
+                                      </p:to>
+                                    </p:set>
+                                    <p:animEffect transition="in" filter="wipe(down)">
+                                      <p:cBhvr>
+                                        <p:cTn id="32" dur="500"/>
+                                        <p:tgtEl>
+                                          <p:spTgt spid="9"/>
+                                        </p:tgtEl>
+                                      </p:cBhvr>
+                                    </p:animEffect>
+                                  </p:childTnLst>
+                                </p:cTn>
+                              </p:par>
+                            </p:childTnLst>
+                          </p:cTn>
+                        </p:par>
+                      </p:childTnLst>
+                    </p:cTn>
+                  </p:par>
+                </p:childTnLst>
+              </p:cTn>
+              <p:prevCondLst>
+                <p:cond evt="onPrev" delay="0">
+                  <p:tgtEl>
+                    <p:sldTgt/>
+                  </p:tgtEl>
+                </p:cond>
+              </p:prevCondLst>
+              <p:nextCondLst>
+                <p:cond evt="onNext" delay="0">
+                  <p:tgtEl>
+                    <p:sldTgt/>
+                  </p:tgtEl>
+                </p:cond>
+              </p:nextCondLst>
+            </p:seq>
+          </p:childTnLst>
+        </p:cTn>
       </p:par>
     </p:tnLst>
+    <p:bldLst>
+      <p:bldP spid="5" grpId="0" animBg="1"/>
+      <p:bldP spid="7" grpId="0" animBg="1"/>
+      <p:bldP spid="8" grpId="0" animBg="1"/>
+      <p:bldP spid="9" grpId="0" animBg="1"/>
+    </p:bldLst>
   </p:timing>
 </p:sld>
 </file>
@@ -6167,12 +7570,12 @@
       </p:grpSpPr>
       <p:sp>
         <p:nvSpPr>
-          <p:cNvPr id="2" name="Inhaltsplatzhalter 1"/>
-          <p:cNvSpPr>
-            <a:spLocks noGrp="1"/>
-          </p:cNvSpPr>
-          <p:nvPr>
-            <p:ph idx="1"/>
+          <p:cNvPr id="3" name="Titel 2"/>
+          <p:cNvSpPr>
+            <a:spLocks noGrp="1"/>
+          </p:cNvSpPr>
+          <p:nvPr>
+            <p:ph type="title"/>
           </p:nvPr>
         </p:nvSpPr>
         <p:spPr/>
@@ -6181,154 +7584,175 @@
           <a:lstStyle/>
           <a:p>
             <a:r>
-              <a:rPr lang="de-CH" dirty="0" err="1" smtClean="0"/>
-              <a:t>Deleting</a:t>
-            </a:r>
-            <a:r>
-              <a:rPr lang="de-CH" dirty="0" smtClean="0"/>
-              <a:t> a </a:t>
-            </a:r>
-            <a:r>
-              <a:rPr lang="de-CH" dirty="0" err="1" smtClean="0"/>
-              <a:t>new</a:t>
-            </a:r>
-            <a:r>
-              <a:rPr lang="de-CH" dirty="0" smtClean="0"/>
-              <a:t> </a:t>
-            </a:r>
-            <a:r>
-              <a:rPr lang="de-CH" dirty="0" err="1" smtClean="0"/>
-              <a:t>prescription</a:t>
-            </a:r>
-            <a:endParaRPr lang="de-CH" dirty="0" smtClean="0"/>
-          </a:p>
-          <a:p>
-            <a:endParaRPr lang="de-CH" dirty="0"/>
-          </a:p>
-          <a:p>
-            <a:endParaRPr lang="de-CH" dirty="0" smtClean="0"/>
-          </a:p>
-          <a:p>
-            <a:pPr marL="109728" indent="0">
-              <a:buNone/>
-            </a:pPr>
-            <a:endParaRPr lang="de-CH" dirty="0" smtClean="0"/>
-          </a:p>
-          <a:p>
-            <a:pPr marL="109728" indent="0">
-              <a:buNone/>
-            </a:pPr>
-            <a:endParaRPr lang="de-CH" dirty="0"/>
-          </a:p>
-        </p:txBody>
-      </p:sp>
-      <p:sp>
-        <p:nvSpPr>
-          <p:cNvPr id="3" name="Titel 2"/>
-          <p:cNvSpPr>
-            <a:spLocks noGrp="1"/>
-          </p:cNvSpPr>
-          <p:nvPr>
-            <p:ph type="title"/>
-          </p:nvPr>
-        </p:nvSpPr>
-        <p:spPr/>
-        <p:txBody>
-          <a:bodyPr/>
-          <a:lstStyle/>
-          <a:p>
-            <a:r>
-              <a:rPr lang="de-CH" dirty="0" err="1" smtClean="0"/>
+              <a:rPr lang="de-CH" dirty="0" err="1"/>
               <a:t>Contribution</a:t>
             </a:r>
             <a:r>
-              <a:rPr lang="de-CH" dirty="0" smtClean="0"/>
-              <a:t> Michel Murbach</a:t>
-            </a:r>
-            <a:endParaRPr lang="de-CH" dirty="0"/>
-          </a:p>
-        </p:txBody>
-      </p:sp>
-      <p:pic>
-        <p:nvPicPr>
-          <p:cNvPr id="4" name="Grafik 3"/>
-          <p:cNvPicPr>
-            <a:picLocks noChangeAspect="1"/>
-          </p:cNvPicPr>
-          <p:nvPr/>
-        </p:nvPicPr>
-        <p:blipFill>
-          <a:blip r:embed="rId2">
-            <a:extLst>
-              <a:ext uri="{28A0092B-C50C-407E-A947-70E740481C1C}">
-                <a14:useLocalDpi xmlns:a14="http://schemas.microsoft.com/office/drawing/2010/main" val="0"/>
-              </a:ext>
-            </a:extLst>
-          </a:blip>
-          <a:stretch>
-            <a:fillRect/>
-          </a:stretch>
-        </p:blipFill>
+              <a:rPr lang="de-CH" dirty="0"/>
+              <a:t> Mete Turna</a:t>
+            </a:r>
+          </a:p>
+        </p:txBody>
+      </p:sp>
+      <p:sp>
+        <p:nvSpPr>
+          <p:cNvPr id="5" name="Inhaltsplatzhalter 2"/>
+          <p:cNvSpPr>
+            <a:spLocks noGrp="1"/>
+          </p:cNvSpPr>
+          <p:nvPr>
+            <p:ph idx="1"/>
+          </p:nvPr>
+        </p:nvSpPr>
         <p:spPr>
           <a:xfrm>
-            <a:off x="794566" y="2132856"/>
-            <a:ext cx="7554868" cy="3615680"/>
+            <a:off x="251520" y="1825625"/>
+            <a:ext cx="8712968" cy="4351338"/>
           </a:xfrm>
-          <a:prstGeom prst="rect">
-            <a:avLst/>
-          </a:prstGeom>
         </p:spPr>
-      </p:pic>
-      <p:sp>
-        <p:nvSpPr>
-          <p:cNvPr id="5" name="Rechteck 4"/>
-          <p:cNvSpPr/>
-          <p:nvPr/>
-        </p:nvSpPr>
-        <p:spPr>
-          <a:xfrm>
-            <a:off x="2411760" y="5301208"/>
-            <a:ext cx="4896544" cy="360040"/>
-          </a:xfrm>
-          <a:prstGeom prst="rect">
-            <a:avLst/>
-          </a:prstGeom>
-          <a:noFill/>
-          <a:ln>
-            <a:solidFill>
-              <a:schemeClr val="accent2"/>
-            </a:solidFill>
-          </a:ln>
-        </p:spPr>
-        <p:style>
-          <a:lnRef idx="2">
-            <a:schemeClr val="accent1">
-              <a:shade val="50000"/>
-            </a:schemeClr>
-          </a:lnRef>
-          <a:fillRef idx="1">
-            <a:schemeClr val="accent1"/>
-          </a:fillRef>
-          <a:effectRef idx="0">
-            <a:schemeClr val="accent1"/>
-          </a:effectRef>
-          <a:fontRef idx="minor">
-            <a:schemeClr val="lt1"/>
-          </a:fontRef>
-        </p:style>
-        <p:txBody>
-          <a:bodyPr rtlCol="0" anchor="ctr"/>
+        <p:txBody>
+          <a:bodyPr>
+            <a:normAutofit/>
+          </a:bodyPr>
           <a:lstStyle/>
           <a:p>
-            <a:pPr algn="ctr"/>
-            <a:endParaRPr lang="en-GB"/>
+            <a:pPr>
+              <a:lnSpc>
+                <a:spcPct val="150000"/>
+              </a:lnSpc>
+            </a:pPr>
+            <a:r>
+              <a:rPr lang="de-CH" sz="2000" dirty="0" err="1"/>
+              <a:t>C</a:t>
+            </a:r>
+            <a:r>
+              <a:rPr lang="de-CH" sz="2000" dirty="0" err="1" smtClean="0"/>
+              <a:t>lasse</a:t>
+            </a:r>
+            <a:r>
+              <a:rPr lang="de-CH" sz="2000" dirty="0" smtClean="0"/>
+              <a:t>:		</a:t>
+            </a:r>
+            <a:r>
+              <a:rPr lang="de-CH" sz="2000" dirty="0" err="1" smtClean="0"/>
+              <a:t>MedicationEditModel</a:t>
+            </a:r>
+            <a:endParaRPr lang="de-CH" sz="2000" dirty="0" smtClean="0"/>
+          </a:p>
+          <a:p>
+            <a:pPr>
+              <a:lnSpc>
+                <a:spcPct val="150000"/>
+              </a:lnSpc>
+            </a:pPr>
+            <a:r>
+              <a:rPr lang="de-CH" sz="2000" dirty="0" err="1" smtClean="0"/>
+              <a:t>Function</a:t>
+            </a:r>
+            <a:r>
+              <a:rPr lang="de-CH" sz="2000" dirty="0" smtClean="0"/>
+              <a:t>:		</a:t>
+            </a:r>
+            <a:r>
+              <a:rPr lang="de-CH" sz="2000" dirty="0" smtClean="0"/>
+              <a:t>Read-</a:t>
+            </a:r>
+            <a:r>
+              <a:rPr lang="de-CH" sz="2000" dirty="0" smtClean="0"/>
+              <a:t>, Edit- &amp; Update-</a:t>
+            </a:r>
+            <a:r>
+              <a:rPr lang="de-CH" sz="2000" dirty="0" err="1" smtClean="0"/>
+              <a:t>Prescription</a:t>
+            </a:r>
+            <a:endParaRPr lang="de-CH" sz="2000" dirty="0" smtClean="0"/>
+          </a:p>
+          <a:p>
+            <a:pPr>
+              <a:lnSpc>
+                <a:spcPct val="150000"/>
+              </a:lnSpc>
+            </a:pPr>
+            <a:r>
+              <a:rPr lang="de-CH" sz="2000" dirty="0" smtClean="0"/>
+              <a:t>Methode:</a:t>
+            </a:r>
+            <a:r>
+              <a:rPr lang="de-CH" sz="2000" dirty="0" smtClean="0"/>
+              <a:t>		</a:t>
+            </a:r>
+            <a:r>
+              <a:rPr lang="de-CH" sz="2000" dirty="0" err="1" smtClean="0"/>
+              <a:t>loadData</a:t>
+            </a:r>
+            <a:r>
+              <a:rPr lang="de-CH" sz="2000" dirty="0" smtClean="0"/>
+              <a:t>(), </a:t>
+            </a:r>
+            <a:r>
+              <a:rPr lang="de-CH" sz="2000" dirty="0" err="1" smtClean="0"/>
+              <a:t>setPrescriptionTimeScheme</a:t>
+            </a:r>
+            <a:r>
+              <a:rPr lang="de-CH" sz="2000" dirty="0" smtClean="0"/>
+              <a:t>(…)</a:t>
+            </a:r>
+          </a:p>
+          <a:p>
+            <a:pPr>
+              <a:lnSpc>
+                <a:spcPct val="150000"/>
+              </a:lnSpc>
+            </a:pPr>
+            <a:r>
+              <a:rPr lang="de-CH" sz="2000" dirty="0" err="1" smtClean="0"/>
+              <a:t>Difficulties</a:t>
+            </a:r>
+            <a:r>
+              <a:rPr lang="de-CH" sz="2000" dirty="0"/>
+              <a:t>:</a:t>
+            </a:r>
+            <a:r>
+              <a:rPr lang="de-CH" sz="2000" dirty="0" smtClean="0"/>
+              <a:t>	</a:t>
+            </a:r>
+            <a:r>
+              <a:rPr lang="de-CH" sz="2000" dirty="0" smtClean="0"/>
+              <a:t>	Read </a:t>
+            </a:r>
+            <a:r>
+              <a:rPr lang="de-CH" sz="2000" dirty="0" smtClean="0"/>
+              <a:t>&amp; Update von </a:t>
+            </a:r>
+            <a:r>
+              <a:rPr lang="de-CH" sz="2000" dirty="0" err="1" smtClean="0"/>
+              <a:t>PrescriptionTimeS</a:t>
+            </a:r>
+            <a:r>
+              <a:rPr lang="de-CH" sz="2000" dirty="0" smtClean="0"/>
+              <a:t>.(…)</a:t>
+            </a:r>
+          </a:p>
+          <a:p>
+            <a:pPr>
+              <a:lnSpc>
+                <a:spcPct val="150000"/>
+              </a:lnSpc>
+            </a:pPr>
+            <a:r>
+              <a:rPr lang="de-CH" sz="2000" dirty="0" smtClean="0"/>
+              <a:t>Validation:											</a:t>
+            </a:r>
+          </a:p>
+          <a:p>
+            <a:endParaRPr lang="de-CH" sz="2000" dirty="0"/>
           </a:p>
         </p:txBody>
       </p:sp>
     </p:spTree>
     <p:extLst>
       <p:ext uri="{BB962C8B-B14F-4D97-AF65-F5344CB8AC3E}">
-        <p14:creationId xmlns:p14="http://schemas.microsoft.com/office/powerpoint/2010/main" val="2381130454"/>
+        <p14:creationId xmlns:p14="http://schemas.microsoft.com/office/powerpoint/2010/main" val="2881685582"/>
       </p:ext>
     </p:extLst>
   </p:cSld>
@@ -6338,7 +7762,128 @@
   <p:timing>
     <p:tnLst>
       <p:par>
-        <p:cTn id="1" dur="indefinite" restart="never" nodeType="tmRoot"/>
+        <p:cTn id="1" dur="indefinite" restart="never" nodeType="tmRoot">
+          <p:childTnLst>
+            <p:seq concurrent="1" nextAc="seek">
+              <p:cTn id="2" dur="indefinite" nodeType="mainSeq">
+                <p:childTnLst>
+                  <p:par>
+                    <p:cTn id="3" fill="hold">
+                      <p:stCondLst>
+                        <p:cond delay="indefinite"/>
+                      </p:stCondLst>
+                      <p:childTnLst>
+                        <p:par>
+                          <p:cTn id="4" fill="hold">
+                            <p:stCondLst>
+                              <p:cond delay="0"/>
+                            </p:stCondLst>
+                            <p:childTnLst>
+                              <p:par>
+                                <p:cTn id="5" presetID="1" presetClass="entr" presetSubtype="0" fill="hold" nodeType="clickEffect">
+                                  <p:stCondLst>
+                                    <p:cond delay="0"/>
+                                  </p:stCondLst>
+                                  <p:childTnLst>
+                                    <p:set>
+                                      <p:cBhvr>
+                                        <p:cTn id="6" dur="1" fill="hold">
+                                          <p:stCondLst>
+                                            <p:cond delay="0"/>
+                                          </p:stCondLst>
+                                        </p:cTn>
+                                        <p:tgtEl>
+                                          <p:spTgt spid="5">
+                                            <p:txEl>
+                                              <p:pRg st="3" end="3"/>
+                                            </p:txEl>
+                                          </p:spTgt>
+                                        </p:tgtEl>
+                                        <p:attrNameLst>
+                                          <p:attrName>style.visibility</p:attrName>
+                                        </p:attrNameLst>
+                                      </p:cBhvr>
+                                      <p:to>
+                                        <p:strVal val="visible"/>
+                                      </p:to>
+                                    </p:set>
+                                  </p:childTnLst>
+                                </p:cTn>
+                              </p:par>
+                            </p:childTnLst>
+                          </p:cTn>
+                        </p:par>
+                      </p:childTnLst>
+                    </p:cTn>
+                  </p:par>
+                  <p:par>
+                    <p:cTn id="7" fill="hold">
+                      <p:stCondLst>
+                        <p:cond delay="indefinite"/>
+                      </p:stCondLst>
+                      <p:childTnLst>
+                        <p:par>
+                          <p:cTn id="8" fill="hold">
+                            <p:stCondLst>
+                              <p:cond delay="0"/>
+                            </p:stCondLst>
+                            <p:childTnLst>
+                              <p:par>
+                                <p:cTn id="9" presetID="1" presetClass="entr" presetSubtype="0" fill="hold" nodeType="clickEffect">
+                                  <p:stCondLst>
+                                    <p:cond delay="0"/>
+                                  </p:stCondLst>
+                                  <p:childTnLst>
+                                    <p:set>
+                                      <p:cBhvr>
+                                        <p:cTn id="10" dur="1" fill="hold">
+                                          <p:stCondLst>
+                                            <p:cond delay="0"/>
+                                          </p:stCondLst>
+                                        </p:cTn>
+                                        <p:tgtEl>
+                                          <p:spTgt spid="5">
+                                            <p:txEl>
+                                              <p:pRg st="4" end="4"/>
+                                            </p:txEl>
+                                          </p:spTgt>
+                                        </p:tgtEl>
+                                        <p:attrNameLst>
+                                          <p:attrName>style.visibility</p:attrName>
+                                        </p:attrNameLst>
+                                      </p:cBhvr>
+                                      <p:to>
+                                        <p:strVal val="visible"/>
+                                      </p:to>
+                                    </p:set>
+                                  </p:childTnLst>
+                                </p:cTn>
+                              </p:par>
+                            </p:childTnLst>
+                          </p:cTn>
+                        </p:par>
+                      </p:childTnLst>
+                    </p:cTn>
+                  </p:par>
+                </p:childTnLst>
+              </p:cTn>
+              <p:prevCondLst>
+                <p:cond evt="onPrev" delay="0">
+                  <p:tgtEl>
+                    <p:sldTgt/>
+                  </p:tgtEl>
+                </p:cond>
+              </p:prevCondLst>
+              <p:nextCondLst>
+                <p:cond evt="onNext" delay="0">
+                  <p:tgtEl>
+                    <p:sldTgt/>
+                  </p:tgtEl>
+                </p:cond>
+              </p:nextCondLst>
+            </p:seq>
+          </p:childTnLst>
+        </p:cTn>
       </p:par>
     </p:tnLst>
   </p:timing>

</xml_diff>

<commit_message>
Added my slides for Presentation.
</commit_message>
<xml_diff>
--- a/Documents/Task 14/Task 14.pptx
+++ b/Documents/Task 14/Task 14.pptx
@@ -20,6 +20,15 @@
     <p:sldId id="268" r:id="rId14"/>
     <p:sldId id="269" r:id="rId15"/>
     <p:sldId id="263" r:id="rId16"/>
+    <p:sldId id="273" r:id="rId17"/>
+    <p:sldId id="274" r:id="rId18"/>
+    <p:sldId id="275" r:id="rId19"/>
+    <p:sldId id="276" r:id="rId20"/>
+    <p:sldId id="277" r:id="rId21"/>
+    <p:sldId id="278" r:id="rId22"/>
+    <p:sldId id="279" r:id="rId23"/>
+    <p:sldId id="280" r:id="rId24"/>
+    <p:sldId id="281" r:id="rId25"/>
   </p:sldIdLst>
   <p:sldSz cx="9144000" cy="6858000" type="screen4x3"/>
   <p:notesSz cx="6858000" cy="9144000"/>
@@ -120,7 +129,7 @@
   </p:defaultTextStyle>
   <p:extLst>
     <p:ext uri="{EFAFB233-063F-42B5-8137-9DF3F51BA10A}">
-      <p15:sldGuideLst xmlns:p15="http://schemas.microsoft.com/office/powerpoint/2012/main">
+      <p15:sldGuideLst xmlns:p15="http://schemas.microsoft.com/office/powerpoint/2012/main" xmlns="">
         <p15:guide id="1" orient="horz" pos="2160">
           <p15:clr>
             <a:srgbClr val="A4A3A4"/>
@@ -754,7 +763,7 @@
           <a:p>
             <a:fld id="{47B9CC14-C19A-4133-BA5B-215623135375}" type="datetimeFigureOut">
               <a:rPr lang="de-CH" smtClean="0"/>
-              <a:t>tt.01.jjjj</a:t>
+              <a:t>21.01.2016</a:t>
             </a:fld>
             <a:endParaRPr lang="de-CH"/>
           </a:p>
@@ -816,7 +825,7 @@
           <a:p>
             <a:fld id="{4DF08790-157B-4E45-B901-26B96E067316}" type="slidenum">
               <a:rPr lang="de-CH" smtClean="0"/>
-              <a:t>‹Nr.›</a:t>
+              <a:t>‹#›</a:t>
             </a:fld>
             <a:endParaRPr lang="de-CH"/>
           </a:p>
@@ -944,7 +953,7 @@
           <a:p>
             <a:fld id="{47B9CC14-C19A-4133-BA5B-215623135375}" type="datetimeFigureOut">
               <a:rPr lang="de-CH" smtClean="0"/>
-              <a:t>tt.01.jjjj</a:t>
+              <a:t>21.01.2016</a:t>
             </a:fld>
             <a:endParaRPr lang="de-CH"/>
           </a:p>
@@ -986,7 +995,7 @@
           <a:p>
             <a:fld id="{4DF08790-157B-4E45-B901-26B96E067316}" type="slidenum">
               <a:rPr lang="de-CH" smtClean="0"/>
-              <a:t>‹Nr.›</a:t>
+              <a:t>‹#›</a:t>
             </a:fld>
             <a:endParaRPr lang="de-CH"/>
           </a:p>
@@ -1119,7 +1128,7 @@
           <a:p>
             <a:fld id="{47B9CC14-C19A-4133-BA5B-215623135375}" type="datetimeFigureOut">
               <a:rPr lang="de-CH" smtClean="0"/>
-              <a:t>tt.01.jjjj</a:t>
+              <a:t>21.01.2016</a:t>
             </a:fld>
             <a:endParaRPr lang="de-CH"/>
           </a:p>
@@ -1161,7 +1170,7 @@
           <a:p>
             <a:fld id="{4DF08790-157B-4E45-B901-26B96E067316}" type="slidenum">
               <a:rPr lang="de-CH" smtClean="0"/>
-              <a:t>‹Nr.›</a:t>
+              <a:t>‹#›</a:t>
             </a:fld>
             <a:endParaRPr lang="de-CH"/>
           </a:p>
@@ -1261,7 +1270,7 @@
           <a:p>
             <a:fld id="{47B9CC14-C19A-4133-BA5B-215623135375}" type="datetimeFigureOut">
               <a:rPr lang="de-CH" smtClean="0"/>
-              <a:t>tt.01.jjjj</a:t>
+              <a:t>21.01.2016</a:t>
             </a:fld>
             <a:endParaRPr lang="de-CH"/>
           </a:p>
@@ -1303,7 +1312,7 @@
           <a:p>
             <a:fld id="{4DF08790-157B-4E45-B901-26B96E067316}" type="slidenum">
               <a:rPr lang="de-CH" smtClean="0"/>
-              <a:t>‹Nr.›</a:t>
+              <a:t>‹#›</a:t>
             </a:fld>
             <a:endParaRPr lang="de-CH"/>
           </a:p>
@@ -1508,7 +1517,7 @@
           <a:p>
             <a:fld id="{47B9CC14-C19A-4133-BA5B-215623135375}" type="datetimeFigureOut">
               <a:rPr lang="de-CH" smtClean="0"/>
-              <a:t>tt.01.jjjj</a:t>
+              <a:t>21.01.2016</a:t>
             </a:fld>
             <a:endParaRPr lang="de-CH"/>
           </a:p>
@@ -1550,7 +1559,7 @@
           <a:p>
             <a:fld id="{4DF08790-157B-4E45-B901-26B96E067316}" type="slidenum">
               <a:rPr lang="de-CH" smtClean="0"/>
-              <a:t>‹Nr.›</a:t>
+              <a:t>‹#›</a:t>
             </a:fld>
             <a:endParaRPr lang="de-CH"/>
           </a:p>
@@ -1907,7 +1916,7 @@
           <a:p>
             <a:fld id="{47B9CC14-C19A-4133-BA5B-215623135375}" type="datetimeFigureOut">
               <a:rPr lang="de-CH" smtClean="0"/>
-              <a:t>tt.01.jjjj</a:t>
+              <a:t>21.01.2016</a:t>
             </a:fld>
             <a:endParaRPr lang="de-CH"/>
           </a:p>
@@ -1949,7 +1958,7 @@
           <a:p>
             <a:fld id="{4DF08790-157B-4E45-B901-26B96E067316}" type="slidenum">
               <a:rPr lang="de-CH" smtClean="0"/>
-              <a:t>‹Nr.›</a:t>
+              <a:t>‹#›</a:t>
             </a:fld>
             <a:endParaRPr lang="de-CH"/>
           </a:p>
@@ -2345,7 +2354,7 @@
           <a:p>
             <a:fld id="{47B9CC14-C19A-4133-BA5B-215623135375}" type="datetimeFigureOut">
               <a:rPr lang="de-CH" smtClean="0"/>
-              <a:t>tt.01.jjjj</a:t>
+              <a:t>21.01.2016</a:t>
             </a:fld>
             <a:endParaRPr lang="de-CH"/>
           </a:p>
@@ -2387,7 +2396,7 @@
           <a:p>
             <a:fld id="{4DF08790-157B-4E45-B901-26B96E067316}" type="slidenum">
               <a:rPr lang="de-CH" smtClean="0"/>
-              <a:t>‹Nr.›</a:t>
+              <a:t>‹#›</a:t>
             </a:fld>
             <a:endParaRPr lang="de-CH"/>
           </a:p>
@@ -2440,7 +2449,7 @@
           <a:p>
             <a:fld id="{47B9CC14-C19A-4133-BA5B-215623135375}" type="datetimeFigureOut">
               <a:rPr lang="de-CH" smtClean="0"/>
-              <a:t>tt.01.jjjj</a:t>
+              <a:t>21.01.2016</a:t>
             </a:fld>
             <a:endParaRPr lang="de-CH"/>
           </a:p>
@@ -2482,7 +2491,7 @@
           <a:p>
             <a:fld id="{4DF08790-157B-4E45-B901-26B96E067316}" type="slidenum">
               <a:rPr lang="de-CH" smtClean="0"/>
-              <a:t>‹Nr.›</a:t>
+              <a:t>‹#›</a:t>
             </a:fld>
             <a:endParaRPr lang="de-CH"/>
           </a:p>
@@ -2553,7 +2562,7 @@
           <a:p>
             <a:fld id="{47B9CC14-C19A-4133-BA5B-215623135375}" type="datetimeFigureOut">
               <a:rPr lang="de-CH" smtClean="0"/>
-              <a:t>tt.01.jjjj</a:t>
+              <a:t>21.01.2016</a:t>
             </a:fld>
             <a:endParaRPr lang="de-CH"/>
           </a:p>
@@ -2595,7 +2604,7 @@
           <a:p>
             <a:fld id="{4DF08790-157B-4E45-B901-26B96E067316}" type="slidenum">
               <a:rPr lang="de-CH" smtClean="0"/>
-              <a:t>‹Nr.›</a:t>
+              <a:t>‹#›</a:t>
             </a:fld>
             <a:endParaRPr lang="de-CH"/>
           </a:p>
@@ -2821,7 +2830,7 @@
           <a:p>
             <a:fld id="{47B9CC14-C19A-4133-BA5B-215623135375}" type="datetimeFigureOut">
               <a:rPr lang="de-CH" smtClean="0"/>
-              <a:t>tt.01.jjjj</a:t>
+              <a:t>21.01.2016</a:t>
             </a:fld>
             <a:endParaRPr lang="de-CH"/>
           </a:p>
@@ -2863,7 +2872,7 @@
           <a:p>
             <a:fld id="{4DF08790-157B-4E45-B901-26B96E067316}" type="slidenum">
               <a:rPr lang="de-CH" smtClean="0"/>
-              <a:t>‹Nr.›</a:t>
+              <a:t>‹#›</a:t>
             </a:fld>
             <a:endParaRPr lang="de-CH"/>
           </a:p>
@@ -3022,7 +3031,7 @@
           <a:p>
             <a:fld id="{47B9CC14-C19A-4133-BA5B-215623135375}" type="datetimeFigureOut">
               <a:rPr lang="de-CH" smtClean="0"/>
-              <a:t>tt.01.jjjj</a:t>
+              <a:t>21.01.2016</a:t>
             </a:fld>
             <a:endParaRPr lang="de-CH"/>
           </a:p>
@@ -3087,7 +3096,7 @@
           <a:p>
             <a:fld id="{4DF08790-157B-4E45-B901-26B96E067316}" type="slidenum">
               <a:rPr lang="de-CH" smtClean="0"/>
-              <a:t>‹Nr.›</a:t>
+              <a:t>‹#›</a:t>
             </a:fld>
             <a:endParaRPr lang="de-CH"/>
           </a:p>
@@ -4111,7 +4120,7 @@
           <a:p>
             <a:fld id="{47B9CC14-C19A-4133-BA5B-215623135375}" type="datetimeFigureOut">
               <a:rPr lang="de-CH" smtClean="0"/>
-              <a:t>tt.01.jjjj</a:t>
+              <a:t>21.01.2016</a:t>
             </a:fld>
             <a:endParaRPr lang="de-CH"/>
           </a:p>
@@ -4187,7 +4196,7 @@
           <a:p>
             <a:fld id="{4DF08790-157B-4E45-B901-26B96E067316}" type="slidenum">
               <a:rPr lang="de-CH" smtClean="0"/>
-              <a:t>‹Nr.›</a:t>
+              <a:t>‹#›</a:t>
             </a:fld>
             <a:endParaRPr lang="de-CH"/>
           </a:p>
@@ -5650,6 +5659,878 @@
 </p:sld>
 </file>
 
+<file path=ppt/slides/slide16.xml><?xml version="1.0" encoding="utf-8"?>
+<p:sld xmlns:a="http://schemas.openxmlformats.org/drawingml/2006/main" xmlns:r="http://schemas.openxmlformats.org/officeDocument/2006/relationships" xmlns:p="http://schemas.openxmlformats.org/presentationml/2006/main">
+  <p:cSld>
+    <p:spTree>
+      <p:nvGrpSpPr>
+        <p:cNvPr id="1" name=""/>
+        <p:cNvGrpSpPr/>
+        <p:nvPr/>
+      </p:nvGrpSpPr>
+      <p:grpSpPr>
+        <a:xfrm>
+          <a:off x="0" y="0"/>
+          <a:ext cx="0" cy="0"/>
+          <a:chOff x="0" y="0"/>
+          <a:chExt cx="0" cy="0"/>
+        </a:xfrm>
+      </p:grpSpPr>
+      <p:sp>
+        <p:nvSpPr>
+          <p:cNvPr id="2" name="Content Placeholder 1"/>
+          <p:cNvSpPr>
+            <a:spLocks noGrp="1"/>
+          </p:cNvSpPr>
+          <p:nvPr>
+            <p:ph idx="1"/>
+          </p:nvPr>
+        </p:nvSpPr>
+        <p:spPr/>
+        <p:txBody>
+          <a:bodyPr/>
+          <a:lstStyle/>
+          <a:p>
+            <a:r>
+              <a:rPr lang="de-CH" dirty="0"/>
+              <a:t>Creating Overview of </a:t>
+            </a:r>
+            <a:r>
+              <a:rPr lang="de-CH" dirty="0" smtClean="0"/>
+              <a:t>Medication</a:t>
+            </a:r>
+          </a:p>
+          <a:p>
+            <a:r>
+              <a:rPr lang="de-CH" dirty="0" smtClean="0"/>
+              <a:t>Creating MedicationInsertView</a:t>
+            </a:r>
+            <a:endParaRPr lang="de-CH" dirty="0"/>
+          </a:p>
+          <a:p>
+            <a:r>
+              <a:rPr lang="de-CH" dirty="0" smtClean="0"/>
+              <a:t>mytheme.scss </a:t>
+            </a:r>
+          </a:p>
+          <a:p>
+            <a:pPr lvl="1"/>
+            <a:r>
+              <a:rPr lang="de-CH" dirty="0" smtClean="0"/>
+              <a:t>Panel </a:t>
+            </a:r>
+            <a:r>
+              <a:rPr lang="de-DE" dirty="0" smtClean="0"/>
+              <a:t>Alignment</a:t>
+            </a:r>
+          </a:p>
+          <a:p>
+            <a:pPr lvl="1"/>
+            <a:r>
+              <a:rPr lang="en-US" dirty="0" smtClean="0"/>
+              <a:t>Table selected row</a:t>
+            </a:r>
+            <a:endParaRPr lang="de-CH" dirty="0"/>
+          </a:p>
+          <a:p>
+            <a:pPr marL="109728" indent="0">
+              <a:buNone/>
+            </a:pPr>
+            <a:endParaRPr lang="de-CH" dirty="0"/>
+          </a:p>
+        </p:txBody>
+      </p:sp>
+      <p:sp>
+        <p:nvSpPr>
+          <p:cNvPr id="3" name="Title 2"/>
+          <p:cNvSpPr>
+            <a:spLocks noGrp="1"/>
+          </p:cNvSpPr>
+          <p:nvPr>
+            <p:ph type="title"/>
+          </p:nvPr>
+        </p:nvSpPr>
+        <p:spPr/>
+        <p:txBody>
+          <a:bodyPr/>
+          <a:lstStyle/>
+          <a:p>
+            <a:r>
+              <a:rPr lang="de-CH" dirty="0"/>
+              <a:t>Contribution </a:t>
+            </a:r>
+            <a:r>
+              <a:rPr lang="de-CH" dirty="0" smtClean="0"/>
+              <a:t>Amin Ghodrati</a:t>
+            </a:r>
+            <a:endParaRPr lang="de-DE" dirty="0"/>
+          </a:p>
+        </p:txBody>
+      </p:sp>
+    </p:spTree>
+    <p:extLst>
+      <p:ext uri="{BB962C8B-B14F-4D97-AF65-F5344CB8AC3E}">
+        <p14:creationId xmlns:p14="http://schemas.microsoft.com/office/powerpoint/2010/main" val="3968257018"/>
+      </p:ext>
+    </p:extLst>
+  </p:cSld>
+  <p:clrMapOvr>
+    <a:masterClrMapping/>
+  </p:clrMapOvr>
+  <p:timing>
+    <p:tnLst>
+      <p:par>
+        <p:cTn id="1" dur="indefinite" restart="never" nodeType="tmRoot"/>
+      </p:par>
+    </p:tnLst>
+  </p:timing>
+</p:sld>
+</file>
+
+<file path=ppt/slides/slide17.xml><?xml version="1.0" encoding="utf-8"?>
+<p:sld xmlns:a="http://schemas.openxmlformats.org/drawingml/2006/main" xmlns:r="http://schemas.openxmlformats.org/officeDocument/2006/relationships" xmlns:p="http://schemas.openxmlformats.org/presentationml/2006/main">
+  <p:cSld>
+    <p:spTree>
+      <p:nvGrpSpPr>
+        <p:cNvPr id="1" name=""/>
+        <p:cNvGrpSpPr/>
+        <p:nvPr/>
+      </p:nvGrpSpPr>
+      <p:grpSpPr>
+        <a:xfrm>
+          <a:off x="0" y="0"/>
+          <a:ext cx="0" cy="0"/>
+          <a:chOff x="0" y="0"/>
+          <a:chExt cx="0" cy="0"/>
+        </a:xfrm>
+      </p:grpSpPr>
+      <p:pic>
+        <p:nvPicPr>
+          <p:cNvPr id="4" name="Content Placeholder 3"/>
+          <p:cNvPicPr>
+            <a:picLocks noGrp="1" noChangeAspect="1"/>
+          </p:cNvPicPr>
+          <p:nvPr>
+            <p:ph idx="1"/>
+          </p:nvPr>
+        </p:nvPicPr>
+        <p:blipFill>
+          <a:blip r:embed="rId2">
+            <a:extLst>
+              <a:ext uri="{28A0092B-C50C-407E-A947-70E740481C1C}">
+                <a14:useLocalDpi xmlns:a14="http://schemas.microsoft.com/office/drawing/2010/main" val="0"/>
+              </a:ext>
+            </a:extLst>
+          </a:blip>
+          <a:stretch>
+            <a:fillRect/>
+          </a:stretch>
+        </p:blipFill>
+        <p:spPr>
+          <a:xfrm>
+            <a:off x="899592" y="1481137"/>
+            <a:ext cx="7200799" cy="5046428"/>
+          </a:xfrm>
+        </p:spPr>
+      </p:pic>
+      <p:sp>
+        <p:nvSpPr>
+          <p:cNvPr id="3" name="Title 2"/>
+          <p:cNvSpPr>
+            <a:spLocks noGrp="1"/>
+          </p:cNvSpPr>
+          <p:nvPr>
+            <p:ph type="title"/>
+          </p:nvPr>
+        </p:nvSpPr>
+        <p:spPr/>
+        <p:txBody>
+          <a:bodyPr>
+            <a:normAutofit/>
+          </a:bodyPr>
+          <a:lstStyle/>
+          <a:p>
+            <a:pPr algn="ctr"/>
+            <a:r>
+              <a:rPr lang="de-CH" dirty="0" smtClean="0"/>
+              <a:t>MedicationOverView</a:t>
+            </a:r>
+            <a:endParaRPr lang="de-CH" dirty="0"/>
+          </a:p>
+        </p:txBody>
+      </p:sp>
+    </p:spTree>
+    <p:extLst>
+      <p:ext uri="{BB962C8B-B14F-4D97-AF65-F5344CB8AC3E}">
+        <p14:creationId xmlns:p14="http://schemas.microsoft.com/office/powerpoint/2010/main" val="1548017955"/>
+      </p:ext>
+    </p:extLst>
+  </p:cSld>
+  <p:clrMapOvr>
+    <a:masterClrMapping/>
+  </p:clrMapOvr>
+  <p:timing>
+    <p:tnLst>
+      <p:par>
+        <p:cTn id="1" dur="indefinite" restart="never" nodeType="tmRoot"/>
+      </p:par>
+    </p:tnLst>
+  </p:timing>
+</p:sld>
+</file>
+
+<file path=ppt/slides/slide18.xml><?xml version="1.0" encoding="utf-8"?>
+<p:sld xmlns:a="http://schemas.openxmlformats.org/drawingml/2006/main" xmlns:r="http://schemas.openxmlformats.org/officeDocument/2006/relationships" xmlns:p="http://schemas.openxmlformats.org/presentationml/2006/main">
+  <p:cSld>
+    <p:spTree>
+      <p:nvGrpSpPr>
+        <p:cNvPr id="1" name=""/>
+        <p:cNvGrpSpPr/>
+        <p:nvPr/>
+      </p:nvGrpSpPr>
+      <p:grpSpPr>
+        <a:xfrm>
+          <a:off x="0" y="0"/>
+          <a:ext cx="0" cy="0"/>
+          <a:chOff x="0" y="0"/>
+          <a:chExt cx="0" cy="0"/>
+        </a:xfrm>
+      </p:grpSpPr>
+      <p:pic>
+        <p:nvPicPr>
+          <p:cNvPr id="4" name="Content Placeholder 3"/>
+          <p:cNvPicPr>
+            <a:picLocks noGrp="1" noChangeAspect="1"/>
+          </p:cNvPicPr>
+          <p:nvPr>
+            <p:ph idx="1"/>
+          </p:nvPr>
+        </p:nvPicPr>
+        <p:blipFill>
+          <a:blip r:embed="rId2">
+            <a:extLst>
+              <a:ext uri="{BEBA8EAE-BF5A-486C-A8C5-ECC9F3942E4B}">
+                <a14:imgProps xmlns:a14="http://schemas.microsoft.com/office/drawing/2010/main">
+                  <a14:imgLayer r:embed="rId3">
+                    <a14:imgEffect>
+                      <a14:brightnessContrast bright="20000" contrast="-40000"/>
+                    </a14:imgEffect>
+                  </a14:imgLayer>
+                </a14:imgProps>
+              </a:ext>
+              <a:ext uri="{28A0092B-C50C-407E-A947-70E740481C1C}">
+                <a14:useLocalDpi xmlns:a14="http://schemas.microsoft.com/office/drawing/2010/main" val="0"/>
+              </a:ext>
+            </a:extLst>
+          </a:blip>
+          <a:stretch>
+            <a:fillRect/>
+          </a:stretch>
+        </p:blipFill>
+        <p:spPr>
+          <a:xfrm>
+            <a:off x="971600" y="1484784"/>
+            <a:ext cx="7197629" cy="5044206"/>
+          </a:xfrm>
+        </p:spPr>
+      </p:pic>
+      <p:sp>
+        <p:nvSpPr>
+          <p:cNvPr id="3" name="Title 2"/>
+          <p:cNvSpPr>
+            <a:spLocks noGrp="1"/>
+          </p:cNvSpPr>
+          <p:nvPr>
+            <p:ph type="title"/>
+          </p:nvPr>
+        </p:nvSpPr>
+        <p:spPr/>
+        <p:txBody>
+          <a:bodyPr/>
+          <a:lstStyle/>
+          <a:p>
+            <a:pPr algn="ctr"/>
+            <a:r>
+              <a:rPr lang="de-CH" dirty="0"/>
+              <a:t>MedicationOverView</a:t>
+            </a:r>
+            <a:endParaRPr lang="de-DE" dirty="0"/>
+          </a:p>
+        </p:txBody>
+      </p:sp>
+      <p:sp>
+        <p:nvSpPr>
+          <p:cNvPr id="5" name="Rectangle 4"/>
+          <p:cNvSpPr/>
+          <p:nvPr/>
+        </p:nvSpPr>
+        <p:spPr>
+          <a:xfrm>
+            <a:off x="1259632" y="1988840"/>
+            <a:ext cx="6696744" cy="360040"/>
+          </a:xfrm>
+          <a:prstGeom prst="rect">
+            <a:avLst/>
+          </a:prstGeom>
+          <a:noFill/>
+          <a:ln w="57150" cap="sq" cmpd="sng">
+            <a:solidFill>
+              <a:srgbClr val="FF0000"/>
+            </a:solidFill>
+          </a:ln>
+        </p:spPr>
+        <p:style>
+          <a:lnRef idx="2">
+            <a:schemeClr val="accent1">
+              <a:shade val="50000"/>
+            </a:schemeClr>
+          </a:lnRef>
+          <a:fillRef idx="1">
+            <a:schemeClr val="accent1"/>
+          </a:fillRef>
+          <a:effectRef idx="0">
+            <a:schemeClr val="accent1"/>
+          </a:effectRef>
+          <a:fontRef idx="minor">
+            <a:schemeClr val="lt1"/>
+          </a:fontRef>
+        </p:style>
+        <p:txBody>
+          <a:bodyPr rtlCol="0" anchor="ctr"/>
+          <a:lstStyle/>
+          <a:p>
+            <a:pPr algn="ctr"/>
+            <a:endParaRPr lang="de-DE">
+              <a:solidFill>
+                <a:srgbClr val="FF0000"/>
+              </a:solidFill>
+            </a:endParaRPr>
+          </a:p>
+        </p:txBody>
+      </p:sp>
+      <p:sp>
+        <p:nvSpPr>
+          <p:cNvPr id="6" name="Rectangle 5"/>
+          <p:cNvSpPr/>
+          <p:nvPr/>
+        </p:nvSpPr>
+        <p:spPr>
+          <a:xfrm>
+            <a:off x="1259632" y="2348880"/>
+            <a:ext cx="6696744" cy="4104456"/>
+          </a:xfrm>
+          <a:prstGeom prst="rect">
+            <a:avLst/>
+          </a:prstGeom>
+          <a:noFill/>
+          <a:ln cmpd="sng">
+            <a:solidFill>
+              <a:srgbClr val="FF0000"/>
+            </a:solidFill>
+          </a:ln>
+        </p:spPr>
+        <p:style>
+          <a:lnRef idx="2">
+            <a:schemeClr val="accent1">
+              <a:shade val="50000"/>
+            </a:schemeClr>
+          </a:lnRef>
+          <a:fillRef idx="1">
+            <a:schemeClr val="accent1"/>
+          </a:fillRef>
+          <a:effectRef idx="0">
+            <a:schemeClr val="accent1"/>
+          </a:effectRef>
+          <a:fontRef idx="minor">
+            <a:schemeClr val="lt1"/>
+          </a:fontRef>
+        </p:style>
+        <p:txBody>
+          <a:bodyPr rtlCol="0" anchor="ctr"/>
+          <a:lstStyle/>
+          <a:p>
+            <a:pPr algn="ctr"/>
+            <a:endParaRPr lang="de-DE" dirty="0">
+              <a:solidFill>
+                <a:srgbClr val="FF0000"/>
+              </a:solidFill>
+            </a:endParaRPr>
+          </a:p>
+        </p:txBody>
+      </p:sp>
+      <p:sp>
+        <p:nvSpPr>
+          <p:cNvPr id="7" name="Rectangle 6"/>
+          <p:cNvSpPr/>
+          <p:nvPr/>
+        </p:nvSpPr>
+        <p:spPr>
+          <a:xfrm>
+            <a:off x="1547664" y="2348880"/>
+            <a:ext cx="6120680" cy="4104456"/>
+          </a:xfrm>
+          <a:prstGeom prst="rect">
+            <a:avLst/>
+          </a:prstGeom>
+          <a:noFill/>
+          <a:ln cmpd="sng">
+            <a:solidFill>
+              <a:srgbClr val="FF0000"/>
+            </a:solidFill>
+          </a:ln>
+        </p:spPr>
+        <p:style>
+          <a:lnRef idx="2">
+            <a:schemeClr val="accent1">
+              <a:shade val="50000"/>
+            </a:schemeClr>
+          </a:lnRef>
+          <a:fillRef idx="1">
+            <a:schemeClr val="accent1"/>
+          </a:fillRef>
+          <a:effectRef idx="0">
+            <a:schemeClr val="accent1"/>
+          </a:effectRef>
+          <a:fontRef idx="minor">
+            <a:schemeClr val="lt1"/>
+          </a:fontRef>
+        </p:style>
+        <p:txBody>
+          <a:bodyPr rtlCol="0" anchor="ctr"/>
+          <a:lstStyle/>
+          <a:p>
+            <a:pPr algn="ctr"/>
+            <a:endParaRPr lang="de-DE"/>
+          </a:p>
+        </p:txBody>
+      </p:sp>
+    </p:spTree>
+    <p:extLst>
+      <p:ext uri="{BB962C8B-B14F-4D97-AF65-F5344CB8AC3E}">
+        <p14:creationId xmlns:p14="http://schemas.microsoft.com/office/powerpoint/2010/main" val="919348111"/>
+      </p:ext>
+    </p:extLst>
+  </p:cSld>
+  <p:clrMapOvr>
+    <a:masterClrMapping/>
+  </p:clrMapOvr>
+  <p:timing>
+    <p:tnLst>
+      <p:par>
+        <p:cTn id="1" dur="indefinite" restart="never" nodeType="tmRoot">
+          <p:childTnLst>
+            <p:seq concurrent="1" nextAc="seek">
+              <p:cTn id="2" dur="indefinite" nodeType="mainSeq">
+                <p:childTnLst>
+                  <p:par>
+                    <p:cTn id="3" fill="hold">
+                      <p:stCondLst>
+                        <p:cond delay="indefinite"/>
+                      </p:stCondLst>
+                      <p:childTnLst>
+                        <p:par>
+                          <p:cTn id="4" fill="hold">
+                            <p:stCondLst>
+                              <p:cond delay="0"/>
+                            </p:stCondLst>
+                            <p:childTnLst>
+                              <p:par>
+                                <p:cTn id="5" presetID="1" presetClass="entr" presetSubtype="0" fill="hold" grpId="0" nodeType="clickEffect">
+                                  <p:stCondLst>
+                                    <p:cond delay="0"/>
+                                  </p:stCondLst>
+                                  <p:childTnLst>
+                                    <p:set>
+                                      <p:cBhvr>
+                                        <p:cTn id="6" dur="1" fill="hold">
+                                          <p:stCondLst>
+                                            <p:cond delay="0"/>
+                                          </p:stCondLst>
+                                        </p:cTn>
+                                        <p:tgtEl>
+                                          <p:spTgt spid="5"/>
+                                        </p:tgtEl>
+                                        <p:attrNameLst>
+                                          <p:attrName>style.visibility</p:attrName>
+                                        </p:attrNameLst>
+                                      </p:cBhvr>
+                                      <p:to>
+                                        <p:strVal val="visible"/>
+                                      </p:to>
+                                    </p:set>
+                                  </p:childTnLst>
+                                </p:cTn>
+                              </p:par>
+                            </p:childTnLst>
+                          </p:cTn>
+                        </p:par>
+                      </p:childTnLst>
+                    </p:cTn>
+                  </p:par>
+                  <p:par>
+                    <p:cTn id="7" fill="hold">
+                      <p:stCondLst>
+                        <p:cond delay="indefinite"/>
+                      </p:stCondLst>
+                      <p:childTnLst>
+                        <p:par>
+                          <p:cTn id="8" fill="hold">
+                            <p:stCondLst>
+                              <p:cond delay="0"/>
+                            </p:stCondLst>
+                            <p:childTnLst>
+                              <p:par>
+                                <p:cTn id="9" presetID="1" presetClass="exit" presetSubtype="0" fill="hold" grpId="1" nodeType="clickEffect">
+                                  <p:stCondLst>
+                                    <p:cond delay="0"/>
+                                  </p:stCondLst>
+                                  <p:childTnLst>
+                                    <p:set>
+                                      <p:cBhvr>
+                                        <p:cTn id="10" dur="1" fill="hold">
+                                          <p:stCondLst>
+                                            <p:cond delay="0"/>
+                                          </p:stCondLst>
+                                        </p:cTn>
+                                        <p:tgtEl>
+                                          <p:spTgt spid="5"/>
+                                        </p:tgtEl>
+                                        <p:attrNameLst>
+                                          <p:attrName>style.visibility</p:attrName>
+                                        </p:attrNameLst>
+                                      </p:cBhvr>
+                                      <p:to>
+                                        <p:strVal val="hidden"/>
+                                      </p:to>
+                                    </p:set>
+                                  </p:childTnLst>
+                                </p:cTn>
+                              </p:par>
+                            </p:childTnLst>
+                          </p:cTn>
+                        </p:par>
+                      </p:childTnLst>
+                    </p:cTn>
+                  </p:par>
+                  <p:par>
+                    <p:cTn id="11" fill="hold">
+                      <p:stCondLst>
+                        <p:cond delay="indefinite"/>
+                      </p:stCondLst>
+                      <p:childTnLst>
+                        <p:par>
+                          <p:cTn id="12" fill="hold">
+                            <p:stCondLst>
+                              <p:cond delay="0"/>
+                            </p:stCondLst>
+                            <p:childTnLst>
+                              <p:par>
+                                <p:cTn id="13" presetID="1" presetClass="entr" presetSubtype="0" fill="hold" grpId="0" nodeType="clickEffect">
+                                  <p:stCondLst>
+                                    <p:cond delay="0"/>
+                                  </p:stCondLst>
+                                  <p:childTnLst>
+                                    <p:set>
+                                      <p:cBhvr>
+                                        <p:cTn id="14" dur="1" fill="hold">
+                                          <p:stCondLst>
+                                            <p:cond delay="0"/>
+                                          </p:stCondLst>
+                                        </p:cTn>
+                                        <p:tgtEl>
+                                          <p:spTgt spid="6"/>
+                                        </p:tgtEl>
+                                        <p:attrNameLst>
+                                          <p:attrName>style.visibility</p:attrName>
+                                        </p:attrNameLst>
+                                      </p:cBhvr>
+                                      <p:to>
+                                        <p:strVal val="visible"/>
+                                      </p:to>
+                                    </p:set>
+                                  </p:childTnLst>
+                                </p:cTn>
+                              </p:par>
+                            </p:childTnLst>
+                          </p:cTn>
+                        </p:par>
+                      </p:childTnLst>
+                    </p:cTn>
+                  </p:par>
+                  <p:par>
+                    <p:cTn id="15" fill="hold">
+                      <p:stCondLst>
+                        <p:cond delay="indefinite"/>
+                      </p:stCondLst>
+                      <p:childTnLst>
+                        <p:par>
+                          <p:cTn id="16" fill="hold">
+                            <p:stCondLst>
+                              <p:cond delay="0"/>
+                            </p:stCondLst>
+                            <p:childTnLst>
+                              <p:par>
+                                <p:cTn id="17" presetID="10" presetClass="exit" presetSubtype="0" fill="hold" grpId="1" nodeType="clickEffect">
+                                  <p:stCondLst>
+                                    <p:cond delay="0"/>
+                                  </p:stCondLst>
+                                  <p:childTnLst>
+                                    <p:animEffect transition="out" filter="fade">
+                                      <p:cBhvr>
+                                        <p:cTn id="18" dur="500"/>
+                                        <p:tgtEl>
+                                          <p:spTgt spid="6"/>
+                                        </p:tgtEl>
+                                      </p:cBhvr>
+                                    </p:animEffect>
+                                    <p:set>
+                                      <p:cBhvr>
+                                        <p:cTn id="19" dur="1" fill="hold">
+                                          <p:stCondLst>
+                                            <p:cond delay="499"/>
+                                          </p:stCondLst>
+                                        </p:cTn>
+                                        <p:tgtEl>
+                                          <p:spTgt spid="6"/>
+                                        </p:tgtEl>
+                                        <p:attrNameLst>
+                                          <p:attrName>style.visibility</p:attrName>
+                                        </p:attrNameLst>
+                                      </p:cBhvr>
+                                      <p:to>
+                                        <p:strVal val="hidden"/>
+                                      </p:to>
+                                    </p:set>
+                                  </p:childTnLst>
+                                </p:cTn>
+                              </p:par>
+                            </p:childTnLst>
+                          </p:cTn>
+                        </p:par>
+                      </p:childTnLst>
+                    </p:cTn>
+                  </p:par>
+                  <p:par>
+                    <p:cTn id="20" fill="hold">
+                      <p:stCondLst>
+                        <p:cond delay="indefinite"/>
+                      </p:stCondLst>
+                      <p:childTnLst>
+                        <p:par>
+                          <p:cTn id="21" fill="hold">
+                            <p:stCondLst>
+                              <p:cond delay="0"/>
+                            </p:stCondLst>
+                            <p:childTnLst>
+                              <p:par>
+                                <p:cTn id="22" presetID="1" presetClass="entr" presetSubtype="0" fill="hold" grpId="0" nodeType="clickEffect">
+                                  <p:stCondLst>
+                                    <p:cond delay="0"/>
+                                  </p:stCondLst>
+                                  <p:childTnLst>
+                                    <p:set>
+                                      <p:cBhvr>
+                                        <p:cTn id="23" dur="1" fill="hold">
+                                          <p:stCondLst>
+                                            <p:cond delay="0"/>
+                                          </p:stCondLst>
+                                        </p:cTn>
+                                        <p:tgtEl>
+                                          <p:spTgt spid="7"/>
+                                        </p:tgtEl>
+                                        <p:attrNameLst>
+                                          <p:attrName>style.visibility</p:attrName>
+                                        </p:attrNameLst>
+                                      </p:cBhvr>
+                                      <p:to>
+                                        <p:strVal val="visible"/>
+                                      </p:to>
+                                    </p:set>
+                                  </p:childTnLst>
+                                </p:cTn>
+                              </p:par>
+                            </p:childTnLst>
+                          </p:cTn>
+                        </p:par>
+                      </p:childTnLst>
+                    </p:cTn>
+                  </p:par>
+                  <p:par>
+                    <p:cTn id="24" fill="hold">
+                      <p:stCondLst>
+                        <p:cond delay="indefinite"/>
+                      </p:stCondLst>
+                      <p:childTnLst>
+                        <p:par>
+                          <p:cTn id="25" fill="hold">
+                            <p:stCondLst>
+                              <p:cond delay="0"/>
+                            </p:stCondLst>
+                            <p:childTnLst>
+                              <p:par>
+                                <p:cTn id="26" presetID="10" presetClass="exit" presetSubtype="0" fill="hold" grpId="1" nodeType="clickEffect">
+                                  <p:stCondLst>
+                                    <p:cond delay="0"/>
+                                  </p:stCondLst>
+                                  <p:childTnLst>
+                                    <p:animEffect transition="out" filter="fade">
+                                      <p:cBhvr>
+                                        <p:cTn id="27" dur="500"/>
+                                        <p:tgtEl>
+                                          <p:spTgt spid="7"/>
+                                        </p:tgtEl>
+                                      </p:cBhvr>
+                                    </p:animEffect>
+                                    <p:set>
+                                      <p:cBhvr>
+                                        <p:cTn id="28" dur="1" fill="hold">
+                                          <p:stCondLst>
+                                            <p:cond delay="499"/>
+                                          </p:stCondLst>
+                                        </p:cTn>
+                                        <p:tgtEl>
+                                          <p:spTgt spid="7"/>
+                                        </p:tgtEl>
+                                        <p:attrNameLst>
+                                          <p:attrName>style.visibility</p:attrName>
+                                        </p:attrNameLst>
+                                      </p:cBhvr>
+                                      <p:to>
+                                        <p:strVal val="hidden"/>
+                                      </p:to>
+                                    </p:set>
+                                  </p:childTnLst>
+                                </p:cTn>
+                              </p:par>
+                            </p:childTnLst>
+                          </p:cTn>
+                        </p:par>
+                      </p:childTnLst>
+                    </p:cTn>
+                  </p:par>
+                </p:childTnLst>
+              </p:cTn>
+              <p:prevCondLst>
+                <p:cond evt="onPrev" delay="0">
+                  <p:tgtEl>
+                    <p:sldTgt/>
+                  </p:tgtEl>
+                </p:cond>
+              </p:prevCondLst>
+              <p:nextCondLst>
+                <p:cond evt="onNext" delay="0">
+                  <p:tgtEl>
+                    <p:sldTgt/>
+                  </p:tgtEl>
+                </p:cond>
+              </p:nextCondLst>
+            </p:seq>
+          </p:childTnLst>
+        </p:cTn>
+      </p:par>
+    </p:tnLst>
+    <p:bldLst>
+      <p:bldP spid="5" grpId="0" animBg="1"/>
+      <p:bldP spid="5" grpId="1" animBg="1"/>
+      <p:bldP spid="6" grpId="0" animBg="1"/>
+      <p:bldP spid="6" grpId="1" animBg="1"/>
+      <p:bldP spid="7" grpId="0" animBg="1"/>
+      <p:bldP spid="7" grpId="1" animBg="1"/>
+    </p:bldLst>
+  </p:timing>
+</p:sld>
+</file>
+
+<file path=ppt/slides/slide19.xml><?xml version="1.0" encoding="utf-8"?>
+<p:sld xmlns:a="http://schemas.openxmlformats.org/drawingml/2006/main" xmlns:r="http://schemas.openxmlformats.org/officeDocument/2006/relationships" xmlns:p="http://schemas.openxmlformats.org/presentationml/2006/main">
+  <p:cSld>
+    <p:spTree>
+      <p:nvGrpSpPr>
+        <p:cNvPr id="1" name=""/>
+        <p:cNvGrpSpPr/>
+        <p:nvPr/>
+      </p:nvGrpSpPr>
+      <p:grpSpPr>
+        <a:xfrm>
+          <a:off x="0" y="0"/>
+          <a:ext cx="0" cy="0"/>
+          <a:chOff x="0" y="0"/>
+          <a:chExt cx="0" cy="0"/>
+        </a:xfrm>
+      </p:grpSpPr>
+      <p:pic>
+        <p:nvPicPr>
+          <p:cNvPr id="4" name="Content Placeholder 3"/>
+          <p:cNvPicPr>
+            <a:picLocks noGrp="1" noChangeAspect="1"/>
+          </p:cNvPicPr>
+          <p:nvPr>
+            <p:ph idx="1"/>
+          </p:nvPr>
+        </p:nvPicPr>
+        <p:blipFill>
+          <a:blip r:embed="rId2">
+            <a:extLst>
+              <a:ext uri="{28A0092B-C50C-407E-A947-70E740481C1C}">
+                <a14:useLocalDpi xmlns:a14="http://schemas.microsoft.com/office/drawing/2010/main" val="0"/>
+              </a:ext>
+            </a:extLst>
+          </a:blip>
+          <a:stretch>
+            <a:fillRect/>
+          </a:stretch>
+        </p:blipFill>
+        <p:spPr>
+          <a:xfrm>
+            <a:off x="323528" y="1412776"/>
+            <a:ext cx="5472608" cy="4032448"/>
+          </a:xfrm>
+        </p:spPr>
+      </p:pic>
+      <p:sp>
+        <p:nvSpPr>
+          <p:cNvPr id="3" name="Title 2"/>
+          <p:cNvSpPr>
+            <a:spLocks noGrp="1"/>
+          </p:cNvSpPr>
+          <p:nvPr>
+            <p:ph type="title"/>
+          </p:nvPr>
+        </p:nvSpPr>
+        <p:spPr/>
+        <p:txBody>
+          <a:bodyPr/>
+          <a:lstStyle/>
+          <a:p>
+            <a:pPr algn="ctr"/>
+            <a:r>
+              <a:rPr lang="de-CH" dirty="0"/>
+              <a:t>MedicationOverView</a:t>
+            </a:r>
+            <a:endParaRPr lang="de-DE" dirty="0"/>
+          </a:p>
+        </p:txBody>
+      </p:sp>
+    </p:spTree>
+    <p:extLst>
+      <p:ext uri="{BB962C8B-B14F-4D97-AF65-F5344CB8AC3E}">
+        <p14:creationId xmlns:p14="http://schemas.microsoft.com/office/powerpoint/2010/main" val="2311444091"/>
+      </p:ext>
+    </p:extLst>
+  </p:cSld>
+  <p:clrMapOvr>
+    <a:masterClrMapping/>
+  </p:clrMapOvr>
+  <p:timing>
+    <p:tnLst>
+      <p:par>
+        <p:cTn id="1" dur="indefinite" restart="never" nodeType="tmRoot"/>
+      </p:par>
+    </p:tnLst>
+  </p:timing>
+</p:sld>
+</file>
+
 <file path=ppt/slides/slide2.xml><?xml version="1.0" encoding="utf-8"?>
 <p:sld xmlns:a="http://schemas.openxmlformats.org/drawingml/2006/main" xmlns:r="http://schemas.openxmlformats.org/officeDocument/2006/relationships" xmlns:p="http://schemas.openxmlformats.org/presentationml/2006/main">
   <p:cSld>
@@ -5729,6 +6610,623 @@
   <p:clrMapOvr>
     <a:masterClrMapping/>
   </p:clrMapOvr>
+</p:sld>
+</file>
+
+<file path=ppt/slides/slide20.xml><?xml version="1.0" encoding="utf-8"?>
+<p:sld xmlns:a="http://schemas.openxmlformats.org/drawingml/2006/main" xmlns:r="http://schemas.openxmlformats.org/officeDocument/2006/relationships" xmlns:p="http://schemas.openxmlformats.org/presentationml/2006/main">
+  <p:cSld>
+    <p:spTree>
+      <p:nvGrpSpPr>
+        <p:cNvPr id="1" name=""/>
+        <p:cNvGrpSpPr/>
+        <p:nvPr/>
+      </p:nvGrpSpPr>
+      <p:grpSpPr>
+        <a:xfrm>
+          <a:off x="0" y="0"/>
+          <a:ext cx="0" cy="0"/>
+          <a:chOff x="0" y="0"/>
+          <a:chExt cx="0" cy="0"/>
+        </a:xfrm>
+      </p:grpSpPr>
+      <p:pic>
+        <p:nvPicPr>
+          <p:cNvPr id="4" name="Content Placeholder 3"/>
+          <p:cNvPicPr>
+            <a:picLocks noGrp="1" noChangeAspect="1"/>
+          </p:cNvPicPr>
+          <p:nvPr>
+            <p:ph idx="1"/>
+          </p:nvPr>
+        </p:nvPicPr>
+        <p:blipFill>
+          <a:blip r:embed="rId2">
+            <a:extLst>
+              <a:ext uri="{28A0092B-C50C-407E-A947-70E740481C1C}">
+                <a14:useLocalDpi xmlns:a14="http://schemas.microsoft.com/office/drawing/2010/main" val="0"/>
+              </a:ext>
+            </a:extLst>
+          </a:blip>
+          <a:stretch>
+            <a:fillRect/>
+          </a:stretch>
+        </p:blipFill>
+        <p:spPr>
+          <a:xfrm>
+            <a:off x="395536" y="1196752"/>
+            <a:ext cx="6628526" cy="3888432"/>
+          </a:xfrm>
+        </p:spPr>
+      </p:pic>
+      <p:sp>
+        <p:nvSpPr>
+          <p:cNvPr id="3" name="Title 2"/>
+          <p:cNvSpPr>
+            <a:spLocks noGrp="1"/>
+          </p:cNvSpPr>
+          <p:nvPr>
+            <p:ph type="title"/>
+          </p:nvPr>
+        </p:nvSpPr>
+        <p:spPr/>
+        <p:txBody>
+          <a:bodyPr/>
+          <a:lstStyle/>
+          <a:p>
+            <a:pPr algn="ctr"/>
+            <a:r>
+              <a:rPr lang="de-CH" dirty="0"/>
+              <a:t>MedicationOverView</a:t>
+            </a:r>
+            <a:endParaRPr lang="de-DE" dirty="0"/>
+          </a:p>
+        </p:txBody>
+      </p:sp>
+    </p:spTree>
+    <p:extLst>
+      <p:ext uri="{BB962C8B-B14F-4D97-AF65-F5344CB8AC3E}">
+        <p14:creationId xmlns:p14="http://schemas.microsoft.com/office/powerpoint/2010/main" val="2169692373"/>
+      </p:ext>
+    </p:extLst>
+  </p:cSld>
+  <p:clrMapOvr>
+    <a:masterClrMapping/>
+  </p:clrMapOvr>
+  <p:timing>
+    <p:tnLst>
+      <p:par>
+        <p:cTn id="1" dur="indefinite" restart="never" nodeType="tmRoot"/>
+      </p:par>
+    </p:tnLst>
+  </p:timing>
+</p:sld>
+</file>
+
+<file path=ppt/slides/slide21.xml><?xml version="1.0" encoding="utf-8"?>
+<p:sld xmlns:a="http://schemas.openxmlformats.org/drawingml/2006/main" xmlns:r="http://schemas.openxmlformats.org/officeDocument/2006/relationships" xmlns:p="http://schemas.openxmlformats.org/presentationml/2006/main">
+  <p:cSld>
+    <p:spTree>
+      <p:nvGrpSpPr>
+        <p:cNvPr id="1" name=""/>
+        <p:cNvGrpSpPr/>
+        <p:nvPr/>
+      </p:nvGrpSpPr>
+      <p:grpSpPr>
+        <a:xfrm>
+          <a:off x="0" y="0"/>
+          <a:ext cx="0" cy="0"/>
+          <a:chOff x="0" y="0"/>
+          <a:chExt cx="0" cy="0"/>
+        </a:xfrm>
+      </p:grpSpPr>
+      <p:pic>
+        <p:nvPicPr>
+          <p:cNvPr id="4" name="Content Placeholder 3"/>
+          <p:cNvPicPr>
+            <a:picLocks noGrp="1" noChangeAspect="1"/>
+          </p:cNvPicPr>
+          <p:nvPr>
+            <p:ph idx="1"/>
+          </p:nvPr>
+        </p:nvPicPr>
+        <p:blipFill>
+          <a:blip r:embed="rId2">
+            <a:extLst>
+              <a:ext uri="{28A0092B-C50C-407E-A947-70E740481C1C}">
+                <a14:useLocalDpi xmlns:a14="http://schemas.microsoft.com/office/drawing/2010/main" val="0"/>
+              </a:ext>
+            </a:extLst>
+          </a:blip>
+          <a:stretch>
+            <a:fillRect/>
+          </a:stretch>
+        </p:blipFill>
+        <p:spPr>
+          <a:xfrm>
+            <a:off x="457200" y="1052736"/>
+            <a:ext cx="8229600" cy="5112568"/>
+          </a:xfrm>
+        </p:spPr>
+      </p:pic>
+      <p:sp>
+        <p:nvSpPr>
+          <p:cNvPr id="3" name="Title 2"/>
+          <p:cNvSpPr>
+            <a:spLocks noGrp="1"/>
+          </p:cNvSpPr>
+          <p:nvPr>
+            <p:ph type="title"/>
+          </p:nvPr>
+        </p:nvSpPr>
+        <p:spPr/>
+        <p:txBody>
+          <a:bodyPr>
+            <a:normAutofit fontScale="90000"/>
+          </a:bodyPr>
+          <a:lstStyle/>
+          <a:p>
+            <a:pPr algn="ctr"/>
+            <a:r>
+              <a:rPr lang="de-CH" dirty="0"/>
+              <a:t>Creating MedicationInsertView</a:t>
+            </a:r>
+            <a:br>
+              <a:rPr lang="de-CH" dirty="0"/>
+            </a:br>
+            <a:endParaRPr lang="de-DE" dirty="0"/>
+          </a:p>
+        </p:txBody>
+      </p:sp>
+    </p:spTree>
+    <p:extLst>
+      <p:ext uri="{BB962C8B-B14F-4D97-AF65-F5344CB8AC3E}">
+        <p14:creationId xmlns:p14="http://schemas.microsoft.com/office/powerpoint/2010/main" val="3896834639"/>
+      </p:ext>
+    </p:extLst>
+  </p:cSld>
+  <p:clrMapOvr>
+    <a:masterClrMapping/>
+  </p:clrMapOvr>
+  <p:timing>
+    <p:tnLst>
+      <p:par>
+        <p:cTn id="1" dur="indefinite" restart="never" nodeType="tmRoot"/>
+      </p:par>
+    </p:tnLst>
+  </p:timing>
+</p:sld>
+</file>
+
+<file path=ppt/slides/slide22.xml><?xml version="1.0" encoding="utf-8"?>
+<p:sld xmlns:a="http://schemas.openxmlformats.org/drawingml/2006/main" xmlns:r="http://schemas.openxmlformats.org/officeDocument/2006/relationships" xmlns:p="http://schemas.openxmlformats.org/presentationml/2006/main">
+  <p:cSld>
+    <p:spTree>
+      <p:nvGrpSpPr>
+        <p:cNvPr id="1" name=""/>
+        <p:cNvGrpSpPr/>
+        <p:nvPr/>
+      </p:nvGrpSpPr>
+      <p:grpSpPr>
+        <a:xfrm>
+          <a:off x="0" y="0"/>
+          <a:ext cx="0" cy="0"/>
+          <a:chOff x="0" y="0"/>
+          <a:chExt cx="0" cy="0"/>
+        </a:xfrm>
+      </p:grpSpPr>
+      <p:pic>
+        <p:nvPicPr>
+          <p:cNvPr id="4" name="Content Placeholder 3"/>
+          <p:cNvPicPr>
+            <a:picLocks noGrp="1" noChangeAspect="1"/>
+          </p:cNvPicPr>
+          <p:nvPr>
+            <p:ph idx="1"/>
+          </p:nvPr>
+        </p:nvPicPr>
+        <p:blipFill>
+          <a:blip r:embed="rId2">
+            <a:extLst>
+              <a:ext uri="{28A0092B-C50C-407E-A947-70E740481C1C}">
+                <a14:useLocalDpi xmlns:a14="http://schemas.microsoft.com/office/drawing/2010/main" val="0"/>
+              </a:ext>
+            </a:extLst>
+          </a:blip>
+          <a:stretch>
+            <a:fillRect/>
+          </a:stretch>
+        </p:blipFill>
+        <p:spPr>
+          <a:xfrm>
+            <a:off x="251520" y="1412776"/>
+            <a:ext cx="6633782" cy="4174992"/>
+          </a:xfrm>
+        </p:spPr>
+      </p:pic>
+      <p:sp>
+        <p:nvSpPr>
+          <p:cNvPr id="3" name="Title 2"/>
+          <p:cNvSpPr>
+            <a:spLocks noGrp="1"/>
+          </p:cNvSpPr>
+          <p:nvPr>
+            <p:ph type="title"/>
+          </p:nvPr>
+        </p:nvSpPr>
+        <p:spPr/>
+        <p:txBody>
+          <a:bodyPr>
+            <a:normAutofit fontScale="90000"/>
+          </a:bodyPr>
+          <a:lstStyle/>
+          <a:p>
+            <a:pPr algn="ctr"/>
+            <a:r>
+              <a:rPr lang="de-CH" dirty="0"/>
+              <a:t>Creating MedicationInsertView</a:t>
+            </a:r>
+            <a:br>
+              <a:rPr lang="de-CH" dirty="0"/>
+            </a:br>
+            <a:endParaRPr lang="de-DE" dirty="0"/>
+          </a:p>
+        </p:txBody>
+      </p:sp>
+    </p:spTree>
+    <p:extLst>
+      <p:ext uri="{BB962C8B-B14F-4D97-AF65-F5344CB8AC3E}">
+        <p14:creationId xmlns:p14="http://schemas.microsoft.com/office/powerpoint/2010/main" val="2604600737"/>
+      </p:ext>
+    </p:extLst>
+  </p:cSld>
+  <p:clrMapOvr>
+    <a:masterClrMapping/>
+  </p:clrMapOvr>
+  <p:timing>
+    <p:tnLst>
+      <p:par>
+        <p:cTn id="1" dur="indefinite" restart="never" nodeType="tmRoot"/>
+      </p:par>
+    </p:tnLst>
+  </p:timing>
+</p:sld>
+</file>
+
+<file path=ppt/slides/slide23.xml><?xml version="1.0" encoding="utf-8"?>
+<p:sld xmlns:a="http://schemas.openxmlformats.org/drawingml/2006/main" xmlns:r="http://schemas.openxmlformats.org/officeDocument/2006/relationships" xmlns:p="http://schemas.openxmlformats.org/presentationml/2006/main">
+  <p:cSld>
+    <p:spTree>
+      <p:nvGrpSpPr>
+        <p:cNvPr id="1" name=""/>
+        <p:cNvGrpSpPr/>
+        <p:nvPr/>
+      </p:nvGrpSpPr>
+      <p:grpSpPr>
+        <a:xfrm>
+          <a:off x="0" y="0"/>
+          <a:ext cx="0" cy="0"/>
+          <a:chOff x="0" y="0"/>
+          <a:chExt cx="0" cy="0"/>
+        </a:xfrm>
+      </p:grpSpPr>
+      <p:sp>
+        <p:nvSpPr>
+          <p:cNvPr id="2" name="Content Placeholder 1"/>
+          <p:cNvSpPr>
+            <a:spLocks noGrp="1"/>
+          </p:cNvSpPr>
+          <p:nvPr>
+            <p:ph idx="1"/>
+          </p:nvPr>
+        </p:nvSpPr>
+        <p:spPr/>
+        <p:txBody>
+          <a:bodyPr/>
+          <a:lstStyle/>
+          <a:p>
+            <a:pPr marL="365760" lvl="1" indent="-256032">
+              <a:spcBef>
+                <a:spcPts val="400"/>
+              </a:spcBef>
+              <a:buSzPct val="68000"/>
+              <a:buFont typeface="Wingdings 3"/>
+              <a:buChar char=""/>
+            </a:pPr>
+            <a:r>
+              <a:rPr lang="de-CH" dirty="0"/>
+              <a:t>Panel </a:t>
+            </a:r>
+            <a:r>
+              <a:rPr lang="de-DE" dirty="0"/>
+              <a:t>Alignment</a:t>
+            </a:r>
+          </a:p>
+          <a:p>
+            <a:pPr marL="109728" indent="0">
+              <a:buNone/>
+            </a:pPr>
+            <a:r>
+              <a:rPr lang="de-DE" dirty="0"/>
+              <a:t>.v-panel {</a:t>
+            </a:r>
+          </a:p>
+          <a:p>
+            <a:pPr marL="109728" indent="0">
+              <a:buNone/>
+            </a:pPr>
+            <a:r>
+              <a:rPr lang="de-DE" dirty="0"/>
+              <a:t>  width: 730px</a:t>
+            </a:r>
+            <a:r>
+              <a:rPr lang="de-DE" dirty="0" smtClean="0"/>
+              <a:t>;</a:t>
+            </a:r>
+          </a:p>
+          <a:p>
+            <a:pPr marL="109728" indent="0">
+              <a:buNone/>
+            </a:pPr>
+            <a:r>
+              <a:rPr lang="de-DE" dirty="0" smtClean="0"/>
+              <a:t>  text-align: center;</a:t>
+            </a:r>
+          </a:p>
+          <a:p>
+            <a:pPr marL="109728" indent="0">
+              <a:buNone/>
+            </a:pPr>
+            <a:r>
+              <a:rPr lang="de-DE" dirty="0" smtClean="0"/>
+              <a:t>  </a:t>
+            </a:r>
+            <a:r>
+              <a:rPr lang="de-DE" dirty="0"/>
+              <a:t>alignment: center;</a:t>
+            </a:r>
+          </a:p>
+          <a:p>
+            <a:pPr marL="109728" indent="0">
+              <a:buNone/>
+            </a:pPr>
+            <a:r>
+              <a:rPr lang="de-DE" dirty="0"/>
+              <a:t>  </a:t>
+            </a:r>
+            <a:r>
+              <a:rPr lang="de-DE" dirty="0" smtClean="0"/>
+              <a:t>  </a:t>
+            </a:r>
+            <a:r>
+              <a:rPr lang="de-DE" dirty="0"/>
+              <a:t>}</a:t>
+            </a:r>
+          </a:p>
+        </p:txBody>
+      </p:sp>
+      <p:sp>
+        <p:nvSpPr>
+          <p:cNvPr id="3" name="Title 2"/>
+          <p:cNvSpPr>
+            <a:spLocks noGrp="1"/>
+          </p:cNvSpPr>
+          <p:nvPr>
+            <p:ph type="title"/>
+          </p:nvPr>
+        </p:nvSpPr>
+        <p:spPr/>
+        <p:txBody>
+          <a:bodyPr/>
+          <a:lstStyle/>
+          <a:p>
+            <a:r>
+              <a:rPr lang="de-CH" dirty="0"/>
+              <a:t>mytheme.scss</a:t>
+            </a:r>
+            <a:endParaRPr lang="de-DE" dirty="0"/>
+          </a:p>
+        </p:txBody>
+      </p:sp>
+    </p:spTree>
+    <p:extLst>
+      <p:ext uri="{BB962C8B-B14F-4D97-AF65-F5344CB8AC3E}">
+        <p14:creationId xmlns:p14="http://schemas.microsoft.com/office/powerpoint/2010/main" val="3886124791"/>
+      </p:ext>
+    </p:extLst>
+  </p:cSld>
+  <p:clrMapOvr>
+    <a:masterClrMapping/>
+  </p:clrMapOvr>
+  <p:timing>
+    <p:tnLst>
+      <p:par>
+        <p:cTn id="1" dur="indefinite" restart="never" nodeType="tmRoot"/>
+      </p:par>
+    </p:tnLst>
+  </p:timing>
+</p:sld>
+</file>
+
+<file path=ppt/slides/slide24.xml><?xml version="1.0" encoding="utf-8"?>
+<p:sld xmlns:a="http://schemas.openxmlformats.org/drawingml/2006/main" xmlns:r="http://schemas.openxmlformats.org/officeDocument/2006/relationships" xmlns:p="http://schemas.openxmlformats.org/presentationml/2006/main">
+  <p:cSld>
+    <p:spTree>
+      <p:nvGrpSpPr>
+        <p:cNvPr id="1" name=""/>
+        <p:cNvGrpSpPr/>
+        <p:nvPr/>
+      </p:nvGrpSpPr>
+      <p:grpSpPr>
+        <a:xfrm>
+          <a:off x="0" y="0"/>
+          <a:ext cx="0" cy="0"/>
+          <a:chOff x="0" y="0"/>
+          <a:chExt cx="0" cy="0"/>
+        </a:xfrm>
+      </p:grpSpPr>
+      <p:sp>
+        <p:nvSpPr>
+          <p:cNvPr id="2" name="Content Placeholder 1"/>
+          <p:cNvSpPr>
+            <a:spLocks noGrp="1"/>
+          </p:cNvSpPr>
+          <p:nvPr>
+            <p:ph idx="1"/>
+          </p:nvPr>
+        </p:nvSpPr>
+        <p:spPr/>
+        <p:txBody>
+          <a:bodyPr>
+            <a:normAutofit/>
+          </a:bodyPr>
+          <a:lstStyle/>
+          <a:p>
+            <a:pPr marL="452628" lvl="1" indent="-342900">
+              <a:spcBef>
+                <a:spcPts val="400"/>
+              </a:spcBef>
+              <a:buSzPct val="68000"/>
+              <a:buFont typeface="Wingdings" panose="05000000000000000000" pitchFamily="2" charset="2"/>
+              <a:buChar char="Ø"/>
+            </a:pPr>
+            <a:r>
+              <a:rPr lang="de-DE" dirty="0" smtClean="0"/>
+              <a:t> </a:t>
+            </a:r>
+            <a:r>
+              <a:rPr lang="en-US" dirty="0"/>
+              <a:t>Table selected </a:t>
+            </a:r>
+            <a:r>
+              <a:rPr lang="en-US" dirty="0" smtClean="0"/>
+              <a:t>row</a:t>
+            </a:r>
+            <a:endParaRPr lang="de-DE" dirty="0" smtClean="0"/>
+          </a:p>
+          <a:p>
+            <a:pPr marL="109728" indent="0">
+              <a:buNone/>
+            </a:pPr>
+            <a:r>
+              <a:rPr lang="de-DE" dirty="0" smtClean="0"/>
+              <a:t>.</a:t>
+            </a:r>
+            <a:r>
+              <a:rPr lang="de-DE" dirty="0"/>
+              <a:t>v-table .v-selected[class*="-row"] {</a:t>
+            </a:r>
+          </a:p>
+          <a:p>
+            <a:pPr marL="109728" indent="0">
+              <a:buNone/>
+            </a:pPr>
+            <a:r>
+              <a:rPr lang="de-DE" dirty="0"/>
+              <a:t>    background-color: #093440;</a:t>
+            </a:r>
+          </a:p>
+          <a:p>
+            <a:pPr marL="109728" indent="0">
+              <a:buNone/>
+            </a:pPr>
+            <a:r>
+              <a:rPr lang="de-DE" dirty="0"/>
+              <a:t>    background-image: none;</a:t>
+            </a:r>
+          </a:p>
+          <a:p>
+            <a:pPr marL="109728" indent="0">
+              <a:buNone/>
+            </a:pPr>
+            <a:r>
+              <a:rPr lang="de-DE" dirty="0"/>
+              <a:t>    background-origin: border-box;</a:t>
+            </a:r>
+          </a:p>
+          <a:p>
+            <a:pPr marL="109728" indent="0">
+              <a:buNone/>
+            </a:pPr>
+            <a:r>
+              <a:rPr lang="de-DE" dirty="0"/>
+              <a:t>    border: solid;</a:t>
+            </a:r>
+          </a:p>
+          <a:p>
+            <a:pPr marL="109728" indent="0">
+              <a:buNone/>
+            </a:pPr>
+            <a:r>
+              <a:rPr lang="de-DE" dirty="0"/>
+              <a:t>    color: #FFFFFF;</a:t>
+            </a:r>
+          </a:p>
+          <a:p>
+            <a:pPr marL="109728" indent="0">
+              <a:buNone/>
+            </a:pPr>
+            <a:r>
+              <a:rPr lang="de-DE" dirty="0"/>
+              <a:t>    font-weight: bold;</a:t>
+            </a:r>
+          </a:p>
+          <a:p>
+            <a:pPr marL="109728" indent="0">
+              <a:buNone/>
+            </a:pPr>
+            <a:r>
+              <a:rPr lang="de-DE" dirty="0"/>
+              <a:t>    </a:t>
+            </a:r>
+            <a:r>
+              <a:rPr lang="de-DE" dirty="0" smtClean="0"/>
+              <a:t>}</a:t>
+            </a:r>
+            <a:endParaRPr lang="de-DE" dirty="0"/>
+          </a:p>
+        </p:txBody>
+      </p:sp>
+      <p:sp>
+        <p:nvSpPr>
+          <p:cNvPr id="3" name="Title 2"/>
+          <p:cNvSpPr>
+            <a:spLocks noGrp="1"/>
+          </p:cNvSpPr>
+          <p:nvPr>
+            <p:ph type="title"/>
+          </p:nvPr>
+        </p:nvSpPr>
+        <p:spPr/>
+        <p:txBody>
+          <a:bodyPr/>
+          <a:lstStyle/>
+          <a:p>
+            <a:r>
+              <a:rPr lang="de-CH" dirty="0"/>
+              <a:t>mytheme.scss</a:t>
+            </a:r>
+            <a:endParaRPr lang="de-DE" dirty="0"/>
+          </a:p>
+        </p:txBody>
+      </p:sp>
+    </p:spTree>
+    <p:extLst>
+      <p:ext uri="{BB962C8B-B14F-4D97-AF65-F5344CB8AC3E}">
+        <p14:creationId xmlns:p14="http://schemas.microsoft.com/office/powerpoint/2010/main" val="3166075478"/>
+      </p:ext>
+    </p:extLst>
+  </p:cSld>
+  <p:clrMapOvr>
+    <a:masterClrMapping/>
+  </p:clrMapOvr>
+  <p:timing>
+    <p:tnLst>
+      <p:par>
+        <p:cTn id="1" dur="indefinite" restart="never" nodeType="tmRoot"/>
+      </p:par>
+    </p:tnLst>
+  </p:timing>
 </p:sld>
 </file>
 
@@ -7651,15 +9149,7 @@
             </a:r>
             <a:r>
               <a:rPr lang="de-CH" sz="2000" dirty="0" smtClean="0"/>
-              <a:t>:		</a:t>
-            </a:r>
-            <a:r>
-              <a:rPr lang="de-CH" sz="2000" dirty="0" smtClean="0"/>
-              <a:t>Read-</a:t>
-            </a:r>
-            <a:r>
-              <a:rPr lang="de-CH" sz="2000" dirty="0" smtClean="0"/>
-              <a:t>, Edit- &amp; Update-</a:t>
+              <a:t>:		Read-, Edit- &amp; Update-</a:t>
             </a:r>
             <a:r>
               <a:rPr lang="de-CH" sz="2000" dirty="0" err="1" smtClean="0"/>
@@ -7675,11 +9165,7 @@
             </a:pPr>
             <a:r>
               <a:rPr lang="de-CH" sz="2000" dirty="0" smtClean="0"/>
-              <a:t>Methode:</a:t>
-            </a:r>
-            <a:r>
-              <a:rPr lang="de-CH" sz="2000" dirty="0" smtClean="0"/>
-              <a:t>		</a:t>
+              <a:t>Methode:		</a:t>
             </a:r>
             <a:r>
               <a:rPr lang="de-CH" sz="2000" dirty="0" err="1" smtClean="0"/>
@@ -7714,15 +9200,7 @@
             </a:r>
             <a:r>
               <a:rPr lang="de-CH" sz="2000" dirty="0" smtClean="0"/>
-              <a:t>	</a:t>
-            </a:r>
-            <a:r>
-              <a:rPr lang="de-CH" sz="2000" dirty="0" smtClean="0"/>
-              <a:t>	Read </a:t>
-            </a:r>
-            <a:r>
-              <a:rPr lang="de-CH" sz="2000" dirty="0" smtClean="0"/>
-              <a:t>&amp; Update von </a:t>
+              <a:t>		Read &amp; Update von </a:t>
             </a:r>
             <a:r>
               <a:rPr lang="de-CH" sz="2000" dirty="0" err="1" smtClean="0"/>

</xml_diff>

<commit_message>
addded new screenshot, deletet not used page
</commit_message>
<xml_diff>
--- a/Documents/Task 14/Task 14.pptx
+++ b/Documents/Task 14/Task 14.pptx
@@ -8,27 +8,26 @@
     <p:sldId id="256" r:id="rId2"/>
     <p:sldId id="260" r:id="rId3"/>
     <p:sldId id="257" r:id="rId4"/>
-    <p:sldId id="261" r:id="rId5"/>
-    <p:sldId id="264" r:id="rId6"/>
-    <p:sldId id="262" r:id="rId7"/>
-    <p:sldId id="270" r:id="rId8"/>
-    <p:sldId id="271" r:id="rId9"/>
-    <p:sldId id="272" r:id="rId10"/>
-    <p:sldId id="265" r:id="rId11"/>
-    <p:sldId id="266" r:id="rId12"/>
-    <p:sldId id="267" r:id="rId13"/>
-    <p:sldId id="268" r:id="rId14"/>
-    <p:sldId id="269" r:id="rId15"/>
-    <p:sldId id="263" r:id="rId16"/>
-    <p:sldId id="273" r:id="rId17"/>
-    <p:sldId id="274" r:id="rId18"/>
-    <p:sldId id="275" r:id="rId19"/>
-    <p:sldId id="276" r:id="rId20"/>
-    <p:sldId id="277" r:id="rId21"/>
-    <p:sldId id="278" r:id="rId22"/>
-    <p:sldId id="279" r:id="rId23"/>
-    <p:sldId id="280" r:id="rId24"/>
-    <p:sldId id="281" r:id="rId25"/>
+    <p:sldId id="264" r:id="rId5"/>
+    <p:sldId id="262" r:id="rId6"/>
+    <p:sldId id="270" r:id="rId7"/>
+    <p:sldId id="271" r:id="rId8"/>
+    <p:sldId id="272" r:id="rId9"/>
+    <p:sldId id="265" r:id="rId10"/>
+    <p:sldId id="266" r:id="rId11"/>
+    <p:sldId id="267" r:id="rId12"/>
+    <p:sldId id="268" r:id="rId13"/>
+    <p:sldId id="269" r:id="rId14"/>
+    <p:sldId id="263" r:id="rId15"/>
+    <p:sldId id="273" r:id="rId16"/>
+    <p:sldId id="274" r:id="rId17"/>
+    <p:sldId id="275" r:id="rId18"/>
+    <p:sldId id="276" r:id="rId19"/>
+    <p:sldId id="277" r:id="rId20"/>
+    <p:sldId id="278" r:id="rId21"/>
+    <p:sldId id="279" r:id="rId22"/>
+    <p:sldId id="280" r:id="rId23"/>
+    <p:sldId id="281" r:id="rId24"/>
   </p:sldIdLst>
   <p:sldSz cx="9144000" cy="6858000" type="screen4x3"/>
   <p:notesSz cx="6858000" cy="9144000"/>
@@ -129,7 +128,7 @@
   </p:defaultTextStyle>
   <p:extLst>
     <p:ext uri="{EFAFB233-063F-42B5-8137-9DF3F51BA10A}">
-      <p15:sldGuideLst xmlns:p15="http://schemas.microsoft.com/office/powerpoint/2012/main" xmlns="">
+      <p15:sldGuideLst xmlns:p15="http://schemas.microsoft.com/office/powerpoint/2012/main">
         <p15:guide id="1" orient="horz" pos="2160">
           <p15:clr>
             <a:srgbClr val="A4A3A4"/>
@@ -763,7 +762,7 @@
           <a:p>
             <a:fld id="{47B9CC14-C19A-4133-BA5B-215623135375}" type="datetimeFigureOut">
               <a:rPr lang="de-CH" smtClean="0"/>
-              <a:t>21.01.2016</a:t>
+              <a:t>22.01.2016</a:t>
             </a:fld>
             <a:endParaRPr lang="de-CH"/>
           </a:p>
@@ -825,7 +824,7 @@
           <a:p>
             <a:fld id="{4DF08790-157B-4E45-B901-26B96E067316}" type="slidenum">
               <a:rPr lang="de-CH" smtClean="0"/>
-              <a:t>‹#›</a:t>
+              <a:t>‹Nr.›</a:t>
             </a:fld>
             <a:endParaRPr lang="de-CH"/>
           </a:p>
@@ -953,7 +952,7 @@
           <a:p>
             <a:fld id="{47B9CC14-C19A-4133-BA5B-215623135375}" type="datetimeFigureOut">
               <a:rPr lang="de-CH" smtClean="0"/>
-              <a:t>21.01.2016</a:t>
+              <a:t>22.01.2016</a:t>
             </a:fld>
             <a:endParaRPr lang="de-CH"/>
           </a:p>
@@ -995,7 +994,7 @@
           <a:p>
             <a:fld id="{4DF08790-157B-4E45-B901-26B96E067316}" type="slidenum">
               <a:rPr lang="de-CH" smtClean="0"/>
-              <a:t>‹#›</a:t>
+              <a:t>‹Nr.›</a:t>
             </a:fld>
             <a:endParaRPr lang="de-CH"/>
           </a:p>
@@ -1128,7 +1127,7 @@
           <a:p>
             <a:fld id="{47B9CC14-C19A-4133-BA5B-215623135375}" type="datetimeFigureOut">
               <a:rPr lang="de-CH" smtClean="0"/>
-              <a:t>21.01.2016</a:t>
+              <a:t>22.01.2016</a:t>
             </a:fld>
             <a:endParaRPr lang="de-CH"/>
           </a:p>
@@ -1170,7 +1169,7 @@
           <a:p>
             <a:fld id="{4DF08790-157B-4E45-B901-26B96E067316}" type="slidenum">
               <a:rPr lang="de-CH" smtClean="0"/>
-              <a:t>‹#›</a:t>
+              <a:t>‹Nr.›</a:t>
             </a:fld>
             <a:endParaRPr lang="de-CH"/>
           </a:p>
@@ -1270,7 +1269,7 @@
           <a:p>
             <a:fld id="{47B9CC14-C19A-4133-BA5B-215623135375}" type="datetimeFigureOut">
               <a:rPr lang="de-CH" smtClean="0"/>
-              <a:t>21.01.2016</a:t>
+              <a:t>22.01.2016</a:t>
             </a:fld>
             <a:endParaRPr lang="de-CH"/>
           </a:p>
@@ -1312,7 +1311,7 @@
           <a:p>
             <a:fld id="{4DF08790-157B-4E45-B901-26B96E067316}" type="slidenum">
               <a:rPr lang="de-CH" smtClean="0"/>
-              <a:t>‹#›</a:t>
+              <a:t>‹Nr.›</a:t>
             </a:fld>
             <a:endParaRPr lang="de-CH"/>
           </a:p>
@@ -1517,7 +1516,7 @@
           <a:p>
             <a:fld id="{47B9CC14-C19A-4133-BA5B-215623135375}" type="datetimeFigureOut">
               <a:rPr lang="de-CH" smtClean="0"/>
-              <a:t>21.01.2016</a:t>
+              <a:t>22.01.2016</a:t>
             </a:fld>
             <a:endParaRPr lang="de-CH"/>
           </a:p>
@@ -1559,7 +1558,7 @@
           <a:p>
             <a:fld id="{4DF08790-157B-4E45-B901-26B96E067316}" type="slidenum">
               <a:rPr lang="de-CH" smtClean="0"/>
-              <a:t>‹#›</a:t>
+              <a:t>‹Nr.›</a:t>
             </a:fld>
             <a:endParaRPr lang="de-CH"/>
           </a:p>
@@ -1916,7 +1915,7 @@
           <a:p>
             <a:fld id="{47B9CC14-C19A-4133-BA5B-215623135375}" type="datetimeFigureOut">
               <a:rPr lang="de-CH" smtClean="0"/>
-              <a:t>21.01.2016</a:t>
+              <a:t>22.01.2016</a:t>
             </a:fld>
             <a:endParaRPr lang="de-CH"/>
           </a:p>
@@ -1958,7 +1957,7 @@
           <a:p>
             <a:fld id="{4DF08790-157B-4E45-B901-26B96E067316}" type="slidenum">
               <a:rPr lang="de-CH" smtClean="0"/>
-              <a:t>‹#›</a:t>
+              <a:t>‹Nr.›</a:t>
             </a:fld>
             <a:endParaRPr lang="de-CH"/>
           </a:p>
@@ -2354,7 +2353,7 @@
           <a:p>
             <a:fld id="{47B9CC14-C19A-4133-BA5B-215623135375}" type="datetimeFigureOut">
               <a:rPr lang="de-CH" smtClean="0"/>
-              <a:t>21.01.2016</a:t>
+              <a:t>22.01.2016</a:t>
             </a:fld>
             <a:endParaRPr lang="de-CH"/>
           </a:p>
@@ -2396,7 +2395,7 @@
           <a:p>
             <a:fld id="{4DF08790-157B-4E45-B901-26B96E067316}" type="slidenum">
               <a:rPr lang="de-CH" smtClean="0"/>
-              <a:t>‹#›</a:t>
+              <a:t>‹Nr.›</a:t>
             </a:fld>
             <a:endParaRPr lang="de-CH"/>
           </a:p>
@@ -2449,7 +2448,7 @@
           <a:p>
             <a:fld id="{47B9CC14-C19A-4133-BA5B-215623135375}" type="datetimeFigureOut">
               <a:rPr lang="de-CH" smtClean="0"/>
-              <a:t>21.01.2016</a:t>
+              <a:t>22.01.2016</a:t>
             </a:fld>
             <a:endParaRPr lang="de-CH"/>
           </a:p>
@@ -2491,7 +2490,7 @@
           <a:p>
             <a:fld id="{4DF08790-157B-4E45-B901-26B96E067316}" type="slidenum">
               <a:rPr lang="de-CH" smtClean="0"/>
-              <a:t>‹#›</a:t>
+              <a:t>‹Nr.›</a:t>
             </a:fld>
             <a:endParaRPr lang="de-CH"/>
           </a:p>
@@ -2562,7 +2561,7 @@
           <a:p>
             <a:fld id="{47B9CC14-C19A-4133-BA5B-215623135375}" type="datetimeFigureOut">
               <a:rPr lang="de-CH" smtClean="0"/>
-              <a:t>21.01.2016</a:t>
+              <a:t>22.01.2016</a:t>
             </a:fld>
             <a:endParaRPr lang="de-CH"/>
           </a:p>
@@ -2604,7 +2603,7 @@
           <a:p>
             <a:fld id="{4DF08790-157B-4E45-B901-26B96E067316}" type="slidenum">
               <a:rPr lang="de-CH" smtClean="0"/>
-              <a:t>‹#›</a:t>
+              <a:t>‹Nr.›</a:t>
             </a:fld>
             <a:endParaRPr lang="de-CH"/>
           </a:p>
@@ -2830,7 +2829,7 @@
           <a:p>
             <a:fld id="{47B9CC14-C19A-4133-BA5B-215623135375}" type="datetimeFigureOut">
               <a:rPr lang="de-CH" smtClean="0"/>
-              <a:t>21.01.2016</a:t>
+              <a:t>22.01.2016</a:t>
             </a:fld>
             <a:endParaRPr lang="de-CH"/>
           </a:p>
@@ -2872,7 +2871,7 @@
           <a:p>
             <a:fld id="{4DF08790-157B-4E45-B901-26B96E067316}" type="slidenum">
               <a:rPr lang="de-CH" smtClean="0"/>
-              <a:t>‹#›</a:t>
+              <a:t>‹Nr.›</a:t>
             </a:fld>
             <a:endParaRPr lang="de-CH"/>
           </a:p>
@@ -3031,7 +3030,7 @@
           <a:p>
             <a:fld id="{47B9CC14-C19A-4133-BA5B-215623135375}" type="datetimeFigureOut">
               <a:rPr lang="de-CH" smtClean="0"/>
-              <a:t>21.01.2016</a:t>
+              <a:t>22.01.2016</a:t>
             </a:fld>
             <a:endParaRPr lang="de-CH"/>
           </a:p>
@@ -3096,7 +3095,7 @@
           <a:p>
             <a:fld id="{4DF08790-157B-4E45-B901-26B96E067316}" type="slidenum">
               <a:rPr lang="de-CH" smtClean="0"/>
-              <a:t>‹#›</a:t>
+              <a:t>‹Nr.›</a:t>
             </a:fld>
             <a:endParaRPr lang="de-CH"/>
           </a:p>
@@ -4120,7 +4119,7 @@
           <a:p>
             <a:fld id="{47B9CC14-C19A-4133-BA5B-215623135375}" type="datetimeFigureOut">
               <a:rPr lang="de-CH" smtClean="0"/>
-              <a:t>21.01.2016</a:t>
+              <a:t>22.01.2016</a:t>
             </a:fld>
             <a:endParaRPr lang="de-CH"/>
           </a:p>
@@ -4196,7 +4195,7 @@
           <a:p>
             <a:fld id="{4DF08790-157B-4E45-B901-26B96E067316}" type="slidenum">
               <a:rPr lang="de-CH" smtClean="0"/>
-              <a:t>‹#›</a:t>
+              <a:t>‹Nr.›</a:t>
             </a:fld>
             <a:endParaRPr lang="de-CH"/>
           </a:p>
@@ -4690,218 +4689,6 @@
       </p:sp>
       <p:pic>
         <p:nvPicPr>
-          <p:cNvPr id="4" name="Grafik 3"/>
-          <p:cNvPicPr>
-            <a:picLocks noChangeAspect="1"/>
-          </p:cNvPicPr>
-          <p:nvPr/>
-        </p:nvPicPr>
-        <p:blipFill>
-          <a:blip r:embed="rId2">
-            <a:extLst>
-              <a:ext uri="{28A0092B-C50C-407E-A947-70E740481C1C}">
-                <a14:useLocalDpi xmlns:a14="http://schemas.microsoft.com/office/drawing/2010/main" val="0"/>
-              </a:ext>
-            </a:extLst>
-          </a:blip>
-          <a:stretch>
-            <a:fillRect/>
-          </a:stretch>
-        </p:blipFill>
-        <p:spPr>
-          <a:xfrm>
-            <a:off x="596163" y="1940654"/>
-            <a:ext cx="8107680" cy="2156460"/>
-          </a:xfrm>
-          <a:prstGeom prst="rect">
-            <a:avLst/>
-          </a:prstGeom>
-        </p:spPr>
-      </p:pic>
-      <p:pic>
-        <p:nvPicPr>
-          <p:cNvPr id="5" name="Grafik 4"/>
-          <p:cNvPicPr>
-            <a:picLocks noChangeAspect="1"/>
-          </p:cNvPicPr>
-          <p:nvPr/>
-        </p:nvPicPr>
-        <p:blipFill>
-          <a:blip r:embed="rId3">
-            <a:extLst>
-              <a:ext uri="{28A0092B-C50C-407E-A947-70E740481C1C}">
-                <a14:useLocalDpi xmlns:a14="http://schemas.microsoft.com/office/drawing/2010/main" val="0"/>
-              </a:ext>
-            </a:extLst>
-          </a:blip>
-          <a:stretch>
-            <a:fillRect/>
-          </a:stretch>
-        </p:blipFill>
-        <p:spPr>
-          <a:xfrm>
-            <a:off x="613206" y="4897270"/>
-            <a:ext cx="8073594" cy="1960730"/>
-          </a:xfrm>
-          <a:prstGeom prst="rect">
-            <a:avLst/>
-          </a:prstGeom>
-        </p:spPr>
-      </p:pic>
-      <p:sp>
-        <p:nvSpPr>
-          <p:cNvPr id="6" name="Textfeld 5"/>
-          <p:cNvSpPr txBox="1"/>
-          <p:nvPr/>
-        </p:nvSpPr>
-        <p:spPr>
-          <a:xfrm>
-            <a:off x="3347864" y="4435464"/>
-            <a:ext cx="2448272" cy="369332"/>
-          </a:xfrm>
-          <a:prstGeom prst="rect">
-            <a:avLst/>
-          </a:prstGeom>
-          <a:noFill/>
-        </p:spPr>
-        <p:txBody>
-          <a:bodyPr wrap="square" rtlCol="0">
-            <a:spAutoFit/>
-          </a:bodyPr>
-          <a:lstStyle/>
-          <a:p>
-            <a:r>
-              <a:rPr lang="en-GB" dirty="0" err="1" smtClean="0"/>
-              <a:t>Aufruf</a:t>
-            </a:r>
-            <a:r>
-              <a:rPr lang="en-GB" dirty="0" smtClean="0"/>
-              <a:t> der </a:t>
-            </a:r>
-            <a:r>
-              <a:rPr lang="en-GB" dirty="0" err="1" smtClean="0"/>
-              <a:t>Methode</a:t>
-            </a:r>
-            <a:endParaRPr lang="en-GB" dirty="0"/>
-          </a:p>
-        </p:txBody>
-      </p:sp>
-    </p:spTree>
-    <p:extLst>
-      <p:ext uri="{BB962C8B-B14F-4D97-AF65-F5344CB8AC3E}">
-        <p14:creationId xmlns:p14="http://schemas.microsoft.com/office/powerpoint/2010/main" val="3880234993"/>
-      </p:ext>
-    </p:extLst>
-  </p:cSld>
-  <p:clrMapOvr>
-    <a:masterClrMapping/>
-  </p:clrMapOvr>
-</p:sld>
-</file>
-
-<file path=ppt/slides/slide11.xml><?xml version="1.0" encoding="utf-8"?>
-<p:sld xmlns:a="http://schemas.openxmlformats.org/drawingml/2006/main" xmlns:r="http://schemas.openxmlformats.org/officeDocument/2006/relationships" xmlns:p="http://schemas.openxmlformats.org/presentationml/2006/main">
-  <p:cSld>
-    <p:spTree>
-      <p:nvGrpSpPr>
-        <p:cNvPr id="1" name=""/>
-        <p:cNvGrpSpPr/>
-        <p:nvPr/>
-      </p:nvGrpSpPr>
-      <p:grpSpPr>
-        <a:xfrm>
-          <a:off x="0" y="0"/>
-          <a:ext cx="0" cy="0"/>
-          <a:chOff x="0" y="0"/>
-          <a:chExt cx="0" cy="0"/>
-        </a:xfrm>
-      </p:grpSpPr>
-      <p:sp>
-        <p:nvSpPr>
-          <p:cNvPr id="2" name="Inhaltsplatzhalter 1"/>
-          <p:cNvSpPr>
-            <a:spLocks noGrp="1"/>
-          </p:cNvSpPr>
-          <p:nvPr>
-            <p:ph idx="1"/>
-          </p:nvPr>
-        </p:nvSpPr>
-        <p:spPr/>
-        <p:txBody>
-          <a:bodyPr/>
-          <a:lstStyle/>
-          <a:p>
-            <a:r>
-              <a:rPr lang="de-CH" dirty="0" err="1" smtClean="0"/>
-              <a:t>Deleting</a:t>
-            </a:r>
-            <a:r>
-              <a:rPr lang="de-CH" dirty="0" smtClean="0"/>
-              <a:t> a </a:t>
-            </a:r>
-            <a:r>
-              <a:rPr lang="de-CH" dirty="0" err="1" smtClean="0"/>
-              <a:t>new</a:t>
-            </a:r>
-            <a:r>
-              <a:rPr lang="de-CH" dirty="0" smtClean="0"/>
-              <a:t> </a:t>
-            </a:r>
-            <a:r>
-              <a:rPr lang="de-CH" dirty="0" err="1" smtClean="0"/>
-              <a:t>prescription</a:t>
-            </a:r>
-            <a:endParaRPr lang="de-CH" dirty="0" smtClean="0"/>
-          </a:p>
-          <a:p>
-            <a:endParaRPr lang="de-CH" dirty="0"/>
-          </a:p>
-          <a:p>
-            <a:endParaRPr lang="de-CH" dirty="0" smtClean="0"/>
-          </a:p>
-          <a:p>
-            <a:pPr marL="109728" indent="0">
-              <a:buNone/>
-            </a:pPr>
-            <a:endParaRPr lang="de-CH" dirty="0" smtClean="0"/>
-          </a:p>
-          <a:p>
-            <a:pPr marL="109728" indent="0">
-              <a:buNone/>
-            </a:pPr>
-            <a:endParaRPr lang="de-CH" dirty="0"/>
-          </a:p>
-        </p:txBody>
-      </p:sp>
-      <p:sp>
-        <p:nvSpPr>
-          <p:cNvPr id="3" name="Titel 2"/>
-          <p:cNvSpPr>
-            <a:spLocks noGrp="1"/>
-          </p:cNvSpPr>
-          <p:nvPr>
-            <p:ph type="title"/>
-          </p:nvPr>
-        </p:nvSpPr>
-        <p:spPr/>
-        <p:txBody>
-          <a:bodyPr/>
-          <a:lstStyle/>
-          <a:p>
-            <a:r>
-              <a:rPr lang="de-CH" dirty="0" err="1" smtClean="0"/>
-              <a:t>Contribution</a:t>
-            </a:r>
-            <a:r>
-              <a:rPr lang="de-CH" dirty="0" smtClean="0"/>
-              <a:t> Michel Murbach</a:t>
-            </a:r>
-            <a:endParaRPr lang="de-CH" dirty="0"/>
-          </a:p>
-        </p:txBody>
-      </p:sp>
-      <p:pic>
-        <p:nvPicPr>
           <p:cNvPr id="7" name="Grafik 6"/>
           <p:cNvPicPr>
             <a:picLocks noChangeAspect="1"/>
@@ -4943,7 +4730,7 @@
 </p:sld>
 </file>
 
-<file path=ppt/slides/slide12.xml><?xml version="1.0" encoding="utf-8"?>
+<file path=ppt/slides/slide11.xml><?xml version="1.0" encoding="utf-8"?>
 <p:sld xmlns:a="http://schemas.openxmlformats.org/drawingml/2006/main" xmlns:r="http://schemas.openxmlformats.org/officeDocument/2006/relationships" xmlns:p="http://schemas.openxmlformats.org/presentationml/2006/main">
   <p:cSld>
     <p:spTree>
@@ -5133,7 +4920,7 @@
 </p:sld>
 </file>
 
-<file path=ppt/slides/slide13.xml><?xml version="1.0" encoding="utf-8"?>
+<file path=ppt/slides/slide12.xml><?xml version="1.0" encoding="utf-8"?>
 <p:sld xmlns:a="http://schemas.openxmlformats.org/drawingml/2006/main" xmlns:r="http://schemas.openxmlformats.org/officeDocument/2006/relationships" xmlns:p="http://schemas.openxmlformats.org/presentationml/2006/main">
   <p:cSld>
     <p:spTree>
@@ -5323,7 +5110,7 @@
 </p:sld>
 </file>
 
-<file path=ppt/slides/slide14.xml><?xml version="1.0" encoding="utf-8"?>
+<file path=ppt/slides/slide13.xml><?xml version="1.0" encoding="utf-8"?>
 <p:sld xmlns:a="http://schemas.openxmlformats.org/drawingml/2006/main" xmlns:r="http://schemas.openxmlformats.org/officeDocument/2006/relationships" xmlns:p="http://schemas.openxmlformats.org/presentationml/2006/main">
   <p:cSld>
     <p:spTree>
@@ -5467,6 +5254,198 @@
 </p:sld>
 </file>
 
+<file path=ppt/slides/slide14.xml><?xml version="1.0" encoding="utf-8"?>
+<p:sld xmlns:a="http://schemas.openxmlformats.org/drawingml/2006/main" xmlns:r="http://schemas.openxmlformats.org/officeDocument/2006/relationships" xmlns:p="http://schemas.openxmlformats.org/presentationml/2006/main">
+  <p:cSld>
+    <p:spTree>
+      <p:nvGrpSpPr>
+        <p:cNvPr id="1" name=""/>
+        <p:cNvGrpSpPr/>
+        <p:nvPr/>
+      </p:nvGrpSpPr>
+      <p:grpSpPr>
+        <a:xfrm>
+          <a:off x="0" y="0"/>
+          <a:ext cx="0" cy="0"/>
+          <a:chOff x="0" y="0"/>
+          <a:chExt cx="0" cy="0"/>
+        </a:xfrm>
+      </p:grpSpPr>
+      <p:sp>
+        <p:nvSpPr>
+          <p:cNvPr id="2" name="Inhaltsplatzhalter 1"/>
+          <p:cNvSpPr>
+            <a:spLocks noGrp="1"/>
+          </p:cNvSpPr>
+          <p:nvPr>
+            <p:ph idx="1"/>
+          </p:nvPr>
+        </p:nvSpPr>
+        <p:spPr/>
+        <p:txBody>
+          <a:bodyPr/>
+          <a:lstStyle/>
+          <a:p>
+            <a:r>
+              <a:rPr lang="de-CH" dirty="0" err="1" smtClean="0"/>
+              <a:t>Creating</a:t>
+            </a:r>
+            <a:r>
+              <a:rPr lang="de-CH" dirty="0" smtClean="0"/>
+              <a:t> </a:t>
+            </a:r>
+            <a:r>
+              <a:rPr lang="de-CH" dirty="0" err="1" smtClean="0"/>
+              <a:t>Overview</a:t>
+            </a:r>
+            <a:r>
+              <a:rPr lang="de-CH" dirty="0" smtClean="0"/>
+              <a:t> </a:t>
+            </a:r>
+            <a:r>
+              <a:rPr lang="de-CH" dirty="0" err="1" smtClean="0"/>
+              <a:t>of</a:t>
+            </a:r>
+            <a:r>
+              <a:rPr lang="de-CH" dirty="0" smtClean="0"/>
+              <a:t> </a:t>
+            </a:r>
+            <a:r>
+              <a:rPr lang="de-CH" dirty="0" err="1" smtClean="0"/>
+              <a:t>Medication</a:t>
+            </a:r>
+            <a:endParaRPr lang="de-CH" dirty="0"/>
+          </a:p>
+          <a:p>
+            <a:r>
+              <a:rPr lang="de-CH" dirty="0" smtClean="0"/>
+              <a:t>Styling all Element </a:t>
+            </a:r>
+            <a:r>
+              <a:rPr lang="de-CH" dirty="0" err="1" smtClean="0"/>
+              <a:t>with</a:t>
+            </a:r>
+            <a:r>
+              <a:rPr lang="de-CH" dirty="0" smtClean="0"/>
+              <a:t> </a:t>
+            </a:r>
+            <a:r>
+              <a:rPr lang="de-CH" dirty="0" err="1" smtClean="0"/>
+              <a:t>mytheme.scss</a:t>
+            </a:r>
+            <a:endParaRPr lang="de-CH" dirty="0"/>
+          </a:p>
+          <a:p>
+            <a:r>
+              <a:rPr lang="de-CH" dirty="0" smtClean="0"/>
+              <a:t>Support </a:t>
+            </a:r>
+            <a:r>
+              <a:rPr lang="de-CH" dirty="0"/>
+              <a:t>/ Pair </a:t>
+            </a:r>
+            <a:r>
+              <a:rPr lang="de-CH" dirty="0" err="1" smtClean="0"/>
+              <a:t>Programming</a:t>
+            </a:r>
+            <a:r>
+              <a:rPr lang="de-CH" dirty="0" smtClean="0"/>
+              <a:t> </a:t>
+            </a:r>
+            <a:r>
+              <a:rPr lang="de-CH" dirty="0" err="1" smtClean="0"/>
+              <a:t>other</a:t>
+            </a:r>
+            <a:r>
+              <a:rPr lang="de-CH" dirty="0" smtClean="0"/>
+              <a:t> </a:t>
+            </a:r>
+            <a:r>
+              <a:rPr lang="de-CH" dirty="0" err="1" smtClean="0"/>
+              <a:t>Teammembers</a:t>
+            </a:r>
+            <a:endParaRPr lang="de-CH" dirty="0" smtClean="0"/>
+          </a:p>
+          <a:p>
+            <a:r>
+              <a:rPr lang="de-CH" dirty="0" smtClean="0"/>
+              <a:t>Test </a:t>
+            </a:r>
+            <a:r>
+              <a:rPr lang="de-CH" dirty="0" err="1" smtClean="0"/>
+              <a:t>Classes</a:t>
+            </a:r>
+            <a:r>
+              <a:rPr lang="de-CH" dirty="0" smtClean="0"/>
+              <a:t> </a:t>
+            </a:r>
+            <a:r>
+              <a:rPr lang="de-CH" dirty="0" err="1" smtClean="0"/>
+              <a:t>MsssqlRepository</a:t>
+            </a:r>
+            <a:r>
+              <a:rPr lang="de-CH" dirty="0" smtClean="0"/>
+              <a:t> </a:t>
+            </a:r>
+            <a:r>
+              <a:rPr lang="de-CH" dirty="0" err="1" smtClean="0"/>
+              <a:t>and</a:t>
+            </a:r>
+            <a:r>
+              <a:rPr lang="de-CH" dirty="0" smtClean="0"/>
+              <a:t> </a:t>
+            </a:r>
+            <a:r>
+              <a:rPr lang="de-CH" dirty="0" err="1" smtClean="0"/>
+              <a:t>PerscriptionRepository</a:t>
+            </a:r>
+            <a:endParaRPr lang="de-CH" dirty="0"/>
+          </a:p>
+          <a:p>
+            <a:endParaRPr lang="de-CH" dirty="0"/>
+          </a:p>
+        </p:txBody>
+      </p:sp>
+      <p:sp>
+        <p:nvSpPr>
+          <p:cNvPr id="3" name="Titel 2"/>
+          <p:cNvSpPr>
+            <a:spLocks noGrp="1"/>
+          </p:cNvSpPr>
+          <p:nvPr>
+            <p:ph type="title"/>
+          </p:nvPr>
+        </p:nvSpPr>
+        <p:spPr/>
+        <p:txBody>
+          <a:bodyPr/>
+          <a:lstStyle/>
+          <a:p>
+            <a:r>
+              <a:rPr lang="de-CH" dirty="0" err="1" smtClean="0"/>
+              <a:t>Contribution</a:t>
+            </a:r>
+            <a:r>
+              <a:rPr lang="de-CH" dirty="0" smtClean="0"/>
+              <a:t> Carole Kaiser</a:t>
+            </a:r>
+            <a:endParaRPr lang="de-CH" dirty="0"/>
+          </a:p>
+        </p:txBody>
+      </p:sp>
+    </p:spTree>
+    <p:extLst>
+      <p:ext uri="{BB962C8B-B14F-4D97-AF65-F5344CB8AC3E}">
+        <p14:creationId xmlns:p14="http://schemas.microsoft.com/office/powerpoint/2010/main" val="3459893387"/>
+      </p:ext>
+    </p:extLst>
+  </p:cSld>
+  <p:clrMapOvr>
+    <a:masterClrMapping/>
+  </p:clrMapOvr>
+</p:sld>
+</file>
+
 <file path=ppt/slides/slide15.xml><?xml version="1.0" encoding="utf-8"?>
 <p:sld xmlns:a="http://schemas.openxmlformats.org/drawingml/2006/main" xmlns:r="http://schemas.openxmlformats.org/officeDocument/2006/relationships" xmlns:p="http://schemas.openxmlformats.org/presentationml/2006/main">
   <p:cSld>
@@ -5486,7 +5465,7 @@
       </p:grpSpPr>
       <p:sp>
         <p:nvSpPr>
-          <p:cNvPr id="2" name="Inhaltsplatzhalter 1"/>
+          <p:cNvPr id="2" name="Content Placeholder 1"/>
           <p:cNvSpPr>
             <a:spLocks noGrp="1"/>
           </p:cNvSpPr>
@@ -5500,128 +5479,57 @@
           <a:lstStyle/>
           <a:p>
             <a:r>
-              <a:rPr lang="de-CH" dirty="0" err="1" smtClean="0"/>
-              <a:t>Creating</a:t>
+              <a:rPr lang="de-CH" dirty="0"/>
+              <a:t>Creating Overview of </a:t>
             </a:r>
             <a:r>
               <a:rPr lang="de-CH" dirty="0" smtClean="0"/>
-              <a:t> </a:t>
-            </a:r>
-            <a:r>
-              <a:rPr lang="de-CH" dirty="0" err="1" smtClean="0"/>
-              <a:t>Overview</a:t>
-            </a:r>
+              <a:t>Medication</a:t>
+            </a:r>
+          </a:p>
+          <a:p>
             <a:r>
               <a:rPr lang="de-CH" dirty="0" smtClean="0"/>
-              <a:t> </a:t>
-            </a:r>
-            <a:r>
-              <a:rPr lang="de-CH" dirty="0" err="1" smtClean="0"/>
-              <a:t>of</a:t>
-            </a:r>
+              <a:t>Creating MedicationInsertView</a:t>
+            </a:r>
+            <a:endParaRPr lang="de-CH" dirty="0"/>
+          </a:p>
+          <a:p>
             <a:r>
               <a:rPr lang="de-CH" dirty="0" smtClean="0"/>
-              <a:t> </a:t>
-            </a:r>
-            <a:r>
-              <a:rPr lang="de-CH" dirty="0" err="1" smtClean="0"/>
-              <a:t>Medication</a:t>
+              <a:t>mytheme.scss </a:t>
+            </a:r>
+          </a:p>
+          <a:p>
+            <a:pPr lvl="1"/>
+            <a:r>
+              <a:rPr lang="de-CH" dirty="0" smtClean="0"/>
+              <a:t>Panel </a:t>
+            </a:r>
+            <a:r>
+              <a:rPr lang="de-DE" dirty="0" smtClean="0"/>
+              <a:t>Alignment</a:t>
+            </a:r>
+          </a:p>
+          <a:p>
+            <a:pPr lvl="1"/>
+            <a:r>
+              <a:rPr lang="en-US" dirty="0" smtClean="0"/>
+              <a:t>Table selected row</a:t>
             </a:r>
             <a:endParaRPr lang="de-CH" dirty="0"/>
           </a:p>
           <a:p>
-            <a:r>
-              <a:rPr lang="de-CH" dirty="0" smtClean="0"/>
-              <a:t>Styling all Element </a:t>
-            </a:r>
-            <a:r>
-              <a:rPr lang="de-CH" dirty="0" err="1" smtClean="0"/>
-              <a:t>with</a:t>
-            </a:r>
-            <a:r>
-              <a:rPr lang="de-CH" dirty="0" smtClean="0"/>
-              <a:t> </a:t>
-            </a:r>
-            <a:r>
-              <a:rPr lang="de-CH" dirty="0" err="1" smtClean="0"/>
-              <a:t>mytheme.scss</a:t>
-            </a:r>
+            <a:pPr marL="109728" indent="0">
+              <a:buNone/>
+            </a:pPr>
             <a:endParaRPr lang="de-CH" dirty="0"/>
           </a:p>
-          <a:p>
-            <a:r>
-              <a:rPr lang="de-CH" dirty="0" smtClean="0"/>
-              <a:t>Support </a:t>
-            </a:r>
-            <a:r>
-              <a:rPr lang="de-CH" dirty="0"/>
-              <a:t>/ Pair </a:t>
-            </a:r>
-            <a:r>
-              <a:rPr lang="de-CH" dirty="0" err="1" smtClean="0"/>
-              <a:t>Programming</a:t>
-            </a:r>
-            <a:r>
-              <a:rPr lang="de-CH" dirty="0" smtClean="0"/>
-              <a:t> </a:t>
-            </a:r>
-            <a:r>
-              <a:rPr lang="de-CH" dirty="0" err="1" smtClean="0"/>
-              <a:t>other</a:t>
-            </a:r>
-            <a:r>
-              <a:rPr lang="de-CH" dirty="0" smtClean="0"/>
-              <a:t> </a:t>
-            </a:r>
-            <a:r>
-              <a:rPr lang="de-CH" dirty="0" err="1" smtClean="0"/>
-              <a:t>Teammembers</a:t>
-            </a:r>
-            <a:endParaRPr lang="de-CH" dirty="0" smtClean="0"/>
-          </a:p>
-          <a:p>
-            <a:r>
-              <a:rPr lang="de-CH" dirty="0" smtClean="0"/>
-              <a:t>Test </a:t>
-            </a:r>
-            <a:r>
-              <a:rPr lang="de-CH" dirty="0" err="1" smtClean="0"/>
-              <a:t>Classes</a:t>
-            </a:r>
-            <a:r>
-              <a:rPr lang="de-CH" dirty="0" smtClean="0"/>
-              <a:t> </a:t>
-            </a:r>
-            <a:r>
-              <a:rPr lang="de-CH" dirty="0" err="1" smtClean="0"/>
-              <a:t>MsssqlRepository</a:t>
-            </a:r>
-            <a:r>
-              <a:rPr lang="de-CH" dirty="0" smtClean="0"/>
-              <a:t> </a:t>
-            </a:r>
-            <a:r>
-              <a:rPr lang="de-CH" dirty="0" err="1" smtClean="0"/>
-              <a:t>and</a:t>
-            </a:r>
-            <a:r>
-              <a:rPr lang="de-CH" dirty="0" smtClean="0"/>
-              <a:t> </a:t>
-            </a:r>
-            <a:r>
-              <a:rPr lang="de-CH" dirty="0" err="1" smtClean="0"/>
-              <a:t>PerscriptionRepository</a:t>
-            </a:r>
-            <a:endParaRPr lang="de-CH" dirty="0"/>
-          </a:p>
-          <a:p>
-            <a:endParaRPr lang="de-CH" dirty="0"/>
-          </a:p>
-        </p:txBody>
-      </p:sp>
-      <p:sp>
-        <p:nvSpPr>
-          <p:cNvPr id="3" name="Titel 2"/>
+        </p:txBody>
+      </p:sp>
+      <p:sp>
+        <p:nvSpPr>
+          <p:cNvPr id="3" name="Title 2"/>
           <p:cNvSpPr>
             <a:spLocks noGrp="1"/>
           </p:cNvSpPr>
@@ -5635,21 +5543,21 @@
           <a:lstStyle/>
           <a:p>
             <a:r>
-              <a:rPr lang="de-CH" dirty="0" err="1" smtClean="0"/>
-              <a:t>Contribution</a:t>
+              <a:rPr lang="de-CH" dirty="0"/>
+              <a:t>Contribution </a:t>
             </a:r>
             <a:r>
               <a:rPr lang="de-CH" dirty="0" smtClean="0"/>
-              <a:t> Carole Kaiser</a:t>
-            </a:r>
-            <a:endParaRPr lang="de-CH" dirty="0"/>
+              <a:t>Amin Ghodrati</a:t>
+            </a:r>
+            <a:endParaRPr lang="de-DE" dirty="0"/>
           </a:p>
         </p:txBody>
       </p:sp>
     </p:spTree>
     <p:extLst>
       <p:ext uri="{BB962C8B-B14F-4D97-AF65-F5344CB8AC3E}">
-        <p14:creationId xmlns:p14="http://schemas.microsoft.com/office/powerpoint/2010/main" val="3459893387"/>
+        <p14:creationId xmlns:p14="http://schemas.microsoft.com/office/powerpoint/2010/main" val="3968257018"/>
       </p:ext>
     </p:extLst>
   </p:cSld>
@@ -5676,134 +5584,6 @@
           <a:chExt cx="0" cy="0"/>
         </a:xfrm>
       </p:grpSpPr>
-      <p:sp>
-        <p:nvSpPr>
-          <p:cNvPr id="2" name="Content Placeholder 1"/>
-          <p:cNvSpPr>
-            <a:spLocks noGrp="1"/>
-          </p:cNvSpPr>
-          <p:nvPr>
-            <p:ph idx="1"/>
-          </p:nvPr>
-        </p:nvSpPr>
-        <p:spPr/>
-        <p:txBody>
-          <a:bodyPr/>
-          <a:lstStyle/>
-          <a:p>
-            <a:r>
-              <a:rPr lang="de-CH" dirty="0"/>
-              <a:t>Creating Overview of </a:t>
-            </a:r>
-            <a:r>
-              <a:rPr lang="de-CH" dirty="0" smtClean="0"/>
-              <a:t>Medication</a:t>
-            </a:r>
-          </a:p>
-          <a:p>
-            <a:r>
-              <a:rPr lang="de-CH" dirty="0" smtClean="0"/>
-              <a:t>Creating MedicationInsertView</a:t>
-            </a:r>
-            <a:endParaRPr lang="de-CH" dirty="0"/>
-          </a:p>
-          <a:p>
-            <a:r>
-              <a:rPr lang="de-CH" dirty="0" smtClean="0"/>
-              <a:t>mytheme.scss </a:t>
-            </a:r>
-          </a:p>
-          <a:p>
-            <a:pPr lvl="1"/>
-            <a:r>
-              <a:rPr lang="de-CH" dirty="0" smtClean="0"/>
-              <a:t>Panel </a:t>
-            </a:r>
-            <a:r>
-              <a:rPr lang="de-DE" dirty="0" smtClean="0"/>
-              <a:t>Alignment</a:t>
-            </a:r>
-          </a:p>
-          <a:p>
-            <a:pPr lvl="1"/>
-            <a:r>
-              <a:rPr lang="en-US" dirty="0" smtClean="0"/>
-              <a:t>Table selected row</a:t>
-            </a:r>
-            <a:endParaRPr lang="de-CH" dirty="0"/>
-          </a:p>
-          <a:p>
-            <a:pPr marL="109728" indent="0">
-              <a:buNone/>
-            </a:pPr>
-            <a:endParaRPr lang="de-CH" dirty="0"/>
-          </a:p>
-        </p:txBody>
-      </p:sp>
-      <p:sp>
-        <p:nvSpPr>
-          <p:cNvPr id="3" name="Title 2"/>
-          <p:cNvSpPr>
-            <a:spLocks noGrp="1"/>
-          </p:cNvSpPr>
-          <p:nvPr>
-            <p:ph type="title"/>
-          </p:nvPr>
-        </p:nvSpPr>
-        <p:spPr/>
-        <p:txBody>
-          <a:bodyPr/>
-          <a:lstStyle/>
-          <a:p>
-            <a:r>
-              <a:rPr lang="de-CH" dirty="0"/>
-              <a:t>Contribution </a:t>
-            </a:r>
-            <a:r>
-              <a:rPr lang="de-CH" dirty="0" smtClean="0"/>
-              <a:t>Amin Ghodrati</a:t>
-            </a:r>
-            <a:endParaRPr lang="de-DE" dirty="0"/>
-          </a:p>
-        </p:txBody>
-      </p:sp>
-    </p:spTree>
-    <p:extLst>
-      <p:ext uri="{BB962C8B-B14F-4D97-AF65-F5344CB8AC3E}">
-        <p14:creationId xmlns:p14="http://schemas.microsoft.com/office/powerpoint/2010/main" val="3968257018"/>
-      </p:ext>
-    </p:extLst>
-  </p:cSld>
-  <p:clrMapOvr>
-    <a:masterClrMapping/>
-  </p:clrMapOvr>
-  <p:timing>
-    <p:tnLst>
-      <p:par>
-        <p:cTn id="1" dur="indefinite" restart="never" nodeType="tmRoot"/>
-      </p:par>
-    </p:tnLst>
-  </p:timing>
-</p:sld>
-</file>
-
-<file path=ppt/slides/slide17.xml><?xml version="1.0" encoding="utf-8"?>
-<p:sld xmlns:a="http://schemas.openxmlformats.org/drawingml/2006/main" xmlns:r="http://schemas.openxmlformats.org/officeDocument/2006/relationships" xmlns:p="http://schemas.openxmlformats.org/presentationml/2006/main">
-  <p:cSld>
-    <p:spTree>
-      <p:nvGrpSpPr>
-        <p:cNvPr id="1" name=""/>
-        <p:cNvGrpSpPr/>
-        <p:nvPr/>
-      </p:nvGrpSpPr>
-      <p:grpSpPr>
-        <a:xfrm>
-          <a:off x="0" y="0"/>
-          <a:ext cx="0" cy="0"/>
-          <a:chOff x="0" y="0"/>
-          <a:chExt cx="0" cy="0"/>
-        </a:xfrm>
-      </p:grpSpPr>
       <p:pic>
         <p:nvPicPr>
           <p:cNvPr id="4" name="Content Placeholder 3"/>
@@ -5869,17 +5649,10 @@
   <p:clrMapOvr>
     <a:masterClrMapping/>
   </p:clrMapOvr>
-  <p:timing>
-    <p:tnLst>
-      <p:par>
-        <p:cTn id="1" dur="indefinite" restart="never" nodeType="tmRoot"/>
-      </p:par>
-    </p:tnLst>
-  </p:timing>
 </p:sld>
 </file>
 
-<file path=ppt/slides/slide18.xml><?xml version="1.0" encoding="utf-8"?>
+<file path=ppt/slides/slide17.xml><?xml version="1.0" encoding="utf-8"?>
 <p:sld xmlns:a="http://schemas.openxmlformats.org/drawingml/2006/main" xmlns:r="http://schemas.openxmlformats.org/officeDocument/2006/relationships" xmlns:p="http://schemas.openxmlformats.org/presentationml/2006/main">
   <p:cSld>
     <p:spTree>
@@ -6441,6 +6214,89 @@
 </p:sld>
 </file>
 
+<file path=ppt/slides/slide18.xml><?xml version="1.0" encoding="utf-8"?>
+<p:sld xmlns:a="http://schemas.openxmlformats.org/drawingml/2006/main" xmlns:r="http://schemas.openxmlformats.org/officeDocument/2006/relationships" xmlns:p="http://schemas.openxmlformats.org/presentationml/2006/main">
+  <p:cSld>
+    <p:spTree>
+      <p:nvGrpSpPr>
+        <p:cNvPr id="1" name=""/>
+        <p:cNvGrpSpPr/>
+        <p:nvPr/>
+      </p:nvGrpSpPr>
+      <p:grpSpPr>
+        <a:xfrm>
+          <a:off x="0" y="0"/>
+          <a:ext cx="0" cy="0"/>
+          <a:chOff x="0" y="0"/>
+          <a:chExt cx="0" cy="0"/>
+        </a:xfrm>
+      </p:grpSpPr>
+      <p:pic>
+        <p:nvPicPr>
+          <p:cNvPr id="4" name="Content Placeholder 3"/>
+          <p:cNvPicPr>
+            <a:picLocks noGrp="1" noChangeAspect="1"/>
+          </p:cNvPicPr>
+          <p:nvPr>
+            <p:ph idx="1"/>
+          </p:nvPr>
+        </p:nvPicPr>
+        <p:blipFill>
+          <a:blip r:embed="rId2">
+            <a:extLst>
+              <a:ext uri="{28A0092B-C50C-407E-A947-70E740481C1C}">
+                <a14:useLocalDpi xmlns:a14="http://schemas.microsoft.com/office/drawing/2010/main" val="0"/>
+              </a:ext>
+            </a:extLst>
+          </a:blip>
+          <a:stretch>
+            <a:fillRect/>
+          </a:stretch>
+        </p:blipFill>
+        <p:spPr>
+          <a:xfrm>
+            <a:off x="323528" y="1412776"/>
+            <a:ext cx="5472608" cy="4032448"/>
+          </a:xfrm>
+        </p:spPr>
+      </p:pic>
+      <p:sp>
+        <p:nvSpPr>
+          <p:cNvPr id="3" name="Title 2"/>
+          <p:cNvSpPr>
+            <a:spLocks noGrp="1"/>
+          </p:cNvSpPr>
+          <p:nvPr>
+            <p:ph type="title"/>
+          </p:nvPr>
+        </p:nvSpPr>
+        <p:spPr/>
+        <p:txBody>
+          <a:bodyPr/>
+          <a:lstStyle/>
+          <a:p>
+            <a:pPr algn="ctr"/>
+            <a:r>
+              <a:rPr lang="de-CH" dirty="0"/>
+              <a:t>MedicationOverView</a:t>
+            </a:r>
+            <a:endParaRPr lang="de-DE" dirty="0"/>
+          </a:p>
+        </p:txBody>
+      </p:sp>
+    </p:spTree>
+    <p:extLst>
+      <p:ext uri="{BB962C8B-B14F-4D97-AF65-F5344CB8AC3E}">
+        <p14:creationId xmlns:p14="http://schemas.microsoft.com/office/powerpoint/2010/main" val="2311444091"/>
+      </p:ext>
+    </p:extLst>
+  </p:cSld>
+  <p:clrMapOvr>
+    <a:masterClrMapping/>
+  </p:clrMapOvr>
+</p:sld>
+</file>
+
 <file path=ppt/slides/slide19.xml><?xml version="1.0" encoding="utf-8"?>
 <p:sld xmlns:a="http://schemas.openxmlformats.org/drawingml/2006/main" xmlns:r="http://schemas.openxmlformats.org/officeDocument/2006/relationships" xmlns:p="http://schemas.openxmlformats.org/presentationml/2006/main">
   <p:cSld>
@@ -6482,8 +6338,8 @@
         </p:blipFill>
         <p:spPr>
           <a:xfrm>
-            <a:off x="323528" y="1412776"/>
-            <a:ext cx="5472608" cy="4032448"/>
+            <a:off x="395536" y="1196752"/>
+            <a:ext cx="6628526" cy="3888432"/>
           </a:xfrm>
         </p:spPr>
       </p:pic>
@@ -6514,20 +6370,13 @@
     </p:spTree>
     <p:extLst>
       <p:ext uri="{BB962C8B-B14F-4D97-AF65-F5344CB8AC3E}">
-        <p14:creationId xmlns:p14="http://schemas.microsoft.com/office/powerpoint/2010/main" val="2311444091"/>
+        <p14:creationId xmlns:p14="http://schemas.microsoft.com/office/powerpoint/2010/main" val="2169692373"/>
       </p:ext>
     </p:extLst>
   </p:cSld>
   <p:clrMapOvr>
     <a:masterClrMapping/>
   </p:clrMapOvr>
-  <p:timing>
-    <p:tnLst>
-      <p:par>
-        <p:cTn id="1" dur="indefinite" restart="never" nodeType="tmRoot"/>
-      </p:par>
-    </p:tnLst>
-  </p:timing>
 </p:sld>
 </file>
 
@@ -6654,8 +6503,8 @@
         </p:blipFill>
         <p:spPr>
           <a:xfrm>
-            <a:off x="395536" y="1196752"/>
-            <a:ext cx="6628526" cy="3888432"/>
+            <a:off x="457200" y="1052736"/>
+            <a:ext cx="8229600" cy="5112568"/>
           </a:xfrm>
         </p:spPr>
       </p:pic>
@@ -6671,14 +6520,19 @@
         </p:nvSpPr>
         <p:spPr/>
         <p:txBody>
-          <a:bodyPr/>
+          <a:bodyPr>
+            <a:normAutofit fontScale="90000"/>
+          </a:bodyPr>
           <a:lstStyle/>
           <a:p>
             <a:pPr algn="ctr"/>
             <a:r>
               <a:rPr lang="de-CH" dirty="0"/>
-              <a:t>MedicationOverView</a:t>
-            </a:r>
+              <a:t>Creating MedicationInsertView</a:t>
+            </a:r>
+            <a:br>
+              <a:rPr lang="de-CH" dirty="0"/>
+            </a:br>
             <a:endParaRPr lang="de-DE" dirty="0"/>
           </a:p>
         </p:txBody>
@@ -6686,20 +6540,13 @@
     </p:spTree>
     <p:extLst>
       <p:ext uri="{BB962C8B-B14F-4D97-AF65-F5344CB8AC3E}">
-        <p14:creationId xmlns:p14="http://schemas.microsoft.com/office/powerpoint/2010/main" val="2169692373"/>
+        <p14:creationId xmlns:p14="http://schemas.microsoft.com/office/powerpoint/2010/main" val="3896834639"/>
       </p:ext>
     </p:extLst>
   </p:cSld>
   <p:clrMapOvr>
     <a:masterClrMapping/>
   </p:clrMapOvr>
-  <p:timing>
-    <p:tnLst>
-      <p:par>
-        <p:cTn id="1" dur="indefinite" restart="never" nodeType="tmRoot"/>
-      </p:par>
-    </p:tnLst>
-  </p:timing>
 </p:sld>
 </file>
 
@@ -6744,8 +6591,8 @@
         </p:blipFill>
         <p:spPr>
           <a:xfrm>
-            <a:off x="457200" y="1052736"/>
-            <a:ext cx="8229600" cy="5112568"/>
+            <a:off x="251520" y="1412776"/>
+            <a:ext cx="6633782" cy="4174992"/>
           </a:xfrm>
         </p:spPr>
       </p:pic>
@@ -6781,20 +6628,13 @@
     </p:spTree>
     <p:extLst>
       <p:ext uri="{BB962C8B-B14F-4D97-AF65-F5344CB8AC3E}">
-        <p14:creationId xmlns:p14="http://schemas.microsoft.com/office/powerpoint/2010/main" val="3896834639"/>
+        <p14:creationId xmlns:p14="http://schemas.microsoft.com/office/powerpoint/2010/main" val="2604600737"/>
       </p:ext>
     </p:extLst>
   </p:cSld>
   <p:clrMapOvr>
     <a:masterClrMapping/>
   </p:clrMapOvr>
-  <p:timing>
-    <p:tnLst>
-      <p:par>
-        <p:cTn id="1" dur="indefinite" restart="never" nodeType="tmRoot"/>
-      </p:par>
-    </p:tnLst>
-  </p:timing>
 </p:sld>
 </file>
 
@@ -6815,35 +6655,101 @@
           <a:chExt cx="0" cy="0"/>
         </a:xfrm>
       </p:grpSpPr>
-      <p:pic>
-        <p:nvPicPr>
-          <p:cNvPr id="4" name="Content Placeholder 3"/>
-          <p:cNvPicPr>
-            <a:picLocks noGrp="1" noChangeAspect="1"/>
-          </p:cNvPicPr>
+      <p:sp>
+        <p:nvSpPr>
+          <p:cNvPr id="2" name="Content Placeholder 1"/>
+          <p:cNvSpPr>
+            <a:spLocks noGrp="1"/>
+          </p:cNvSpPr>
           <p:nvPr>
             <p:ph idx="1"/>
           </p:nvPr>
-        </p:nvPicPr>
-        <p:blipFill>
-          <a:blip r:embed="rId2">
-            <a:extLst>
-              <a:ext uri="{28A0092B-C50C-407E-A947-70E740481C1C}">
-                <a14:useLocalDpi xmlns:a14="http://schemas.microsoft.com/office/drawing/2010/main" val="0"/>
-              </a:ext>
-            </a:extLst>
-          </a:blip>
-          <a:stretch>
-            <a:fillRect/>
-          </a:stretch>
-        </p:blipFill>
-        <p:spPr>
-          <a:xfrm>
-            <a:off x="251520" y="1412776"/>
-            <a:ext cx="6633782" cy="4174992"/>
-          </a:xfrm>
-        </p:spPr>
-      </p:pic>
+        </p:nvSpPr>
+        <p:spPr/>
+        <p:txBody>
+          <a:bodyPr/>
+          <a:lstStyle/>
+          <a:p>
+            <a:pPr marL="365760" lvl="1" indent="-256032">
+              <a:spcBef>
+                <a:spcPts val="400"/>
+              </a:spcBef>
+              <a:buSzPct val="68000"/>
+              <a:buFont typeface="Wingdings 3"/>
+              <a:buChar char=""/>
+            </a:pPr>
+            <a:r>
+              <a:rPr lang="de-CH" dirty="0"/>
+              <a:t>Panel </a:t>
+            </a:r>
+            <a:r>
+              <a:rPr lang="de-DE" dirty="0"/>
+              <a:t>Alignment</a:t>
+            </a:r>
+          </a:p>
+          <a:p>
+            <a:pPr marL="109728" indent="0">
+              <a:buNone/>
+            </a:pPr>
+            <a:r>
+              <a:rPr lang="de-DE" dirty="0"/>
+              <a:t>.v-panel {</a:t>
+            </a:r>
+          </a:p>
+          <a:p>
+            <a:pPr marL="109728" indent="0">
+              <a:buNone/>
+            </a:pPr>
+            <a:r>
+              <a:rPr lang="de-DE" dirty="0"/>
+              <a:t>  width: 730px</a:t>
+            </a:r>
+            <a:r>
+              <a:rPr lang="de-DE" dirty="0" smtClean="0"/>
+              <a:t>;</a:t>
+            </a:r>
+          </a:p>
+          <a:p>
+            <a:pPr marL="109728" indent="0">
+              <a:buNone/>
+            </a:pPr>
+            <a:r>
+              <a:rPr lang="de-DE" dirty="0" smtClean="0"/>
+              <a:t>  text-align: center;</a:t>
+            </a:r>
+          </a:p>
+          <a:p>
+            <a:pPr marL="109728" indent="0">
+              <a:buNone/>
+            </a:pPr>
+            <a:r>
+              <a:rPr lang="de-DE" dirty="0" smtClean="0"/>
+              <a:t>  </a:t>
+            </a:r>
+            <a:r>
+              <a:rPr lang="de-DE" dirty="0"/>
+              <a:t>alignment: center;</a:t>
+            </a:r>
+          </a:p>
+          <a:p>
+            <a:pPr marL="109728" indent="0">
+              <a:buNone/>
+            </a:pPr>
+            <a:r>
+              <a:rPr lang="de-DE" dirty="0"/>
+              <a:t>  </a:t>
+            </a:r>
+            <a:r>
+              <a:rPr lang="de-DE" dirty="0" smtClean="0"/>
+              <a:t>  </a:t>
+            </a:r>
+            <a:r>
+              <a:rPr lang="de-DE" dirty="0"/>
+              <a:t>}</a:t>
+            </a:r>
+          </a:p>
+        </p:txBody>
+      </p:sp>
       <p:sp>
         <p:nvSpPr>
           <p:cNvPr id="3" name="Title 2"/>
@@ -6856,19 +6762,13 @@
         </p:nvSpPr>
         <p:spPr/>
         <p:txBody>
-          <a:bodyPr>
-            <a:normAutofit fontScale="90000"/>
-          </a:bodyPr>
+          <a:bodyPr/>
           <a:lstStyle/>
           <a:p>
-            <a:pPr algn="ctr"/>
             <a:r>
               <a:rPr lang="de-CH" dirty="0"/>
-              <a:t>Creating MedicationInsertView</a:t>
-            </a:r>
-            <a:br>
-              <a:rPr lang="de-CH" dirty="0"/>
-            </a:br>
+              <a:t>mytheme.scss</a:t>
+            </a:r>
             <a:endParaRPr lang="de-DE" dirty="0"/>
           </a:p>
         </p:txBody>
@@ -6876,20 +6776,13 @@
     </p:spTree>
     <p:extLst>
       <p:ext uri="{BB962C8B-B14F-4D97-AF65-F5344CB8AC3E}">
-        <p14:creationId xmlns:p14="http://schemas.microsoft.com/office/powerpoint/2010/main" val="2604600737"/>
+        <p14:creationId xmlns:p14="http://schemas.microsoft.com/office/powerpoint/2010/main" val="3886124791"/>
       </p:ext>
     </p:extLst>
   </p:cSld>
   <p:clrMapOvr>
     <a:masterClrMapping/>
   </p:clrMapOvr>
-  <p:timing>
-    <p:tnLst>
-      <p:par>
-        <p:cTn id="1" dur="indefinite" restart="never" nodeType="tmRoot"/>
-      </p:par>
-    </p:tnLst>
-  </p:timing>
 </p:sld>
 </file>
 
@@ -6922,161 +6815,6 @@
         </p:nvSpPr>
         <p:spPr/>
         <p:txBody>
-          <a:bodyPr/>
-          <a:lstStyle/>
-          <a:p>
-            <a:pPr marL="365760" lvl="1" indent="-256032">
-              <a:spcBef>
-                <a:spcPts val="400"/>
-              </a:spcBef>
-              <a:buSzPct val="68000"/>
-              <a:buFont typeface="Wingdings 3"/>
-              <a:buChar char=""/>
-            </a:pPr>
-            <a:r>
-              <a:rPr lang="de-CH" dirty="0"/>
-              <a:t>Panel </a:t>
-            </a:r>
-            <a:r>
-              <a:rPr lang="de-DE" dirty="0"/>
-              <a:t>Alignment</a:t>
-            </a:r>
-          </a:p>
-          <a:p>
-            <a:pPr marL="109728" indent="0">
-              <a:buNone/>
-            </a:pPr>
-            <a:r>
-              <a:rPr lang="de-DE" dirty="0"/>
-              <a:t>.v-panel {</a:t>
-            </a:r>
-          </a:p>
-          <a:p>
-            <a:pPr marL="109728" indent="0">
-              <a:buNone/>
-            </a:pPr>
-            <a:r>
-              <a:rPr lang="de-DE" dirty="0"/>
-              <a:t>  width: 730px</a:t>
-            </a:r>
-            <a:r>
-              <a:rPr lang="de-DE" dirty="0" smtClean="0"/>
-              <a:t>;</a:t>
-            </a:r>
-          </a:p>
-          <a:p>
-            <a:pPr marL="109728" indent="0">
-              <a:buNone/>
-            </a:pPr>
-            <a:r>
-              <a:rPr lang="de-DE" dirty="0" smtClean="0"/>
-              <a:t>  text-align: center;</a:t>
-            </a:r>
-          </a:p>
-          <a:p>
-            <a:pPr marL="109728" indent="0">
-              <a:buNone/>
-            </a:pPr>
-            <a:r>
-              <a:rPr lang="de-DE" dirty="0" smtClean="0"/>
-              <a:t>  </a:t>
-            </a:r>
-            <a:r>
-              <a:rPr lang="de-DE" dirty="0"/>
-              <a:t>alignment: center;</a:t>
-            </a:r>
-          </a:p>
-          <a:p>
-            <a:pPr marL="109728" indent="0">
-              <a:buNone/>
-            </a:pPr>
-            <a:r>
-              <a:rPr lang="de-DE" dirty="0"/>
-              <a:t>  </a:t>
-            </a:r>
-            <a:r>
-              <a:rPr lang="de-DE" dirty="0" smtClean="0"/>
-              <a:t>  </a:t>
-            </a:r>
-            <a:r>
-              <a:rPr lang="de-DE" dirty="0"/>
-              <a:t>}</a:t>
-            </a:r>
-          </a:p>
-        </p:txBody>
-      </p:sp>
-      <p:sp>
-        <p:nvSpPr>
-          <p:cNvPr id="3" name="Title 2"/>
-          <p:cNvSpPr>
-            <a:spLocks noGrp="1"/>
-          </p:cNvSpPr>
-          <p:nvPr>
-            <p:ph type="title"/>
-          </p:nvPr>
-        </p:nvSpPr>
-        <p:spPr/>
-        <p:txBody>
-          <a:bodyPr/>
-          <a:lstStyle/>
-          <a:p>
-            <a:r>
-              <a:rPr lang="de-CH" dirty="0"/>
-              <a:t>mytheme.scss</a:t>
-            </a:r>
-            <a:endParaRPr lang="de-DE" dirty="0"/>
-          </a:p>
-        </p:txBody>
-      </p:sp>
-    </p:spTree>
-    <p:extLst>
-      <p:ext uri="{BB962C8B-B14F-4D97-AF65-F5344CB8AC3E}">
-        <p14:creationId xmlns:p14="http://schemas.microsoft.com/office/powerpoint/2010/main" val="3886124791"/>
-      </p:ext>
-    </p:extLst>
-  </p:cSld>
-  <p:clrMapOvr>
-    <a:masterClrMapping/>
-  </p:clrMapOvr>
-  <p:timing>
-    <p:tnLst>
-      <p:par>
-        <p:cTn id="1" dur="indefinite" restart="never" nodeType="tmRoot"/>
-      </p:par>
-    </p:tnLst>
-  </p:timing>
-</p:sld>
-</file>
-
-<file path=ppt/slides/slide24.xml><?xml version="1.0" encoding="utf-8"?>
-<p:sld xmlns:a="http://schemas.openxmlformats.org/drawingml/2006/main" xmlns:r="http://schemas.openxmlformats.org/officeDocument/2006/relationships" xmlns:p="http://schemas.openxmlformats.org/presentationml/2006/main">
-  <p:cSld>
-    <p:spTree>
-      <p:nvGrpSpPr>
-        <p:cNvPr id="1" name=""/>
-        <p:cNvGrpSpPr/>
-        <p:nvPr/>
-      </p:nvGrpSpPr>
-      <p:grpSpPr>
-        <a:xfrm>
-          <a:off x="0" y="0"/>
-          <a:ext cx="0" cy="0"/>
-          <a:chOff x="0" y="0"/>
-          <a:chExt cx="0" cy="0"/>
-        </a:xfrm>
-      </p:grpSpPr>
-      <p:sp>
-        <p:nvSpPr>
-          <p:cNvPr id="2" name="Content Placeholder 1"/>
-          <p:cNvSpPr>
-            <a:spLocks noGrp="1"/>
-          </p:cNvSpPr>
-          <p:nvPr>
-            <p:ph idx="1"/>
-          </p:nvPr>
-        </p:nvSpPr>
-        <p:spPr/>
-        <p:txBody>
           <a:bodyPr>
             <a:normAutofit/>
           </a:bodyPr>
@@ -7220,13 +6958,6 @@
   <p:clrMapOvr>
     <a:masterClrMapping/>
   </p:clrMapOvr>
-  <p:timing>
-    <p:tnLst>
-      <p:par>
-        <p:cTn id="1" dur="indefinite" restart="never" nodeType="tmRoot"/>
-      </p:par>
-    </p:tnLst>
-  </p:timing>
 </p:sld>
 </file>
 
@@ -7247,9 +6978,32 @@
           <a:chExt cx="0" cy="0"/>
         </a:xfrm>
       </p:grpSpPr>
+      <p:sp>
+        <p:nvSpPr>
+          <p:cNvPr id="3" name="Titel 2"/>
+          <p:cNvSpPr>
+            <a:spLocks noGrp="1"/>
+          </p:cNvSpPr>
+          <p:nvPr>
+            <p:ph type="title"/>
+          </p:nvPr>
+        </p:nvSpPr>
+        <p:spPr/>
+        <p:txBody>
+          <a:bodyPr/>
+          <a:lstStyle/>
+          <a:p>
+            <a:r>
+              <a:rPr lang="de-CH" dirty="0" err="1" smtClean="0"/>
+              <a:t>Contributions</a:t>
+            </a:r>
+            <a:endParaRPr lang="de-CH" dirty="0"/>
+          </a:p>
+        </p:txBody>
+      </p:sp>
       <p:pic>
         <p:nvPicPr>
-          <p:cNvPr id="4" name="Inhaltsplatzhalter 3"/>
+          <p:cNvPr id="5" name="Inhaltsplatzhalter 4"/>
           <p:cNvPicPr>
             <a:picLocks noGrp="1" noChangeAspect="1"/>
           </p:cNvPicPr>
@@ -7271,34 +7025,11 @@
         </p:blipFill>
         <p:spPr>
           <a:xfrm>
-            <a:off x="323528" y="1484784"/>
-            <a:ext cx="8229600" cy="3546957"/>
+            <a:off x="395536" y="1413548"/>
+            <a:ext cx="8229600" cy="3515155"/>
           </a:xfrm>
         </p:spPr>
       </p:pic>
-      <p:sp>
-        <p:nvSpPr>
-          <p:cNvPr id="3" name="Titel 2"/>
-          <p:cNvSpPr>
-            <a:spLocks noGrp="1"/>
-          </p:cNvSpPr>
-          <p:nvPr>
-            <p:ph type="title"/>
-          </p:nvPr>
-        </p:nvSpPr>
-        <p:spPr/>
-        <p:txBody>
-          <a:bodyPr/>
-          <a:lstStyle/>
-          <a:p>
-            <a:r>
-              <a:rPr lang="de-CH" dirty="0" err="1" smtClean="0"/>
-              <a:t>Contributions</a:t>
-            </a:r>
-            <a:endParaRPr lang="de-CH" dirty="0"/>
-          </a:p>
-        </p:txBody>
-      </p:sp>
     </p:spTree>
     <p:extLst>
       <p:ext uri="{BB962C8B-B14F-4D97-AF65-F5344CB8AC3E}">
@@ -7313,78 +7044,6 @@
 </file>
 
 <file path=ppt/slides/slide4.xml><?xml version="1.0" encoding="utf-8"?>
-<p:sld xmlns:a="http://schemas.openxmlformats.org/drawingml/2006/main" xmlns:r="http://schemas.openxmlformats.org/officeDocument/2006/relationships" xmlns:p="http://schemas.openxmlformats.org/presentationml/2006/main">
-  <p:cSld>
-    <p:spTree>
-      <p:nvGrpSpPr>
-        <p:cNvPr id="1" name=""/>
-        <p:cNvGrpSpPr/>
-        <p:nvPr/>
-      </p:nvGrpSpPr>
-      <p:grpSpPr>
-        <a:xfrm>
-          <a:off x="0" y="0"/>
-          <a:ext cx="0" cy="0"/>
-          <a:chOff x="0" y="0"/>
-          <a:chExt cx="0" cy="0"/>
-        </a:xfrm>
-      </p:grpSpPr>
-      <p:sp>
-        <p:nvSpPr>
-          <p:cNvPr id="2" name="Inhaltsplatzhalter 1"/>
-          <p:cNvSpPr>
-            <a:spLocks noGrp="1"/>
-          </p:cNvSpPr>
-          <p:nvPr>
-            <p:ph idx="1"/>
-          </p:nvPr>
-        </p:nvSpPr>
-        <p:spPr/>
-        <p:txBody>
-          <a:bodyPr/>
-          <a:lstStyle/>
-          <a:p>
-            <a:r>
-              <a:rPr lang="de-CH" dirty="0" smtClean="0"/>
-              <a:t>&lt;Platzhalter für jedes Teammitglied&gt;</a:t>
-            </a:r>
-            <a:endParaRPr lang="de-CH" dirty="0"/>
-          </a:p>
-        </p:txBody>
-      </p:sp>
-      <p:sp>
-        <p:nvSpPr>
-          <p:cNvPr id="3" name="Titel 2"/>
-          <p:cNvSpPr>
-            <a:spLocks noGrp="1"/>
-          </p:cNvSpPr>
-          <p:nvPr>
-            <p:ph type="title"/>
-          </p:nvPr>
-        </p:nvSpPr>
-        <p:spPr/>
-        <p:txBody>
-          <a:bodyPr/>
-          <a:lstStyle/>
-          <a:p>
-            <a:endParaRPr lang="de-CH"/>
-          </a:p>
-        </p:txBody>
-      </p:sp>
-    </p:spTree>
-    <p:extLst>
-      <p:ext uri="{BB962C8B-B14F-4D97-AF65-F5344CB8AC3E}">
-        <p14:creationId xmlns:p14="http://schemas.microsoft.com/office/powerpoint/2010/main" val="1889886184"/>
-      </p:ext>
-    </p:extLst>
-  </p:cSld>
-  <p:clrMapOvr>
-    <a:masterClrMapping/>
-  </p:clrMapOvr>
-</p:sld>
-</file>
-
-<file path=ppt/slides/slide5.xml><?xml version="1.0" encoding="utf-8"?>
 <p:sld xmlns:a="http://schemas.openxmlformats.org/drawingml/2006/main" xmlns:r="http://schemas.openxmlformats.org/officeDocument/2006/relationships" xmlns:p="http://schemas.openxmlformats.org/presentationml/2006/main">
   <p:cSld>
     <p:spTree>
@@ -7530,7 +7189,7 @@
 </p:sld>
 </file>
 
-<file path=ppt/slides/slide6.xml><?xml version="1.0" encoding="utf-8"?>
+<file path=ppt/slides/slide5.xml><?xml version="1.0" encoding="utf-8"?>
 <p:sld xmlns:a="http://schemas.openxmlformats.org/drawingml/2006/main" xmlns:r="http://schemas.openxmlformats.org/officeDocument/2006/relationships" xmlns:p="http://schemas.openxmlformats.org/presentationml/2006/main">
   <p:cSld>
     <p:spTree>
@@ -7769,7 +7428,7 @@
 </p:sld>
 </file>
 
-<file path=ppt/slides/slide7.xml><?xml version="1.0" encoding="utf-8"?>
+<file path=ppt/slides/slide6.xml><?xml version="1.0" encoding="utf-8"?>
 <p:sld xmlns:a="http://schemas.openxmlformats.org/drawingml/2006/main" xmlns:r="http://schemas.openxmlformats.org/officeDocument/2006/relationships" xmlns:p="http://schemas.openxmlformats.org/presentationml/2006/main">
   <p:cSld>
     <p:spTree>
@@ -8294,7 +7953,7 @@
 </p:sld>
 </file>
 
-<file path=ppt/slides/slide8.xml><?xml version="1.0" encoding="utf-8"?>
+<file path=ppt/slides/slide7.xml><?xml version="1.0" encoding="utf-8"?>
 <p:sld xmlns:a="http://schemas.openxmlformats.org/drawingml/2006/main" xmlns:r="http://schemas.openxmlformats.org/officeDocument/2006/relationships" xmlns:p="http://schemas.openxmlformats.org/presentationml/2006/main">
   <p:cSld>
     <p:spTree>
@@ -9049,7 +8708,7 @@
 </p:sld>
 </file>
 
-<file path=ppt/slides/slide9.xml><?xml version="1.0" encoding="utf-8"?>
+<file path=ppt/slides/slide8.xml><?xml version="1.0" encoding="utf-8"?>
 <p:sld xmlns:a="http://schemas.openxmlformats.org/drawingml/2006/main" xmlns:r="http://schemas.openxmlformats.org/officeDocument/2006/relationships" xmlns:p="http://schemas.openxmlformats.org/presentationml/2006/main">
   <p:cSld>
     <p:spTree>
@@ -9365,6 +9024,218 @@
       </p:par>
     </p:tnLst>
   </p:timing>
+</p:sld>
+</file>
+
+<file path=ppt/slides/slide9.xml><?xml version="1.0" encoding="utf-8"?>
+<p:sld xmlns:a="http://schemas.openxmlformats.org/drawingml/2006/main" xmlns:r="http://schemas.openxmlformats.org/officeDocument/2006/relationships" xmlns:p="http://schemas.openxmlformats.org/presentationml/2006/main">
+  <p:cSld>
+    <p:spTree>
+      <p:nvGrpSpPr>
+        <p:cNvPr id="1" name=""/>
+        <p:cNvGrpSpPr/>
+        <p:nvPr/>
+      </p:nvGrpSpPr>
+      <p:grpSpPr>
+        <a:xfrm>
+          <a:off x="0" y="0"/>
+          <a:ext cx="0" cy="0"/>
+          <a:chOff x="0" y="0"/>
+          <a:chExt cx="0" cy="0"/>
+        </a:xfrm>
+      </p:grpSpPr>
+      <p:sp>
+        <p:nvSpPr>
+          <p:cNvPr id="2" name="Inhaltsplatzhalter 1"/>
+          <p:cNvSpPr>
+            <a:spLocks noGrp="1"/>
+          </p:cNvSpPr>
+          <p:nvPr>
+            <p:ph idx="1"/>
+          </p:nvPr>
+        </p:nvSpPr>
+        <p:spPr/>
+        <p:txBody>
+          <a:bodyPr/>
+          <a:lstStyle/>
+          <a:p>
+            <a:r>
+              <a:rPr lang="de-CH" dirty="0" err="1" smtClean="0"/>
+              <a:t>Deleting</a:t>
+            </a:r>
+            <a:r>
+              <a:rPr lang="de-CH" dirty="0" smtClean="0"/>
+              <a:t> a </a:t>
+            </a:r>
+            <a:r>
+              <a:rPr lang="de-CH" dirty="0" err="1" smtClean="0"/>
+              <a:t>new</a:t>
+            </a:r>
+            <a:r>
+              <a:rPr lang="de-CH" dirty="0" smtClean="0"/>
+              <a:t> </a:t>
+            </a:r>
+            <a:r>
+              <a:rPr lang="de-CH" dirty="0" err="1" smtClean="0"/>
+              <a:t>prescription</a:t>
+            </a:r>
+            <a:endParaRPr lang="de-CH" dirty="0" smtClean="0"/>
+          </a:p>
+          <a:p>
+            <a:endParaRPr lang="de-CH" dirty="0"/>
+          </a:p>
+          <a:p>
+            <a:endParaRPr lang="de-CH" dirty="0" smtClean="0"/>
+          </a:p>
+          <a:p>
+            <a:pPr marL="109728" indent="0">
+              <a:buNone/>
+            </a:pPr>
+            <a:endParaRPr lang="de-CH" dirty="0" smtClean="0"/>
+          </a:p>
+          <a:p>
+            <a:pPr marL="109728" indent="0">
+              <a:buNone/>
+            </a:pPr>
+            <a:endParaRPr lang="de-CH" dirty="0"/>
+          </a:p>
+        </p:txBody>
+      </p:sp>
+      <p:sp>
+        <p:nvSpPr>
+          <p:cNvPr id="3" name="Titel 2"/>
+          <p:cNvSpPr>
+            <a:spLocks noGrp="1"/>
+          </p:cNvSpPr>
+          <p:nvPr>
+            <p:ph type="title"/>
+          </p:nvPr>
+        </p:nvSpPr>
+        <p:spPr/>
+        <p:txBody>
+          <a:bodyPr/>
+          <a:lstStyle/>
+          <a:p>
+            <a:r>
+              <a:rPr lang="de-CH" dirty="0" err="1" smtClean="0"/>
+              <a:t>Contribution</a:t>
+            </a:r>
+            <a:r>
+              <a:rPr lang="de-CH" dirty="0" smtClean="0"/>
+              <a:t> Michel Murbach</a:t>
+            </a:r>
+            <a:endParaRPr lang="de-CH" dirty="0"/>
+          </a:p>
+        </p:txBody>
+      </p:sp>
+      <p:pic>
+        <p:nvPicPr>
+          <p:cNvPr id="4" name="Grafik 3"/>
+          <p:cNvPicPr>
+            <a:picLocks noChangeAspect="1"/>
+          </p:cNvPicPr>
+          <p:nvPr/>
+        </p:nvPicPr>
+        <p:blipFill>
+          <a:blip r:embed="rId2">
+            <a:extLst>
+              <a:ext uri="{28A0092B-C50C-407E-A947-70E740481C1C}">
+                <a14:useLocalDpi xmlns:a14="http://schemas.microsoft.com/office/drawing/2010/main" val="0"/>
+              </a:ext>
+            </a:extLst>
+          </a:blip>
+          <a:stretch>
+            <a:fillRect/>
+          </a:stretch>
+        </p:blipFill>
+        <p:spPr>
+          <a:xfrm>
+            <a:off x="596163" y="1940654"/>
+            <a:ext cx="8107680" cy="2156460"/>
+          </a:xfrm>
+          <a:prstGeom prst="rect">
+            <a:avLst/>
+          </a:prstGeom>
+        </p:spPr>
+      </p:pic>
+      <p:pic>
+        <p:nvPicPr>
+          <p:cNvPr id="5" name="Grafik 4"/>
+          <p:cNvPicPr>
+            <a:picLocks noChangeAspect="1"/>
+          </p:cNvPicPr>
+          <p:nvPr/>
+        </p:nvPicPr>
+        <p:blipFill>
+          <a:blip r:embed="rId3">
+            <a:extLst>
+              <a:ext uri="{28A0092B-C50C-407E-A947-70E740481C1C}">
+                <a14:useLocalDpi xmlns:a14="http://schemas.microsoft.com/office/drawing/2010/main" val="0"/>
+              </a:ext>
+            </a:extLst>
+          </a:blip>
+          <a:stretch>
+            <a:fillRect/>
+          </a:stretch>
+        </p:blipFill>
+        <p:spPr>
+          <a:xfrm>
+            <a:off x="613206" y="4897270"/>
+            <a:ext cx="8073594" cy="1960730"/>
+          </a:xfrm>
+          <a:prstGeom prst="rect">
+            <a:avLst/>
+          </a:prstGeom>
+        </p:spPr>
+      </p:pic>
+      <p:sp>
+        <p:nvSpPr>
+          <p:cNvPr id="6" name="Textfeld 5"/>
+          <p:cNvSpPr txBox="1"/>
+          <p:nvPr/>
+        </p:nvSpPr>
+        <p:spPr>
+          <a:xfrm>
+            <a:off x="3347864" y="4435464"/>
+            <a:ext cx="2448272" cy="369332"/>
+          </a:xfrm>
+          <a:prstGeom prst="rect">
+            <a:avLst/>
+          </a:prstGeom>
+          <a:noFill/>
+        </p:spPr>
+        <p:txBody>
+          <a:bodyPr wrap="square" rtlCol="0">
+            <a:spAutoFit/>
+          </a:bodyPr>
+          <a:lstStyle/>
+          <a:p>
+            <a:r>
+              <a:rPr lang="en-GB" dirty="0" err="1" smtClean="0"/>
+              <a:t>Aufruf</a:t>
+            </a:r>
+            <a:r>
+              <a:rPr lang="en-GB" dirty="0" smtClean="0"/>
+              <a:t> der </a:t>
+            </a:r>
+            <a:r>
+              <a:rPr lang="en-GB" dirty="0" err="1" smtClean="0"/>
+              <a:t>Methode</a:t>
+            </a:r>
+            <a:endParaRPr lang="en-GB" dirty="0"/>
+          </a:p>
+        </p:txBody>
+      </p:sp>
+    </p:spTree>
+    <p:extLst>
+      <p:ext uri="{BB962C8B-B14F-4D97-AF65-F5344CB8AC3E}">
+        <p14:creationId xmlns:p14="http://schemas.microsoft.com/office/powerpoint/2010/main" val="3880234993"/>
+      </p:ext>
+    </p:extLst>
+  </p:cSld>
+  <p:clrMapOvr>
+    <a:masterClrMapping/>
+  </p:clrMapOvr>
 </p:sld>
 </file>
 

</xml_diff>